<commit_message>
Fixed size of poster to A0
</commit_message>
<xml_diff>
--- a/Project_Documents/01_30_35_Poster.pptx
+++ b/Project_Documents/01_30_35_Poster.pptx
@@ -1,18 +1,56 @@
 
 <file path=ppt/presentation.xml><?xml version="1.0" encoding="utf-8"?>
-<!--Generated by Aspose.Slides for .NET 22.12-->
-<p:presentation xmlns:r="http://schemas.openxmlformats.org/officeDocument/2006/relationships" xmlns:a="http://schemas.openxmlformats.org/drawingml/2006/main" xmlns:p="http://schemas.openxmlformats.org/presentationml/2006/main" saveSubsetFonts="1">
+<p:presentation xmlns:a="http://schemas.openxmlformats.org/drawingml/2006/main" xmlns:r="http://schemas.openxmlformats.org/officeDocument/2006/relationships" xmlns:p="http://schemas.openxmlformats.org/presentationml/2006/main" saveSubsetFonts="1" embedTrueTypeFonts="true">
   <p:sldMasterIdLst>
     <p:sldMasterId id="2147483648" r:id="rId1"/>
   </p:sldMasterIdLst>
   <p:sldIdLst>
-    <p:sldId id="256" r:id="rId2"/>
+    <p:sldId id="256" r:id="rId16"/>
   </p:sldIdLst>
-  <p:sldSz cx="12700000" cy="25400000"/>
+  <p:sldSz cx="30276800" cy="42799000"/>
   <p:notesSz cx="6858000" cy="9144000"/>
-  <p:custDataLst>
-    <p:tags r:id="rId3"/>
-  </p:custDataLst>
+  <p:embeddedFontLst>
+    <p:embeddedFont>
+      <p:font typeface="Arimo" charset="1" panose="020B0604020202020204"/>
+      <p:regular r:id="rId6"/>
+    </p:embeddedFont>
+    <p:embeddedFont>
+      <p:font typeface="Arimo Bold" charset="1" panose="020B0704020202020204"/>
+      <p:regular r:id="rId7"/>
+    </p:embeddedFont>
+    <p:embeddedFont>
+      <p:font typeface="Arimo Italics" charset="1" panose="020B0604020202090204"/>
+      <p:regular r:id="rId8"/>
+    </p:embeddedFont>
+    <p:embeddedFont>
+      <p:font typeface="Arimo Bold Italics" charset="1" panose="020B0704020202090204"/>
+      <p:regular r:id="rId9"/>
+    </p:embeddedFont>
+    <p:embeddedFont>
+      <p:font typeface="Gaegu Bold" charset="1" panose="00000000000000000000"/>
+      <p:regular r:id="rId10"/>
+    </p:embeddedFont>
+    <p:embeddedFont>
+      <p:font typeface="Cerebri" charset="1" panose="00000500000000000000"/>
+      <p:regular r:id="rId11"/>
+    </p:embeddedFont>
+    <p:embeddedFont>
+      <p:font typeface="Cerebri Bold" charset="1" panose="00000800000000000000"/>
+      <p:regular r:id="rId12"/>
+    </p:embeddedFont>
+    <p:embeddedFont>
+      <p:font typeface="Cerebri Italics" charset="1" panose="00000500000000000000"/>
+      <p:regular r:id="rId13"/>
+    </p:embeddedFont>
+    <p:embeddedFont>
+      <p:font typeface="Cerebri Bold Italics" charset="1" panose="00000800000000000000"/>
+      <p:regular r:id="rId14"/>
+    </p:embeddedFont>
+    <p:embeddedFont>
+      <p:font typeface="Bobby Jones" charset="1" panose="00000000000000000000"/>
+      <p:regular r:id="rId15"/>
+    </p:embeddedFont>
+  </p:embeddedFontLst>
   <p:defaultTextStyle>
     <a:defPPr>
       <a:defRPr lang="en-US"/>
@@ -112,11 +150,11 @@
 </file>
 
 <file path=ppt/slideLayouts/slideLayout1.xml><?xml version="1.0" encoding="utf-8"?>
-<p:sldLayout xmlns:a="http://schemas.openxmlformats.org/drawingml/2006/main" xmlns:r="http://schemas.openxmlformats.org/officeDocument/2006/relationships" xmlns:m="http://schemas.openxmlformats.org/officeDocument/2006/math" xmlns:w="http://schemas.openxmlformats.org/wordprocessingml/2006/main" xmlns:wp="http://schemas.openxmlformats.org/drawingml/2006/wordprocessingDrawing" xmlns:a14="http://schemas.microsoft.com/office/drawing/2010/main" xmlns:mc="http://schemas.openxmlformats.org/markup-compatibility/2006" xmlns:p14="http://schemas.microsoft.com/office/powerpoint/2010/main" xmlns:p15="http://schemas.microsoft.com/office/powerpoint/2012/main" xmlns:p159="http://schemas.microsoft.com/office/powerpoint/2015/09/main" xmlns:p="http://schemas.openxmlformats.org/presentationml/2006/main" type="title" preserve="1">
+<p:sldLayout xmlns:a="http://schemas.openxmlformats.org/drawingml/2006/main" xmlns:r="http://schemas.openxmlformats.org/officeDocument/2006/relationships" xmlns:p="http://schemas.openxmlformats.org/presentationml/2006/main" type="title" preserve="1">
   <p:cSld name="Title Slide">
     <p:spTree>
       <p:nvGrpSpPr>
-        <p:cNvPr id="1" name="" title=""/>
+        <p:cNvPr id="1" name=""/>
         <p:cNvGrpSpPr/>
         <p:nvPr/>
       </p:nvGrpSpPr>
@@ -124,11 +162,13 @@
         <a:xfrm>
           <a:off x="0" y="0"/>
           <a:ext cx="0" cy="0"/>
+          <a:chOff x="0" y="0"/>
+          <a:chExt cx="0" cy="0"/>
         </a:xfrm>
       </p:grpSpPr>
       <p:sp>
         <p:nvSpPr>
-          <p:cNvPr id="2" name="Title 1" title=""/>
+          <p:cNvPr id="2" name="Title 1"/>
           <p:cNvSpPr>
             <a:spLocks noGrp="1"/>
           </p:cNvSpPr>
@@ -136,7 +176,12 @@
             <p:ph type="ctrTitle"/>
           </p:nvPr>
         </p:nvSpPr>
-        <p:spPr/>
+        <p:spPr>
+          <a:xfrm>
+            <a:off x="685800" y="2130425"/>
+            <a:ext cx="7772400" cy="1470025"/>
+          </a:xfrm>
+        </p:spPr>
         <p:txBody>
           <a:bodyPr/>
           <a:lstStyle/>
@@ -151,7 +196,7 @@
       </p:sp>
       <p:sp>
         <p:nvSpPr>
-          <p:cNvPr id="3" name="Subtitle 2" title=""/>
+          <p:cNvPr id="3" name="Subtitle 2"/>
           <p:cNvSpPr>
             <a:spLocks noGrp="1"/>
           </p:cNvSpPr>
@@ -159,7 +204,12 @@
             <p:ph type="subTitle" idx="1"/>
           </p:nvPr>
         </p:nvSpPr>
-        <p:spPr/>
+        <p:spPr>
+          <a:xfrm>
+            <a:off x="1371600" y="3886200"/>
+            <a:ext cx="6400800" cy="1752600"/>
+          </a:xfrm>
+        </p:spPr>
         <p:txBody>
           <a:bodyPr/>
           <a:lstStyle>
@@ -265,12 +315,12 @@
       </p:sp>
       <p:sp>
         <p:nvSpPr>
-          <p:cNvPr id="4" name="Date Placeholder 3" title=""/>
-          <p:cNvSpPr>
-            <a:spLocks noGrp="1"/>
-          </p:cNvSpPr>
-          <p:nvPr>
-            <p:ph type="dt" sz="half" idx="2"/>
+          <p:cNvPr id="4" name="Date Placeholder 3"/>
+          <p:cNvSpPr>
+            <a:spLocks noGrp="1"/>
+          </p:cNvSpPr>
+          <p:nvPr>
+            <p:ph type="dt" sz="half" idx="10"/>
           </p:nvPr>
         </p:nvSpPr>
         <p:spPr/>
@@ -278,9 +328,10 @@
           <a:bodyPr/>
           <a:lstStyle/>
           <a:p>
-            <a:fld id="{25C33F8D-AD57-47AF-9D0D-FACC499617AD}" type="datetimeFigureOut">
-              <a:rPr lang="en-US" smtClean="0"/>
-              <a:t>11/7/2009</a:t>
+            <a:fld id="{1D8BD707-D9CF-40AE-B4C6-C98DA3205C09}" type="datetimeFigureOut">
+              <a:rPr lang="en-US" smtClean="0"/>
+              <a:pPr/>
+              <a:t>8/1/2011</a:t>
             </a:fld>
             <a:endParaRPr lang="en-US"/>
           </a:p>
@@ -288,12 +339,12 @@
       </p:sp>
       <p:sp>
         <p:nvSpPr>
-          <p:cNvPr id="5" name="Footer Placeholder 4" title=""/>
-          <p:cNvSpPr>
-            <a:spLocks noGrp="1"/>
-          </p:cNvSpPr>
-          <p:nvPr>
-            <p:ph type="ftr" sz="quarter" idx="3"/>
+          <p:cNvPr id="5" name="Footer Placeholder 4"/>
+          <p:cNvSpPr>
+            <a:spLocks noGrp="1"/>
+          </p:cNvSpPr>
+          <p:nvPr>
+            <p:ph type="ftr" sz="quarter" idx="11"/>
           </p:nvPr>
         </p:nvSpPr>
         <p:spPr/>
@@ -307,12 +358,12 @@
       </p:sp>
       <p:sp>
         <p:nvSpPr>
-          <p:cNvPr id="6" name="Slide Number Placeholder 5" title=""/>
-          <p:cNvSpPr>
-            <a:spLocks noGrp="1"/>
-          </p:cNvSpPr>
-          <p:nvPr>
-            <p:ph type="sldNum" sz="quarter" idx="4"/>
+          <p:cNvPr id="6" name="Slide Number Placeholder 5"/>
+          <p:cNvSpPr>
+            <a:spLocks noGrp="1"/>
+          </p:cNvSpPr>
+          <p:nvPr>
+            <p:ph type="sldNum" sz="quarter" idx="12"/>
           </p:nvPr>
         </p:nvSpPr>
         <p:spPr/>
@@ -320,8 +371,9 @@
           <a:bodyPr/>
           <a:lstStyle/>
           <a:p>
-            <a:fld id="{93AE1883-0942-4AA3-9DB2-9C7C3A0314B1}" type="slidenum">
-              <a:rPr lang="en-US" smtClean="0"/>
+            <a:fld id="{B6F15528-21DE-4FAA-801E-634DDDAF4B2B}" type="slidenum">
+              <a:rPr lang="en-US" smtClean="0"/>
+              <a:pPr/>
               <a:t>‹#›</a:t>
             </a:fld>
             <a:endParaRPr lang="en-US"/>
@@ -333,17 +385,15 @@
   <p:clrMapOvr>
     <a:masterClrMapping/>
   </p:clrMapOvr>
-  <p:transition/>
-  <p:timing/>
 </p:sldLayout>
 </file>
 
 <file path=ppt/slideLayouts/slideLayout10.xml><?xml version="1.0" encoding="utf-8"?>
-<p:sldLayout xmlns:a="http://schemas.openxmlformats.org/drawingml/2006/main" xmlns:r="http://schemas.openxmlformats.org/officeDocument/2006/relationships" xmlns:m="http://schemas.openxmlformats.org/officeDocument/2006/math" xmlns:w="http://schemas.openxmlformats.org/wordprocessingml/2006/main" xmlns:wp="http://schemas.openxmlformats.org/drawingml/2006/wordprocessingDrawing" xmlns:a14="http://schemas.microsoft.com/office/drawing/2010/main" xmlns:mc="http://schemas.openxmlformats.org/markup-compatibility/2006" xmlns:p14="http://schemas.microsoft.com/office/powerpoint/2010/main" xmlns:p15="http://schemas.microsoft.com/office/powerpoint/2012/main" xmlns:p159="http://schemas.microsoft.com/office/powerpoint/2015/09/main" xmlns:p="http://schemas.openxmlformats.org/presentationml/2006/main" type="vertTx" preserve="1">
+<p:sldLayout xmlns:a="http://schemas.openxmlformats.org/drawingml/2006/main" xmlns:r="http://schemas.openxmlformats.org/officeDocument/2006/relationships" xmlns:p="http://schemas.openxmlformats.org/presentationml/2006/main" type="vertTx" preserve="1">
   <p:cSld name="Title and Vertical Text">
     <p:spTree>
       <p:nvGrpSpPr>
-        <p:cNvPr id="1" name="" title=""/>
+        <p:cNvPr id="1" name=""/>
         <p:cNvGrpSpPr/>
         <p:nvPr/>
       </p:nvGrpSpPr>
@@ -351,11 +401,13 @@
         <a:xfrm>
           <a:off x="0" y="0"/>
           <a:ext cx="0" cy="0"/>
+          <a:chOff x="0" y="0"/>
+          <a:chExt cx="0" cy="0"/>
         </a:xfrm>
       </p:grpSpPr>
       <p:sp>
         <p:nvSpPr>
-          <p:cNvPr id="2" name="Title 1" title=""/>
+          <p:cNvPr id="2" name="Title 1"/>
           <p:cNvSpPr>
             <a:spLocks noGrp="1"/>
           </p:cNvSpPr>
@@ -378,7 +430,7 @@
       </p:sp>
       <p:sp>
         <p:nvSpPr>
-          <p:cNvPr id="3" name="Vertical Text Placeholder 2" title=""/>
+          <p:cNvPr id="3" name="Vertical Text Placeholder 2"/>
           <p:cNvSpPr>
             <a:spLocks noGrp="1"/>
           </p:cNvSpPr>
@@ -391,6 +443,7 @@
           <a:bodyPr vert="eaVert"/>
           <a:lstStyle/>
           <a:p>
+            <a:pPr lvl="0"/>
             <a:r>
               <a:rPr lang="en-US" smtClean="0"/>
               <a:t>Click to edit Master text styles</a:t>
@@ -429,12 +482,12 @@
       </p:sp>
       <p:sp>
         <p:nvSpPr>
-          <p:cNvPr id="4" name="Date Placeholder 3" title=""/>
-          <p:cNvSpPr>
-            <a:spLocks noGrp="1"/>
-          </p:cNvSpPr>
-          <p:nvPr>
-            <p:ph type="dt" sz="half" idx="2"/>
+          <p:cNvPr id="4" name="Date Placeholder 3"/>
+          <p:cNvSpPr>
+            <a:spLocks noGrp="1"/>
+          </p:cNvSpPr>
+          <p:nvPr>
+            <p:ph type="dt" sz="half" idx="10"/>
           </p:nvPr>
         </p:nvSpPr>
         <p:spPr/>
@@ -442,9 +495,10 @@
           <a:bodyPr/>
           <a:lstStyle/>
           <a:p>
-            <a:fld id="{5DF39C42-DF81-4A17-BEAA-70A0583A2782}" type="datetimeFigureOut">
-              <a:rPr lang="en-US" smtClean="0"/>
-              <a:t>11/7/2009</a:t>
+            <a:fld id="{1D8BD707-D9CF-40AE-B4C6-C98DA3205C09}" type="datetimeFigureOut">
+              <a:rPr lang="en-US" smtClean="0"/>
+              <a:pPr/>
+              <a:t>8/1/2011</a:t>
             </a:fld>
             <a:endParaRPr lang="en-US"/>
           </a:p>
@@ -452,12 +506,12 @@
       </p:sp>
       <p:sp>
         <p:nvSpPr>
-          <p:cNvPr id="5" name="Footer Placeholder 4" title=""/>
-          <p:cNvSpPr>
-            <a:spLocks noGrp="1"/>
-          </p:cNvSpPr>
-          <p:nvPr>
-            <p:ph type="ftr" sz="quarter" idx="3"/>
+          <p:cNvPr id="5" name="Footer Placeholder 4"/>
+          <p:cNvSpPr>
+            <a:spLocks noGrp="1"/>
+          </p:cNvSpPr>
+          <p:nvPr>
+            <p:ph type="ftr" sz="quarter" idx="11"/>
           </p:nvPr>
         </p:nvSpPr>
         <p:spPr/>
@@ -471,12 +525,12 @@
       </p:sp>
       <p:sp>
         <p:nvSpPr>
-          <p:cNvPr id="6" name="Slide Number Placeholder 5" title=""/>
-          <p:cNvSpPr>
-            <a:spLocks noGrp="1"/>
-          </p:cNvSpPr>
-          <p:nvPr>
-            <p:ph type="sldNum" sz="quarter" idx="4"/>
+          <p:cNvPr id="6" name="Slide Number Placeholder 5"/>
+          <p:cNvSpPr>
+            <a:spLocks noGrp="1"/>
+          </p:cNvSpPr>
+          <p:nvPr>
+            <p:ph type="sldNum" sz="quarter" idx="12"/>
           </p:nvPr>
         </p:nvSpPr>
         <p:spPr/>
@@ -484,8 +538,9 @@
           <a:bodyPr/>
           <a:lstStyle/>
           <a:p>
-            <a:fld id="{93AE1883-0942-4AA3-9DB2-9C7C3A0314B1}" type="slidenum">
-              <a:rPr lang="en-US" smtClean="0"/>
+            <a:fld id="{B6F15528-21DE-4FAA-801E-634DDDAF4B2B}" type="slidenum">
+              <a:rPr lang="en-US" smtClean="0"/>
+              <a:pPr/>
               <a:t>‹#›</a:t>
             </a:fld>
             <a:endParaRPr lang="en-US"/>
@@ -497,17 +552,15 @@
   <p:clrMapOvr>
     <a:masterClrMapping/>
   </p:clrMapOvr>
-  <p:transition/>
-  <p:timing/>
 </p:sldLayout>
 </file>
 
 <file path=ppt/slideLayouts/slideLayout11.xml><?xml version="1.0" encoding="utf-8"?>
-<p:sldLayout xmlns:a="http://schemas.openxmlformats.org/drawingml/2006/main" xmlns:r="http://schemas.openxmlformats.org/officeDocument/2006/relationships" xmlns:m="http://schemas.openxmlformats.org/officeDocument/2006/math" xmlns:w="http://schemas.openxmlformats.org/wordprocessingml/2006/main" xmlns:wp="http://schemas.openxmlformats.org/drawingml/2006/wordprocessingDrawing" xmlns:a14="http://schemas.microsoft.com/office/drawing/2010/main" xmlns:mc="http://schemas.openxmlformats.org/markup-compatibility/2006" xmlns:p14="http://schemas.microsoft.com/office/powerpoint/2010/main" xmlns:p15="http://schemas.microsoft.com/office/powerpoint/2012/main" xmlns:p159="http://schemas.microsoft.com/office/powerpoint/2015/09/main" xmlns:p="http://schemas.openxmlformats.org/presentationml/2006/main" type="vertTitleAndTx" preserve="1">
+<p:sldLayout xmlns:a="http://schemas.openxmlformats.org/drawingml/2006/main" xmlns:r="http://schemas.openxmlformats.org/officeDocument/2006/relationships" xmlns:p="http://schemas.openxmlformats.org/presentationml/2006/main" type="vertTitleAndTx" preserve="1">
   <p:cSld name="Vertical Title and Text">
     <p:spTree>
       <p:nvGrpSpPr>
-        <p:cNvPr id="1" name="" title=""/>
+        <p:cNvPr id="1" name=""/>
         <p:cNvGrpSpPr/>
         <p:nvPr/>
       </p:nvGrpSpPr>
@@ -515,11 +568,13 @@
         <a:xfrm>
           <a:off x="0" y="0"/>
           <a:ext cx="0" cy="0"/>
+          <a:chOff x="0" y="0"/>
+          <a:chExt cx="0" cy="0"/>
         </a:xfrm>
       </p:grpSpPr>
       <p:sp>
         <p:nvSpPr>
-          <p:cNvPr id="2" name="Vertical Title 1" title=""/>
+          <p:cNvPr id="2" name="Vertical Title 1"/>
           <p:cNvSpPr>
             <a:spLocks noGrp="1"/>
           </p:cNvSpPr>
@@ -527,88 +582,100 @@
             <p:ph type="title" orient="vert"/>
           </p:nvPr>
         </p:nvSpPr>
+        <p:spPr>
+          <a:xfrm>
+            <a:off x="6629400" y="274638"/>
+            <a:ext cx="2057400" cy="5851525"/>
+          </a:xfrm>
+        </p:spPr>
+        <p:txBody>
+          <a:bodyPr vert="eaVert"/>
+          <a:lstStyle/>
+          <a:p>
+            <a:r>
+              <a:rPr lang="en-US" smtClean="0"/>
+              <a:t>Click to edit Master title style</a:t>
+            </a:r>
+            <a:endParaRPr lang="en-US"/>
+          </a:p>
+        </p:txBody>
+      </p:sp>
+      <p:sp>
+        <p:nvSpPr>
+          <p:cNvPr id="3" name="Vertical Text Placeholder 2"/>
+          <p:cNvSpPr>
+            <a:spLocks noGrp="1"/>
+          </p:cNvSpPr>
+          <p:nvPr>
+            <p:ph type="body" orient="vert" idx="1"/>
+          </p:nvPr>
+        </p:nvSpPr>
+        <p:spPr>
+          <a:xfrm>
+            <a:off x="457200" y="274638"/>
+            <a:ext cx="6019800" cy="5851525"/>
+          </a:xfrm>
+        </p:spPr>
+        <p:txBody>
+          <a:bodyPr vert="eaVert"/>
+          <a:lstStyle/>
+          <a:p>
+            <a:pPr lvl="0"/>
+            <a:r>
+              <a:rPr lang="en-US" smtClean="0"/>
+              <a:t>Click to edit Master text styles</a:t>
+            </a:r>
+          </a:p>
+          <a:p>
+            <a:pPr lvl="1"/>
+            <a:r>
+              <a:rPr lang="en-US" smtClean="0"/>
+              <a:t>Second level</a:t>
+            </a:r>
+          </a:p>
+          <a:p>
+            <a:pPr lvl="2"/>
+            <a:r>
+              <a:rPr lang="en-US" smtClean="0"/>
+              <a:t>Third level</a:t>
+            </a:r>
+          </a:p>
+          <a:p>
+            <a:pPr lvl="3"/>
+            <a:r>
+              <a:rPr lang="en-US" smtClean="0"/>
+              <a:t>Fourth level</a:t>
+            </a:r>
+          </a:p>
+          <a:p>
+            <a:pPr lvl="4"/>
+            <a:r>
+              <a:rPr lang="en-US" smtClean="0"/>
+              <a:t>Fifth level</a:t>
+            </a:r>
+            <a:endParaRPr lang="en-US"/>
+          </a:p>
+        </p:txBody>
+      </p:sp>
+      <p:sp>
+        <p:nvSpPr>
+          <p:cNvPr id="4" name="Date Placeholder 3"/>
+          <p:cNvSpPr>
+            <a:spLocks noGrp="1"/>
+          </p:cNvSpPr>
+          <p:nvPr>
+            <p:ph type="dt" sz="half" idx="10"/>
+          </p:nvPr>
+        </p:nvSpPr>
         <p:spPr/>
         <p:txBody>
-          <a:bodyPr vert="eaVert"/>
-          <a:lstStyle/>
-          <a:p>
-            <a:r>
-              <a:rPr lang="en-US" smtClean="0"/>
-              <a:t>Click to edit Master title style</a:t>
-            </a:r>
-            <a:endParaRPr lang="en-US"/>
-          </a:p>
-        </p:txBody>
-      </p:sp>
-      <p:sp>
-        <p:nvSpPr>
-          <p:cNvPr id="3" name="Vertical Text Placeholder 2" title=""/>
-          <p:cNvSpPr>
-            <a:spLocks noGrp="1"/>
-          </p:cNvSpPr>
-          <p:nvPr>
-            <p:ph type="body" orient="vert" idx="1"/>
-          </p:nvPr>
-        </p:nvSpPr>
-        <p:spPr/>
-        <p:txBody>
-          <a:bodyPr vert="eaVert"/>
-          <a:lstStyle/>
-          <a:p>
-            <a:r>
-              <a:rPr lang="en-US" smtClean="0"/>
-              <a:t>Click to edit Master text styles</a:t>
-            </a:r>
-          </a:p>
-          <a:p>
-            <a:pPr lvl="1"/>
-            <a:r>
-              <a:rPr lang="en-US" smtClean="0"/>
-              <a:t>Second level</a:t>
-            </a:r>
-          </a:p>
-          <a:p>
-            <a:pPr lvl="2"/>
-            <a:r>
-              <a:rPr lang="en-US" smtClean="0"/>
-              <a:t>Third level</a:t>
-            </a:r>
-          </a:p>
-          <a:p>
-            <a:pPr lvl="3"/>
-            <a:r>
-              <a:rPr lang="en-US" smtClean="0"/>
-              <a:t>Fourth level</a:t>
-            </a:r>
-          </a:p>
-          <a:p>
-            <a:pPr lvl="4"/>
-            <a:r>
-              <a:rPr lang="en-US" smtClean="0"/>
-              <a:t>Fifth level</a:t>
-            </a:r>
-            <a:endParaRPr lang="en-US"/>
-          </a:p>
-        </p:txBody>
-      </p:sp>
-      <p:sp>
-        <p:nvSpPr>
-          <p:cNvPr id="4" name="Date Placeholder 3" title=""/>
-          <p:cNvSpPr>
-            <a:spLocks noGrp="1"/>
-          </p:cNvSpPr>
-          <p:nvPr>
-            <p:ph type="dt" sz="half" idx="2"/>
-          </p:nvPr>
-        </p:nvSpPr>
-        <p:spPr/>
-        <p:txBody>
           <a:bodyPr/>
           <a:lstStyle/>
           <a:p>
-            <a:fld id="{3A79DB1A-58F2-4EB5-86A8-F9DC5CBC0788}" type="datetimeFigureOut">
-              <a:rPr lang="en-US" smtClean="0"/>
-              <a:t>11/7/2009</a:t>
+            <a:fld id="{1D8BD707-D9CF-40AE-B4C6-C98DA3205C09}" type="datetimeFigureOut">
+              <a:rPr lang="en-US" smtClean="0"/>
+              <a:pPr/>
+              <a:t>8/1/2011</a:t>
             </a:fld>
             <a:endParaRPr lang="en-US"/>
           </a:p>
@@ -616,12 +683,12 @@
       </p:sp>
       <p:sp>
         <p:nvSpPr>
-          <p:cNvPr id="5" name="Footer Placeholder 4" title=""/>
-          <p:cNvSpPr>
-            <a:spLocks noGrp="1"/>
-          </p:cNvSpPr>
-          <p:nvPr>
-            <p:ph type="ftr" sz="quarter" idx="3"/>
+          <p:cNvPr id="5" name="Footer Placeholder 4"/>
+          <p:cNvSpPr>
+            <a:spLocks noGrp="1"/>
+          </p:cNvSpPr>
+          <p:nvPr>
+            <p:ph type="ftr" sz="quarter" idx="11"/>
           </p:nvPr>
         </p:nvSpPr>
         <p:spPr/>
@@ -635,12 +702,12 @@
       </p:sp>
       <p:sp>
         <p:nvSpPr>
-          <p:cNvPr id="6" name="Slide Number Placeholder 5" title=""/>
-          <p:cNvSpPr>
-            <a:spLocks noGrp="1"/>
-          </p:cNvSpPr>
-          <p:nvPr>
-            <p:ph type="sldNum" sz="quarter" idx="4"/>
+          <p:cNvPr id="6" name="Slide Number Placeholder 5"/>
+          <p:cNvSpPr>
+            <a:spLocks noGrp="1"/>
+          </p:cNvSpPr>
+          <p:nvPr>
+            <p:ph type="sldNum" sz="quarter" idx="12"/>
           </p:nvPr>
         </p:nvSpPr>
         <p:spPr/>
@@ -648,8 +715,9 @@
           <a:bodyPr/>
           <a:lstStyle/>
           <a:p>
-            <a:fld id="{93AE1883-0942-4AA3-9DB2-9C7C3A0314B1}" type="slidenum">
-              <a:rPr lang="en-US" smtClean="0"/>
+            <a:fld id="{B6F15528-21DE-4FAA-801E-634DDDAF4B2B}" type="slidenum">
+              <a:rPr lang="en-US" smtClean="0"/>
+              <a:pPr/>
               <a:t>‹#›</a:t>
             </a:fld>
             <a:endParaRPr lang="en-US"/>
@@ -661,17 +729,15 @@
   <p:clrMapOvr>
     <a:masterClrMapping/>
   </p:clrMapOvr>
-  <p:transition/>
-  <p:timing/>
 </p:sldLayout>
 </file>
 
 <file path=ppt/slideLayouts/slideLayout2.xml><?xml version="1.0" encoding="utf-8"?>
-<p:sldLayout xmlns:a="http://schemas.openxmlformats.org/drawingml/2006/main" xmlns:r="http://schemas.openxmlformats.org/officeDocument/2006/relationships" xmlns:m="http://schemas.openxmlformats.org/officeDocument/2006/math" xmlns:w="http://schemas.openxmlformats.org/wordprocessingml/2006/main" xmlns:wp="http://schemas.openxmlformats.org/drawingml/2006/wordprocessingDrawing" xmlns:a14="http://schemas.microsoft.com/office/drawing/2010/main" xmlns:mc="http://schemas.openxmlformats.org/markup-compatibility/2006" xmlns:p14="http://schemas.microsoft.com/office/powerpoint/2010/main" xmlns:p15="http://schemas.microsoft.com/office/powerpoint/2012/main" xmlns:p159="http://schemas.microsoft.com/office/powerpoint/2015/09/main" xmlns:p="http://schemas.openxmlformats.org/presentationml/2006/main" type="obj" preserve="1">
+<p:sldLayout xmlns:a="http://schemas.openxmlformats.org/drawingml/2006/main" xmlns:r="http://schemas.openxmlformats.org/officeDocument/2006/relationships" xmlns:p="http://schemas.openxmlformats.org/presentationml/2006/main" type="obj" preserve="1">
   <p:cSld name="Title and Content">
     <p:spTree>
       <p:nvGrpSpPr>
-        <p:cNvPr id="1" name="" title=""/>
+        <p:cNvPr id="1" name=""/>
         <p:cNvGrpSpPr/>
         <p:nvPr/>
       </p:nvGrpSpPr>
@@ -679,11 +745,13 @@
         <a:xfrm>
           <a:off x="0" y="0"/>
           <a:ext cx="0" cy="0"/>
+          <a:chOff x="0" y="0"/>
+          <a:chExt cx="0" cy="0"/>
         </a:xfrm>
       </p:grpSpPr>
       <p:sp>
         <p:nvSpPr>
-          <p:cNvPr id="2" name="Title 1" title=""/>
+          <p:cNvPr id="2" name="Title 1"/>
           <p:cNvSpPr>
             <a:spLocks noGrp="1"/>
           </p:cNvSpPr>
@@ -706,7 +774,7 @@
       </p:sp>
       <p:sp>
         <p:nvSpPr>
-          <p:cNvPr id="3" name="Content Placeholder 2" title=""/>
+          <p:cNvPr id="3" name="Content Placeholder 2"/>
           <p:cNvSpPr>
             <a:spLocks noGrp="1"/>
           </p:cNvSpPr>
@@ -719,6 +787,7 @@
           <a:bodyPr/>
           <a:lstStyle/>
           <a:p>
+            <a:pPr lvl="0"/>
             <a:r>
               <a:rPr lang="en-US" smtClean="0"/>
               <a:t>Click to edit Master text styles</a:t>
@@ -757,12 +826,12 @@
       </p:sp>
       <p:sp>
         <p:nvSpPr>
-          <p:cNvPr id="4" name="Date Placeholder 3" title=""/>
-          <p:cNvSpPr>
-            <a:spLocks noGrp="1"/>
-          </p:cNvSpPr>
-          <p:nvPr>
-            <p:ph type="dt" sz="half" idx="2"/>
+          <p:cNvPr id="4" name="Date Placeholder 3"/>
+          <p:cNvSpPr>
+            <a:spLocks noGrp="1"/>
+          </p:cNvSpPr>
+          <p:nvPr>
+            <p:ph type="dt" sz="half" idx="10"/>
           </p:nvPr>
         </p:nvSpPr>
         <p:spPr/>
@@ -770,9 +839,10 @@
           <a:bodyPr/>
           <a:lstStyle/>
           <a:p>
-            <a:fld id="{69A51243-DC83-4039-A800-1487359F482C}" type="datetimeFigureOut">
-              <a:rPr lang="en-US" smtClean="0"/>
-              <a:t>11/7/2009</a:t>
+            <a:fld id="{1D8BD707-D9CF-40AE-B4C6-C98DA3205C09}" type="datetimeFigureOut">
+              <a:rPr lang="en-US" smtClean="0"/>
+              <a:pPr/>
+              <a:t>8/1/2011</a:t>
             </a:fld>
             <a:endParaRPr lang="en-US"/>
           </a:p>
@@ -780,12 +850,12 @@
       </p:sp>
       <p:sp>
         <p:nvSpPr>
-          <p:cNvPr id="5" name="Footer Placeholder 4" title=""/>
-          <p:cNvSpPr>
-            <a:spLocks noGrp="1"/>
-          </p:cNvSpPr>
-          <p:nvPr>
-            <p:ph type="ftr" sz="quarter" idx="3"/>
+          <p:cNvPr id="5" name="Footer Placeholder 4"/>
+          <p:cNvSpPr>
+            <a:spLocks noGrp="1"/>
+          </p:cNvSpPr>
+          <p:nvPr>
+            <p:ph type="ftr" sz="quarter" idx="11"/>
           </p:nvPr>
         </p:nvSpPr>
         <p:spPr/>
@@ -799,12 +869,12 @@
       </p:sp>
       <p:sp>
         <p:nvSpPr>
-          <p:cNvPr id="6" name="Slide Number Placeholder 5" title=""/>
-          <p:cNvSpPr>
-            <a:spLocks noGrp="1"/>
-          </p:cNvSpPr>
-          <p:nvPr>
-            <p:ph type="sldNum" sz="quarter" idx="4"/>
+          <p:cNvPr id="6" name="Slide Number Placeholder 5"/>
+          <p:cNvSpPr>
+            <a:spLocks noGrp="1"/>
+          </p:cNvSpPr>
+          <p:nvPr>
+            <p:ph type="sldNum" sz="quarter" idx="12"/>
           </p:nvPr>
         </p:nvSpPr>
         <p:spPr/>
@@ -812,8 +882,9 @@
           <a:bodyPr/>
           <a:lstStyle/>
           <a:p>
-            <a:fld id="{93AE1883-0942-4AA3-9DB2-9C7C3A0314B1}" type="slidenum">
-              <a:rPr lang="en-US" smtClean="0"/>
+            <a:fld id="{B6F15528-21DE-4FAA-801E-634DDDAF4B2B}" type="slidenum">
+              <a:rPr lang="en-US" smtClean="0"/>
+              <a:pPr/>
               <a:t>‹#›</a:t>
             </a:fld>
             <a:endParaRPr lang="en-US"/>
@@ -825,17 +896,15 @@
   <p:clrMapOvr>
     <a:masterClrMapping/>
   </p:clrMapOvr>
-  <p:transition/>
-  <p:timing/>
 </p:sldLayout>
 </file>
 
 <file path=ppt/slideLayouts/slideLayout3.xml><?xml version="1.0" encoding="utf-8"?>
-<p:sldLayout xmlns:a="http://schemas.openxmlformats.org/drawingml/2006/main" xmlns:r="http://schemas.openxmlformats.org/officeDocument/2006/relationships" xmlns:m="http://schemas.openxmlformats.org/officeDocument/2006/math" xmlns:w="http://schemas.openxmlformats.org/wordprocessingml/2006/main" xmlns:wp="http://schemas.openxmlformats.org/drawingml/2006/wordprocessingDrawing" xmlns:a14="http://schemas.microsoft.com/office/drawing/2010/main" xmlns:mc="http://schemas.openxmlformats.org/markup-compatibility/2006" xmlns:p14="http://schemas.microsoft.com/office/powerpoint/2010/main" xmlns:p15="http://schemas.microsoft.com/office/powerpoint/2012/main" xmlns:p159="http://schemas.microsoft.com/office/powerpoint/2015/09/main" xmlns:p="http://schemas.openxmlformats.org/presentationml/2006/main" type="secHead" preserve="1">
+<p:sldLayout xmlns:a="http://schemas.openxmlformats.org/drawingml/2006/main" xmlns:r="http://schemas.openxmlformats.org/officeDocument/2006/relationships" xmlns:p="http://schemas.openxmlformats.org/presentationml/2006/main" type="secHead" preserve="1">
   <p:cSld name="Section Header">
     <p:spTree>
       <p:nvGrpSpPr>
-        <p:cNvPr id="1" name="" title=""/>
+        <p:cNvPr id="1" name=""/>
         <p:cNvGrpSpPr/>
         <p:nvPr/>
       </p:nvGrpSpPr>
@@ -843,11 +912,13 @@
         <a:xfrm>
           <a:off x="0" y="0"/>
           <a:ext cx="0" cy="0"/>
+          <a:chOff x="0" y="0"/>
+          <a:chExt cx="0" cy="0"/>
         </a:xfrm>
       </p:grpSpPr>
       <p:sp>
         <p:nvSpPr>
-          <p:cNvPr id="2" name="Title 1" title=""/>
+          <p:cNvPr id="2" name="Title 1"/>
           <p:cNvSpPr>
             <a:spLocks noGrp="1"/>
           </p:cNvSpPr>
@@ -855,7 +926,12 @@
             <p:ph type="title"/>
           </p:nvPr>
         </p:nvSpPr>
-        <p:spPr/>
+        <p:spPr>
+          <a:xfrm>
+            <a:off x="722313" y="4406900"/>
+            <a:ext cx="7772400" cy="1362075"/>
+          </a:xfrm>
+        </p:spPr>
         <p:txBody>
           <a:bodyPr anchor="t"/>
           <a:lstStyle>
@@ -874,7 +950,7 @@
       </p:sp>
       <p:sp>
         <p:nvSpPr>
-          <p:cNvPr id="3" name="Text Placeholder 2" title=""/>
+          <p:cNvPr id="3" name="Text Placeholder 2"/>
           <p:cNvSpPr>
             <a:spLocks noGrp="1"/>
           </p:cNvSpPr>
@@ -882,7 +958,12 @@
             <p:ph type="body" idx="1"/>
           </p:nvPr>
         </p:nvSpPr>
-        <p:spPr/>
+        <p:spPr>
+          <a:xfrm>
+            <a:off x="722313" y="2906713"/>
+            <a:ext cx="7772400" cy="1500187"/>
+          </a:xfrm>
+        </p:spPr>
         <p:txBody>
           <a:bodyPr anchor="b"/>
           <a:lstStyle>
@@ -978,6 +1059,7 @@
             </a:lvl9pPr>
           </a:lstStyle>
           <a:p>
+            <a:pPr lvl="0"/>
             <a:r>
               <a:rPr lang="en-US" smtClean="0"/>
               <a:t>Click to edit Master text styles</a:t>
@@ -987,12 +1069,12 @@
       </p:sp>
       <p:sp>
         <p:nvSpPr>
-          <p:cNvPr id="4" name="Date Placeholder 3" title=""/>
-          <p:cNvSpPr>
-            <a:spLocks noGrp="1"/>
-          </p:cNvSpPr>
-          <p:nvPr>
-            <p:ph type="dt" sz="half" idx="2"/>
+          <p:cNvPr id="4" name="Date Placeholder 3"/>
+          <p:cNvSpPr>
+            <a:spLocks noGrp="1"/>
+          </p:cNvSpPr>
+          <p:nvPr>
+            <p:ph type="dt" sz="half" idx="10"/>
           </p:nvPr>
         </p:nvSpPr>
         <p:spPr/>
@@ -1000,9 +1082,10 @@
           <a:bodyPr/>
           <a:lstStyle/>
           <a:p>
-            <a:fld id="{4A93EB55-7272-49E7-A899-4DC7CAECB509}" type="datetimeFigureOut">
-              <a:rPr lang="en-US" smtClean="0"/>
-              <a:t>11/7/2009</a:t>
+            <a:fld id="{1D8BD707-D9CF-40AE-B4C6-C98DA3205C09}" type="datetimeFigureOut">
+              <a:rPr lang="en-US" smtClean="0"/>
+              <a:pPr/>
+              <a:t>8/1/2011</a:t>
             </a:fld>
             <a:endParaRPr lang="en-US"/>
           </a:p>
@@ -1010,12 +1093,12 @@
       </p:sp>
       <p:sp>
         <p:nvSpPr>
-          <p:cNvPr id="5" name="Footer Placeholder 4" title=""/>
-          <p:cNvSpPr>
-            <a:spLocks noGrp="1"/>
-          </p:cNvSpPr>
-          <p:nvPr>
-            <p:ph type="ftr" sz="quarter" idx="3"/>
+          <p:cNvPr id="5" name="Footer Placeholder 4"/>
+          <p:cNvSpPr>
+            <a:spLocks noGrp="1"/>
+          </p:cNvSpPr>
+          <p:nvPr>
+            <p:ph type="ftr" sz="quarter" idx="11"/>
           </p:nvPr>
         </p:nvSpPr>
         <p:spPr/>
@@ -1029,12 +1112,12 @@
       </p:sp>
       <p:sp>
         <p:nvSpPr>
-          <p:cNvPr id="6" name="Slide Number Placeholder 5" title=""/>
-          <p:cNvSpPr>
-            <a:spLocks noGrp="1"/>
-          </p:cNvSpPr>
-          <p:nvPr>
-            <p:ph type="sldNum" sz="quarter" idx="4"/>
+          <p:cNvPr id="6" name="Slide Number Placeholder 5"/>
+          <p:cNvSpPr>
+            <a:spLocks noGrp="1"/>
+          </p:cNvSpPr>
+          <p:nvPr>
+            <p:ph type="sldNum" sz="quarter" idx="12"/>
           </p:nvPr>
         </p:nvSpPr>
         <p:spPr/>
@@ -1042,8 +1125,9 @@
           <a:bodyPr/>
           <a:lstStyle/>
           <a:p>
-            <a:fld id="{93AE1883-0942-4AA3-9DB2-9C7C3A0314B1}" type="slidenum">
-              <a:rPr lang="en-US" smtClean="0"/>
+            <a:fld id="{B6F15528-21DE-4FAA-801E-634DDDAF4B2B}" type="slidenum">
+              <a:rPr lang="en-US" smtClean="0"/>
+              <a:pPr/>
               <a:t>‹#›</a:t>
             </a:fld>
             <a:endParaRPr lang="en-US"/>
@@ -1055,17 +1139,15 @@
   <p:clrMapOvr>
     <a:masterClrMapping/>
   </p:clrMapOvr>
-  <p:transition/>
-  <p:timing/>
 </p:sldLayout>
 </file>
 
 <file path=ppt/slideLayouts/slideLayout4.xml><?xml version="1.0" encoding="utf-8"?>
-<p:sldLayout xmlns:a="http://schemas.openxmlformats.org/drawingml/2006/main" xmlns:r="http://schemas.openxmlformats.org/officeDocument/2006/relationships" xmlns:m="http://schemas.openxmlformats.org/officeDocument/2006/math" xmlns:w="http://schemas.openxmlformats.org/wordprocessingml/2006/main" xmlns:wp="http://schemas.openxmlformats.org/drawingml/2006/wordprocessingDrawing" xmlns:a14="http://schemas.microsoft.com/office/drawing/2010/main" xmlns:mc="http://schemas.openxmlformats.org/markup-compatibility/2006" xmlns:p14="http://schemas.microsoft.com/office/powerpoint/2010/main" xmlns:p15="http://schemas.microsoft.com/office/powerpoint/2012/main" xmlns:p159="http://schemas.microsoft.com/office/powerpoint/2015/09/main" xmlns:p="http://schemas.openxmlformats.org/presentationml/2006/main" type="twoObj" preserve="1">
+<p:sldLayout xmlns:a="http://schemas.openxmlformats.org/drawingml/2006/main" xmlns:r="http://schemas.openxmlformats.org/officeDocument/2006/relationships" xmlns:p="http://schemas.openxmlformats.org/presentationml/2006/main" type="twoObj" preserve="1">
   <p:cSld name="Two Content">
     <p:spTree>
       <p:nvGrpSpPr>
-        <p:cNvPr id="1" name="" title=""/>
+        <p:cNvPr id="1" name=""/>
         <p:cNvGrpSpPr/>
         <p:nvPr/>
       </p:nvGrpSpPr>
@@ -1073,11 +1155,13 @@
         <a:xfrm>
           <a:off x="0" y="0"/>
           <a:ext cx="0" cy="0"/>
+          <a:chOff x="0" y="0"/>
+          <a:chExt cx="0" cy="0"/>
         </a:xfrm>
       </p:grpSpPr>
       <p:sp>
         <p:nvSpPr>
-          <p:cNvPr id="2" name="Title 1" title=""/>
+          <p:cNvPr id="2" name="Title 1"/>
           <p:cNvSpPr>
             <a:spLocks noGrp="1"/>
           </p:cNvSpPr>
@@ -1100,7 +1184,7 @@
       </p:sp>
       <p:sp>
         <p:nvSpPr>
-          <p:cNvPr id="3" name="Content Placeholder 2" title=""/>
+          <p:cNvPr id="3" name="Content Placeholder 2"/>
           <p:cNvSpPr>
             <a:spLocks noGrp="1"/>
           </p:cNvSpPr>
@@ -1108,7 +1192,12 @@
             <p:ph sz="half" idx="1"/>
           </p:nvPr>
         </p:nvSpPr>
-        <p:spPr/>
+        <p:spPr>
+          <a:xfrm>
+            <a:off x="457200" y="1600200"/>
+            <a:ext cx="4038600" cy="4525963"/>
+          </a:xfrm>
+        </p:spPr>
         <p:txBody>
           <a:bodyPr/>
           <a:lstStyle>
@@ -1141,6 +1230,7 @@
             </a:lvl9pPr>
           </a:lstStyle>
           <a:p>
+            <a:pPr lvl="0"/>
             <a:r>
               <a:rPr lang="en-US" smtClean="0"/>
               <a:t>Click to edit Master text styles</a:t>
@@ -1179,7 +1269,7 @@
       </p:sp>
       <p:sp>
         <p:nvSpPr>
-          <p:cNvPr id="4" name="Content Placeholder 3" title=""/>
+          <p:cNvPr id="4" name="Content Placeholder 3"/>
           <p:cNvSpPr>
             <a:spLocks noGrp="1"/>
           </p:cNvSpPr>
@@ -1187,7 +1277,12 @@
             <p:ph sz="half" idx="2"/>
           </p:nvPr>
         </p:nvSpPr>
-        <p:spPr/>
+        <p:spPr>
+          <a:xfrm>
+            <a:off x="4648200" y="1600200"/>
+            <a:ext cx="4038600" cy="4525963"/>
+          </a:xfrm>
+        </p:spPr>
         <p:txBody>
           <a:bodyPr/>
           <a:lstStyle>
@@ -1220,6 +1315,7 @@
             </a:lvl9pPr>
           </a:lstStyle>
           <a:p>
+            <a:pPr lvl="0"/>
             <a:r>
               <a:rPr lang="en-US" smtClean="0"/>
               <a:t>Click to edit Master text styles</a:t>
@@ -1258,12 +1354,12 @@
       </p:sp>
       <p:sp>
         <p:nvSpPr>
-          <p:cNvPr id="5" name="Date Placeholder 4" title=""/>
-          <p:cNvSpPr>
-            <a:spLocks noGrp="1"/>
-          </p:cNvSpPr>
-          <p:nvPr>
-            <p:ph type="dt" sz="half" idx="3"/>
+          <p:cNvPr id="5" name="Date Placeholder 4"/>
+          <p:cNvSpPr>
+            <a:spLocks noGrp="1"/>
+          </p:cNvSpPr>
+          <p:nvPr>
+            <p:ph type="dt" sz="half" idx="10"/>
           </p:nvPr>
         </p:nvSpPr>
         <p:spPr/>
@@ -1271,9 +1367,10 @@
           <a:bodyPr/>
           <a:lstStyle/>
           <a:p>
-            <a:fld id="{42BE4D0A-EBC6-4F92-9650-CD2EEBCCF35C}" type="datetimeFigureOut">
-              <a:rPr lang="en-US" smtClean="0"/>
-              <a:t>11/7/2009</a:t>
+            <a:fld id="{1D8BD707-D9CF-40AE-B4C6-C98DA3205C09}" type="datetimeFigureOut">
+              <a:rPr lang="en-US" smtClean="0"/>
+              <a:pPr/>
+              <a:t>8/1/2011</a:t>
             </a:fld>
             <a:endParaRPr lang="en-US"/>
           </a:p>
@@ -1281,12 +1378,12 @@
       </p:sp>
       <p:sp>
         <p:nvSpPr>
-          <p:cNvPr id="6" name="Footer Placeholder 5" title=""/>
-          <p:cNvSpPr>
-            <a:spLocks noGrp="1"/>
-          </p:cNvSpPr>
-          <p:nvPr>
-            <p:ph type="ftr" sz="quarter" idx="4"/>
+          <p:cNvPr id="6" name="Footer Placeholder 5"/>
+          <p:cNvSpPr>
+            <a:spLocks noGrp="1"/>
+          </p:cNvSpPr>
+          <p:nvPr>
+            <p:ph type="ftr" sz="quarter" idx="11"/>
           </p:nvPr>
         </p:nvSpPr>
         <p:spPr/>
@@ -1300,12 +1397,12 @@
       </p:sp>
       <p:sp>
         <p:nvSpPr>
-          <p:cNvPr id="7" name="Slide Number Placeholder 6" title=""/>
-          <p:cNvSpPr>
-            <a:spLocks noGrp="1"/>
-          </p:cNvSpPr>
-          <p:nvPr>
-            <p:ph type="sldNum" sz="quarter" idx="5"/>
+          <p:cNvPr id="7" name="Slide Number Placeholder 6"/>
+          <p:cNvSpPr>
+            <a:spLocks noGrp="1"/>
+          </p:cNvSpPr>
+          <p:nvPr>
+            <p:ph type="sldNum" sz="quarter" idx="12"/>
           </p:nvPr>
         </p:nvSpPr>
         <p:spPr/>
@@ -1313,8 +1410,9 @@
           <a:bodyPr/>
           <a:lstStyle/>
           <a:p>
-            <a:fld id="{93AE1883-0942-4AA3-9DB2-9C7C3A0314B1}" type="slidenum">
-              <a:rPr lang="en-US" smtClean="0"/>
+            <a:fld id="{B6F15528-21DE-4FAA-801E-634DDDAF4B2B}" type="slidenum">
+              <a:rPr lang="en-US" smtClean="0"/>
+              <a:pPr/>
               <a:t>‹#›</a:t>
             </a:fld>
             <a:endParaRPr lang="en-US"/>
@@ -1326,17 +1424,15 @@
   <p:clrMapOvr>
     <a:masterClrMapping/>
   </p:clrMapOvr>
-  <p:transition/>
-  <p:timing/>
 </p:sldLayout>
 </file>
 
 <file path=ppt/slideLayouts/slideLayout5.xml><?xml version="1.0" encoding="utf-8"?>
-<p:sldLayout xmlns:a="http://schemas.openxmlformats.org/drawingml/2006/main" xmlns:r="http://schemas.openxmlformats.org/officeDocument/2006/relationships" xmlns:m="http://schemas.openxmlformats.org/officeDocument/2006/math" xmlns:w="http://schemas.openxmlformats.org/wordprocessingml/2006/main" xmlns:wp="http://schemas.openxmlformats.org/drawingml/2006/wordprocessingDrawing" xmlns:a14="http://schemas.microsoft.com/office/drawing/2010/main" xmlns:mc="http://schemas.openxmlformats.org/markup-compatibility/2006" xmlns:p14="http://schemas.microsoft.com/office/powerpoint/2010/main" xmlns:p15="http://schemas.microsoft.com/office/powerpoint/2012/main" xmlns:p159="http://schemas.microsoft.com/office/powerpoint/2015/09/main" xmlns:p="http://schemas.openxmlformats.org/presentationml/2006/main" type="twoTxTwoObj" preserve="1">
+<p:sldLayout xmlns:a="http://schemas.openxmlformats.org/drawingml/2006/main" xmlns:r="http://schemas.openxmlformats.org/officeDocument/2006/relationships" xmlns:p="http://schemas.openxmlformats.org/presentationml/2006/main" type="twoTxTwoObj" preserve="1">
   <p:cSld name="Comparison">
     <p:spTree>
       <p:nvGrpSpPr>
-        <p:cNvPr id="1" name="" title=""/>
+        <p:cNvPr id="1" name=""/>
         <p:cNvGrpSpPr/>
         <p:nvPr/>
       </p:nvGrpSpPr>
@@ -1344,11 +1440,13 @@
         <a:xfrm>
           <a:off x="0" y="0"/>
           <a:ext cx="0" cy="0"/>
+          <a:chOff x="0" y="0"/>
+          <a:chExt cx="0" cy="0"/>
         </a:xfrm>
       </p:grpSpPr>
       <p:sp>
         <p:nvSpPr>
-          <p:cNvPr id="2" name="Title 1" title=""/>
+          <p:cNvPr id="2" name="Title 1"/>
           <p:cNvSpPr>
             <a:spLocks noGrp="1"/>
           </p:cNvSpPr>
@@ -1359,7 +1457,11 @@
         <p:spPr/>
         <p:txBody>
           <a:bodyPr/>
-          <a:lstStyle/>
+          <a:lstStyle>
+            <a:lvl1pPr>
+              <a:defRPr/>
+            </a:lvl1pPr>
+          </a:lstStyle>
           <a:p>
             <a:r>
               <a:rPr lang="en-US" smtClean="0"/>
@@ -1371,7 +1473,7 @@
       </p:sp>
       <p:sp>
         <p:nvSpPr>
-          <p:cNvPr id="3" name="Text Placeholder 2" title=""/>
+          <p:cNvPr id="3" name="Text Placeholder 2"/>
           <p:cNvSpPr>
             <a:spLocks noGrp="1"/>
           </p:cNvSpPr>
@@ -1379,7 +1481,12 @@
             <p:ph type="body" idx="1"/>
           </p:nvPr>
         </p:nvSpPr>
-        <p:spPr/>
+        <p:spPr>
+          <a:xfrm>
+            <a:off x="457200" y="1535113"/>
+            <a:ext cx="4040188" cy="639762"/>
+          </a:xfrm>
+        </p:spPr>
         <p:txBody>
           <a:bodyPr anchor="b"/>
           <a:lstStyle>
@@ -1421,6 +1528,7 @@
             </a:lvl9pPr>
           </a:lstStyle>
           <a:p>
+            <a:pPr lvl="0"/>
             <a:r>
               <a:rPr lang="en-US" smtClean="0"/>
               <a:t>Click to edit Master text styles</a:t>
@@ -1430,7 +1538,7 @@
       </p:sp>
       <p:sp>
         <p:nvSpPr>
-          <p:cNvPr id="4" name="Content Placeholder 3" title=""/>
+          <p:cNvPr id="4" name="Content Placeholder 3"/>
           <p:cNvSpPr>
             <a:spLocks noGrp="1"/>
           </p:cNvSpPr>
@@ -1438,7 +1546,12 @@
             <p:ph sz="half" idx="2"/>
           </p:nvPr>
         </p:nvSpPr>
-        <p:spPr/>
+        <p:spPr>
+          <a:xfrm>
+            <a:off x="457200" y="2174875"/>
+            <a:ext cx="4040188" cy="3951288"/>
+          </a:xfrm>
+        </p:spPr>
         <p:txBody>
           <a:bodyPr/>
           <a:lstStyle>
@@ -1471,6 +1584,7 @@
             </a:lvl9pPr>
           </a:lstStyle>
           <a:p>
+            <a:pPr lvl="0"/>
             <a:r>
               <a:rPr lang="en-US" smtClean="0"/>
               <a:t>Click to edit Master text styles</a:t>
@@ -1509,7 +1623,7 @@
       </p:sp>
       <p:sp>
         <p:nvSpPr>
-          <p:cNvPr id="5" name="Text Placeholder 4" title=""/>
+          <p:cNvPr id="5" name="Text Placeholder 4"/>
           <p:cNvSpPr>
             <a:spLocks noGrp="1"/>
           </p:cNvSpPr>
@@ -1517,7 +1631,12 @@
             <p:ph type="body" sz="quarter" idx="3"/>
           </p:nvPr>
         </p:nvSpPr>
-        <p:spPr/>
+        <p:spPr>
+          <a:xfrm>
+            <a:off x="4645025" y="1535113"/>
+            <a:ext cx="4041775" cy="639762"/>
+          </a:xfrm>
+        </p:spPr>
         <p:txBody>
           <a:bodyPr anchor="b"/>
           <a:lstStyle>
@@ -1559,6 +1678,7 @@
             </a:lvl9pPr>
           </a:lstStyle>
           <a:p>
+            <a:pPr lvl="0"/>
             <a:r>
               <a:rPr lang="en-US" smtClean="0"/>
               <a:t>Click to edit Master text styles</a:t>
@@ -1568,7 +1688,7 @@
       </p:sp>
       <p:sp>
         <p:nvSpPr>
-          <p:cNvPr id="6" name="Content Placeholder 5" title=""/>
+          <p:cNvPr id="6" name="Content Placeholder 5"/>
           <p:cNvSpPr>
             <a:spLocks noGrp="1"/>
           </p:cNvSpPr>
@@ -1576,7 +1696,12 @@
             <p:ph sz="quarter" idx="4"/>
           </p:nvPr>
         </p:nvSpPr>
-        <p:spPr/>
+        <p:spPr>
+          <a:xfrm>
+            <a:off x="4645025" y="2174875"/>
+            <a:ext cx="4041775" cy="3951288"/>
+          </a:xfrm>
+        </p:spPr>
         <p:txBody>
           <a:bodyPr/>
           <a:lstStyle>
@@ -1609,6 +1734,7 @@
             </a:lvl9pPr>
           </a:lstStyle>
           <a:p>
+            <a:pPr lvl="0"/>
             <a:r>
               <a:rPr lang="en-US" smtClean="0"/>
               <a:t>Click to edit Master text styles</a:t>
@@ -1647,12 +1773,12 @@
       </p:sp>
       <p:sp>
         <p:nvSpPr>
-          <p:cNvPr id="7" name="Date Placeholder 6" title=""/>
-          <p:cNvSpPr>
-            <a:spLocks noGrp="1"/>
-          </p:cNvSpPr>
-          <p:nvPr>
-            <p:ph type="dt" sz="half" idx="5"/>
+          <p:cNvPr id="7" name="Date Placeholder 6"/>
+          <p:cNvSpPr>
+            <a:spLocks noGrp="1"/>
+          </p:cNvSpPr>
+          <p:nvPr>
+            <p:ph type="dt" sz="half" idx="10"/>
           </p:nvPr>
         </p:nvSpPr>
         <p:spPr/>
@@ -1660,9 +1786,10 @@
           <a:bodyPr/>
           <a:lstStyle/>
           <a:p>
-            <a:fld id="{7C125CD7-A9FF-4BEC-87ED-E864DDF73628}" type="datetimeFigureOut">
-              <a:rPr lang="en-US" smtClean="0"/>
-              <a:t>11/7/2009</a:t>
+            <a:fld id="{1D8BD707-D9CF-40AE-B4C6-C98DA3205C09}" type="datetimeFigureOut">
+              <a:rPr lang="en-US" smtClean="0"/>
+              <a:pPr/>
+              <a:t>8/1/2011</a:t>
             </a:fld>
             <a:endParaRPr lang="en-US"/>
           </a:p>
@@ -1670,12 +1797,12 @@
       </p:sp>
       <p:sp>
         <p:nvSpPr>
-          <p:cNvPr id="8" name="Footer Placeholder 7" title=""/>
-          <p:cNvSpPr>
-            <a:spLocks noGrp="1"/>
-          </p:cNvSpPr>
-          <p:nvPr>
-            <p:ph type="ftr" sz="quarter" idx="6"/>
+          <p:cNvPr id="8" name="Footer Placeholder 7"/>
+          <p:cNvSpPr>
+            <a:spLocks noGrp="1"/>
+          </p:cNvSpPr>
+          <p:nvPr>
+            <p:ph type="ftr" sz="quarter" idx="11"/>
           </p:nvPr>
         </p:nvSpPr>
         <p:spPr/>
@@ -1689,12 +1816,12 @@
       </p:sp>
       <p:sp>
         <p:nvSpPr>
-          <p:cNvPr id="9" name="Slide Number Placeholder 8" title=""/>
-          <p:cNvSpPr>
-            <a:spLocks noGrp="1"/>
-          </p:cNvSpPr>
-          <p:nvPr>
-            <p:ph type="sldNum" sz="quarter" idx="7"/>
+          <p:cNvPr id="9" name="Slide Number Placeholder 8"/>
+          <p:cNvSpPr>
+            <a:spLocks noGrp="1"/>
+          </p:cNvSpPr>
+          <p:nvPr>
+            <p:ph type="sldNum" sz="quarter" idx="12"/>
           </p:nvPr>
         </p:nvSpPr>
         <p:spPr/>
@@ -1702,8 +1829,9 @@
           <a:bodyPr/>
           <a:lstStyle/>
           <a:p>
-            <a:fld id="{93AE1883-0942-4AA3-9DB2-9C7C3A0314B1}" type="slidenum">
-              <a:rPr lang="en-US" smtClean="0"/>
+            <a:fld id="{B6F15528-21DE-4FAA-801E-634DDDAF4B2B}" type="slidenum">
+              <a:rPr lang="en-US" smtClean="0"/>
+              <a:pPr/>
               <a:t>‹#›</a:t>
             </a:fld>
             <a:endParaRPr lang="en-US"/>
@@ -1715,17 +1843,15 @@
   <p:clrMapOvr>
     <a:masterClrMapping/>
   </p:clrMapOvr>
-  <p:transition/>
-  <p:timing/>
 </p:sldLayout>
 </file>
 
 <file path=ppt/slideLayouts/slideLayout6.xml><?xml version="1.0" encoding="utf-8"?>
-<p:sldLayout xmlns:a="http://schemas.openxmlformats.org/drawingml/2006/main" xmlns:r="http://schemas.openxmlformats.org/officeDocument/2006/relationships" xmlns:m="http://schemas.openxmlformats.org/officeDocument/2006/math" xmlns:w="http://schemas.openxmlformats.org/wordprocessingml/2006/main" xmlns:wp="http://schemas.openxmlformats.org/drawingml/2006/wordprocessingDrawing" xmlns:a14="http://schemas.microsoft.com/office/drawing/2010/main" xmlns:mc="http://schemas.openxmlformats.org/markup-compatibility/2006" xmlns:p14="http://schemas.microsoft.com/office/powerpoint/2010/main" xmlns:p15="http://schemas.microsoft.com/office/powerpoint/2012/main" xmlns:p159="http://schemas.microsoft.com/office/powerpoint/2015/09/main" xmlns:p="http://schemas.openxmlformats.org/presentationml/2006/main" type="titleOnly" preserve="1">
+<p:sldLayout xmlns:a="http://schemas.openxmlformats.org/drawingml/2006/main" xmlns:r="http://schemas.openxmlformats.org/officeDocument/2006/relationships" xmlns:p="http://schemas.openxmlformats.org/presentationml/2006/main" type="titleOnly" preserve="1">
   <p:cSld name="Title Only">
     <p:spTree>
       <p:nvGrpSpPr>
-        <p:cNvPr id="1" name="" title=""/>
+        <p:cNvPr id="1" name=""/>
         <p:cNvGrpSpPr/>
         <p:nvPr/>
       </p:nvGrpSpPr>
@@ -1733,11 +1859,13 @@
         <a:xfrm>
           <a:off x="0" y="0"/>
           <a:ext cx="0" cy="0"/>
+          <a:chOff x="0" y="0"/>
+          <a:chExt cx="0" cy="0"/>
         </a:xfrm>
       </p:grpSpPr>
       <p:sp>
         <p:nvSpPr>
-          <p:cNvPr id="2" name="Title 1" title=""/>
+          <p:cNvPr id="2" name="Title 1"/>
           <p:cNvSpPr>
             <a:spLocks noGrp="1"/>
           </p:cNvSpPr>
@@ -1760,12 +1888,12 @@
       </p:sp>
       <p:sp>
         <p:nvSpPr>
-          <p:cNvPr id="3" name="Date Placeholder 2" title=""/>
-          <p:cNvSpPr>
-            <a:spLocks noGrp="1"/>
-          </p:cNvSpPr>
-          <p:nvPr>
-            <p:ph type="dt" sz="half" idx="1"/>
+          <p:cNvPr id="3" name="Date Placeholder 2"/>
+          <p:cNvSpPr>
+            <a:spLocks noGrp="1"/>
+          </p:cNvSpPr>
+          <p:nvPr>
+            <p:ph type="dt" sz="half" idx="10"/>
           </p:nvPr>
         </p:nvSpPr>
         <p:spPr/>
@@ -1773,9 +1901,10 @@
           <a:bodyPr/>
           <a:lstStyle/>
           <a:p>
-            <a:fld id="{5073F2A2-7523-47A2-8A4A-7B9E3505FDD2}" type="datetimeFigureOut">
-              <a:rPr lang="en-US" smtClean="0"/>
-              <a:t>11/7/2009</a:t>
+            <a:fld id="{1D8BD707-D9CF-40AE-B4C6-C98DA3205C09}" type="datetimeFigureOut">
+              <a:rPr lang="en-US" smtClean="0"/>
+              <a:pPr/>
+              <a:t>8/1/2011</a:t>
             </a:fld>
             <a:endParaRPr lang="en-US"/>
           </a:p>
@@ -1783,12 +1912,12 @@
       </p:sp>
       <p:sp>
         <p:nvSpPr>
-          <p:cNvPr id="4" name="Footer Placeholder 3" title=""/>
-          <p:cNvSpPr>
-            <a:spLocks noGrp="1"/>
-          </p:cNvSpPr>
-          <p:nvPr>
-            <p:ph type="ftr" sz="quarter" idx="2"/>
+          <p:cNvPr id="4" name="Footer Placeholder 3"/>
+          <p:cNvSpPr>
+            <a:spLocks noGrp="1"/>
+          </p:cNvSpPr>
+          <p:nvPr>
+            <p:ph type="ftr" sz="quarter" idx="11"/>
           </p:nvPr>
         </p:nvSpPr>
         <p:spPr/>
@@ -1802,12 +1931,12 @@
       </p:sp>
       <p:sp>
         <p:nvSpPr>
-          <p:cNvPr id="5" name="Slide Number Placeholder 4" title=""/>
-          <p:cNvSpPr>
-            <a:spLocks noGrp="1"/>
-          </p:cNvSpPr>
-          <p:nvPr>
-            <p:ph type="sldNum" sz="quarter" idx="3"/>
+          <p:cNvPr id="5" name="Slide Number Placeholder 4"/>
+          <p:cNvSpPr>
+            <a:spLocks noGrp="1"/>
+          </p:cNvSpPr>
+          <p:nvPr>
+            <p:ph type="sldNum" sz="quarter" idx="12"/>
           </p:nvPr>
         </p:nvSpPr>
         <p:spPr/>
@@ -1815,8 +1944,9 @@
           <a:bodyPr/>
           <a:lstStyle/>
           <a:p>
-            <a:fld id="{93AE1883-0942-4AA3-9DB2-9C7C3A0314B1}" type="slidenum">
-              <a:rPr lang="en-US" smtClean="0"/>
+            <a:fld id="{B6F15528-21DE-4FAA-801E-634DDDAF4B2B}" type="slidenum">
+              <a:rPr lang="en-US" smtClean="0"/>
+              <a:pPr/>
               <a:t>‹#›</a:t>
             </a:fld>
             <a:endParaRPr lang="en-US"/>
@@ -1828,17 +1958,15 @@
   <p:clrMapOvr>
     <a:masterClrMapping/>
   </p:clrMapOvr>
-  <p:transition/>
-  <p:timing/>
 </p:sldLayout>
 </file>
 
 <file path=ppt/slideLayouts/slideLayout7.xml><?xml version="1.0" encoding="utf-8"?>
-<p:sldLayout xmlns:a="http://schemas.openxmlformats.org/drawingml/2006/main" xmlns:r="http://schemas.openxmlformats.org/officeDocument/2006/relationships" xmlns:m="http://schemas.openxmlformats.org/officeDocument/2006/math" xmlns:w="http://schemas.openxmlformats.org/wordprocessingml/2006/main" xmlns:wp="http://schemas.openxmlformats.org/drawingml/2006/wordprocessingDrawing" xmlns:a14="http://schemas.microsoft.com/office/drawing/2010/main" xmlns:mc="http://schemas.openxmlformats.org/markup-compatibility/2006" xmlns:p14="http://schemas.microsoft.com/office/powerpoint/2010/main" xmlns:p15="http://schemas.microsoft.com/office/powerpoint/2012/main" xmlns:p159="http://schemas.microsoft.com/office/powerpoint/2015/09/main" xmlns:p="http://schemas.openxmlformats.org/presentationml/2006/main" type="blank" preserve="1">
+<p:sldLayout xmlns:a="http://schemas.openxmlformats.org/drawingml/2006/main" xmlns:r="http://schemas.openxmlformats.org/officeDocument/2006/relationships" xmlns:p="http://schemas.openxmlformats.org/presentationml/2006/main" type="blank" preserve="1">
   <p:cSld name="Blank">
     <p:spTree>
       <p:nvGrpSpPr>
-        <p:cNvPr id="1" name="" title=""/>
+        <p:cNvPr id="1" name=""/>
         <p:cNvGrpSpPr/>
         <p:nvPr/>
       </p:nvGrpSpPr>
@@ -1846,16 +1974,18 @@
         <a:xfrm>
           <a:off x="0" y="0"/>
           <a:ext cx="0" cy="0"/>
+          <a:chOff x="0" y="0"/>
+          <a:chExt cx="0" cy="0"/>
         </a:xfrm>
       </p:grpSpPr>
       <p:sp>
         <p:nvSpPr>
-          <p:cNvPr id="2" name="Date Placeholder 1" title=""/>
-          <p:cNvSpPr>
-            <a:spLocks noGrp="1"/>
-          </p:cNvSpPr>
-          <p:nvPr>
-            <p:ph type="dt" sz="half"/>
+          <p:cNvPr id="2" name="Date Placeholder 1"/>
+          <p:cNvSpPr>
+            <a:spLocks noGrp="1"/>
+          </p:cNvSpPr>
+          <p:nvPr>
+            <p:ph type="dt" sz="half" idx="10"/>
           </p:nvPr>
         </p:nvSpPr>
         <p:spPr/>
@@ -1863,9 +1993,10 @@
           <a:bodyPr/>
           <a:lstStyle/>
           <a:p>
-            <a:fld id="{2E769593-E2C5-4151-81B4-20BE9DFE7111}" type="datetimeFigureOut">
-              <a:rPr lang="en-US" smtClean="0"/>
-              <a:t>11/7/2009</a:t>
+            <a:fld id="{1D8BD707-D9CF-40AE-B4C6-C98DA3205C09}" type="datetimeFigureOut">
+              <a:rPr lang="en-US" smtClean="0"/>
+              <a:pPr/>
+              <a:t>8/1/2011</a:t>
             </a:fld>
             <a:endParaRPr lang="en-US"/>
           </a:p>
@@ -1873,12 +2004,12 @@
       </p:sp>
       <p:sp>
         <p:nvSpPr>
-          <p:cNvPr id="3" name="Footer Placeholder 2" title=""/>
-          <p:cNvSpPr>
-            <a:spLocks noGrp="1"/>
-          </p:cNvSpPr>
-          <p:nvPr>
-            <p:ph type="ftr" sz="quarter" idx="1"/>
+          <p:cNvPr id="3" name="Footer Placeholder 2"/>
+          <p:cNvSpPr>
+            <a:spLocks noGrp="1"/>
+          </p:cNvSpPr>
+          <p:nvPr>
+            <p:ph type="ftr" sz="quarter" idx="11"/>
           </p:nvPr>
         </p:nvSpPr>
         <p:spPr/>
@@ -1892,12 +2023,12 @@
       </p:sp>
       <p:sp>
         <p:nvSpPr>
-          <p:cNvPr id="4" name="Slide Number Placeholder 3" title=""/>
-          <p:cNvSpPr>
-            <a:spLocks noGrp="1"/>
-          </p:cNvSpPr>
-          <p:nvPr>
-            <p:ph type="sldNum" sz="quarter" idx="2"/>
+          <p:cNvPr id="4" name="Slide Number Placeholder 3"/>
+          <p:cNvSpPr>
+            <a:spLocks noGrp="1"/>
+          </p:cNvSpPr>
+          <p:nvPr>
+            <p:ph type="sldNum" sz="quarter" idx="12"/>
           </p:nvPr>
         </p:nvSpPr>
         <p:spPr/>
@@ -1905,8 +2036,9 @@
           <a:bodyPr/>
           <a:lstStyle/>
           <a:p>
-            <a:fld id="{93AE1883-0942-4AA3-9DB2-9C7C3A0314B1}" type="slidenum">
-              <a:rPr lang="en-US" smtClean="0"/>
+            <a:fld id="{B6F15528-21DE-4FAA-801E-634DDDAF4B2B}" type="slidenum">
+              <a:rPr lang="en-US" smtClean="0"/>
+              <a:pPr/>
               <a:t>‹#›</a:t>
             </a:fld>
             <a:endParaRPr lang="en-US"/>
@@ -1918,17 +2050,15 @@
   <p:clrMapOvr>
     <a:masterClrMapping/>
   </p:clrMapOvr>
-  <p:transition/>
-  <p:timing/>
 </p:sldLayout>
 </file>
 
 <file path=ppt/slideLayouts/slideLayout8.xml><?xml version="1.0" encoding="utf-8"?>
-<p:sldLayout xmlns:a="http://schemas.openxmlformats.org/drawingml/2006/main" xmlns:r="http://schemas.openxmlformats.org/officeDocument/2006/relationships" xmlns:m="http://schemas.openxmlformats.org/officeDocument/2006/math" xmlns:w="http://schemas.openxmlformats.org/wordprocessingml/2006/main" xmlns:wp="http://schemas.openxmlformats.org/drawingml/2006/wordprocessingDrawing" xmlns:a14="http://schemas.microsoft.com/office/drawing/2010/main" xmlns:mc="http://schemas.openxmlformats.org/markup-compatibility/2006" xmlns:p14="http://schemas.microsoft.com/office/powerpoint/2010/main" xmlns:p15="http://schemas.microsoft.com/office/powerpoint/2012/main" xmlns:p159="http://schemas.microsoft.com/office/powerpoint/2015/09/main" xmlns:p="http://schemas.openxmlformats.org/presentationml/2006/main" type="objTx" preserve="1">
+<p:sldLayout xmlns:a="http://schemas.openxmlformats.org/drawingml/2006/main" xmlns:r="http://schemas.openxmlformats.org/officeDocument/2006/relationships" xmlns:p="http://schemas.openxmlformats.org/presentationml/2006/main" type="objTx" preserve="1">
   <p:cSld name="Content with Caption">
     <p:spTree>
       <p:nvGrpSpPr>
-        <p:cNvPr id="1" name="" title=""/>
+        <p:cNvPr id="1" name=""/>
         <p:cNvGrpSpPr/>
         <p:nvPr/>
       </p:nvGrpSpPr>
@@ -1936,11 +2066,13 @@
         <a:xfrm>
           <a:off x="0" y="0"/>
           <a:ext cx="0" cy="0"/>
+          <a:chOff x="0" y="0"/>
+          <a:chExt cx="0" cy="0"/>
         </a:xfrm>
       </p:grpSpPr>
       <p:sp>
         <p:nvSpPr>
-          <p:cNvPr id="2" name="Title 1" title=""/>
+          <p:cNvPr id="2" name="Title 1"/>
           <p:cNvSpPr>
             <a:spLocks noGrp="1"/>
           </p:cNvSpPr>
@@ -1948,7 +2080,12 @@
             <p:ph type="title"/>
           </p:nvPr>
         </p:nvSpPr>
-        <p:spPr/>
+        <p:spPr>
+          <a:xfrm>
+            <a:off x="457200" y="273050"/>
+            <a:ext cx="3008313" cy="1162050"/>
+          </a:xfrm>
+        </p:spPr>
         <p:txBody>
           <a:bodyPr anchor="b"/>
           <a:lstStyle>
@@ -1967,7 +2104,7 @@
       </p:sp>
       <p:sp>
         <p:nvSpPr>
-          <p:cNvPr id="3" name="Content Placeholder 2" title=""/>
+          <p:cNvPr id="3" name="Content Placeholder 2"/>
           <p:cNvSpPr>
             <a:spLocks noGrp="1"/>
           </p:cNvSpPr>
@@ -1975,7 +2112,12 @@
             <p:ph idx="1"/>
           </p:nvPr>
         </p:nvSpPr>
-        <p:spPr/>
+        <p:spPr>
+          <a:xfrm>
+            <a:off x="3575050" y="273050"/>
+            <a:ext cx="5111750" cy="5853113"/>
+          </a:xfrm>
+        </p:spPr>
         <p:txBody>
           <a:bodyPr/>
           <a:lstStyle>
@@ -2008,6 +2150,7 @@
             </a:lvl9pPr>
           </a:lstStyle>
           <a:p>
+            <a:pPr lvl="0"/>
             <a:r>
               <a:rPr lang="en-US" smtClean="0"/>
               <a:t>Click to edit Master text styles</a:t>
@@ -2046,7 +2189,7 @@
       </p:sp>
       <p:sp>
         <p:nvSpPr>
-          <p:cNvPr id="4" name="Text Placeholder 3" title=""/>
+          <p:cNvPr id="4" name="Text Placeholder 3"/>
           <p:cNvSpPr>
             <a:spLocks noGrp="1"/>
           </p:cNvSpPr>
@@ -2054,7 +2197,12 @@
             <p:ph type="body" sz="half" idx="2"/>
           </p:nvPr>
         </p:nvSpPr>
-        <p:spPr/>
+        <p:spPr>
+          <a:xfrm>
+            <a:off x="457200" y="1435100"/>
+            <a:ext cx="3008313" cy="4691063"/>
+          </a:xfrm>
+        </p:spPr>
         <p:txBody>
           <a:bodyPr/>
           <a:lstStyle>
@@ -2096,6 +2244,7 @@
             </a:lvl9pPr>
           </a:lstStyle>
           <a:p>
+            <a:pPr lvl="0"/>
             <a:r>
               <a:rPr lang="en-US" smtClean="0"/>
               <a:t>Click to edit Master text styles</a:t>
@@ -2105,12 +2254,12 @@
       </p:sp>
       <p:sp>
         <p:nvSpPr>
-          <p:cNvPr id="5" name="Date Placeholder 4" title=""/>
-          <p:cNvSpPr>
-            <a:spLocks noGrp="1"/>
-          </p:cNvSpPr>
-          <p:nvPr>
-            <p:ph type="dt" sz="half" idx="3"/>
+          <p:cNvPr id="5" name="Date Placeholder 4"/>
+          <p:cNvSpPr>
+            <a:spLocks noGrp="1"/>
+          </p:cNvSpPr>
+          <p:nvPr>
+            <p:ph type="dt" sz="half" idx="10"/>
           </p:nvPr>
         </p:nvSpPr>
         <p:spPr/>
@@ -2118,9 +2267,10 @@
           <a:bodyPr/>
           <a:lstStyle/>
           <a:p>
-            <a:fld id="{AC32182E-E418-463E-91E6-84452B05A8A9}" type="datetimeFigureOut">
-              <a:rPr lang="en-US" smtClean="0"/>
-              <a:t>11/7/2009</a:t>
+            <a:fld id="{1D8BD707-D9CF-40AE-B4C6-C98DA3205C09}" type="datetimeFigureOut">
+              <a:rPr lang="en-US" smtClean="0"/>
+              <a:pPr/>
+              <a:t>8/1/2011</a:t>
             </a:fld>
             <a:endParaRPr lang="en-US"/>
           </a:p>
@@ -2128,12 +2278,12 @@
       </p:sp>
       <p:sp>
         <p:nvSpPr>
-          <p:cNvPr id="6" name="Footer Placeholder 5" title=""/>
-          <p:cNvSpPr>
-            <a:spLocks noGrp="1"/>
-          </p:cNvSpPr>
-          <p:nvPr>
-            <p:ph type="ftr" sz="quarter" idx="4"/>
+          <p:cNvPr id="6" name="Footer Placeholder 5"/>
+          <p:cNvSpPr>
+            <a:spLocks noGrp="1"/>
+          </p:cNvSpPr>
+          <p:nvPr>
+            <p:ph type="ftr" sz="quarter" idx="11"/>
           </p:nvPr>
         </p:nvSpPr>
         <p:spPr/>
@@ -2147,12 +2297,12 @@
       </p:sp>
       <p:sp>
         <p:nvSpPr>
-          <p:cNvPr id="7" name="Slide Number Placeholder 6" title=""/>
-          <p:cNvSpPr>
-            <a:spLocks noGrp="1"/>
-          </p:cNvSpPr>
-          <p:nvPr>
-            <p:ph type="sldNum" sz="quarter" idx="5"/>
+          <p:cNvPr id="7" name="Slide Number Placeholder 6"/>
+          <p:cNvSpPr>
+            <a:spLocks noGrp="1"/>
+          </p:cNvSpPr>
+          <p:nvPr>
+            <p:ph type="sldNum" sz="quarter" idx="12"/>
           </p:nvPr>
         </p:nvSpPr>
         <p:spPr/>
@@ -2160,8 +2310,9 @@
           <a:bodyPr/>
           <a:lstStyle/>
           <a:p>
-            <a:fld id="{93AE1883-0942-4AA3-9DB2-9C7C3A0314B1}" type="slidenum">
-              <a:rPr lang="en-US" smtClean="0"/>
+            <a:fld id="{B6F15528-21DE-4FAA-801E-634DDDAF4B2B}" type="slidenum">
+              <a:rPr lang="en-US" smtClean="0"/>
+              <a:pPr/>
               <a:t>‹#›</a:t>
             </a:fld>
             <a:endParaRPr lang="en-US"/>
@@ -2173,17 +2324,15 @@
   <p:clrMapOvr>
     <a:masterClrMapping/>
   </p:clrMapOvr>
-  <p:transition/>
-  <p:timing/>
 </p:sldLayout>
 </file>
 
 <file path=ppt/slideLayouts/slideLayout9.xml><?xml version="1.0" encoding="utf-8"?>
-<p:sldLayout xmlns:a="http://schemas.openxmlformats.org/drawingml/2006/main" xmlns:r="http://schemas.openxmlformats.org/officeDocument/2006/relationships" xmlns:m="http://schemas.openxmlformats.org/officeDocument/2006/math" xmlns:w="http://schemas.openxmlformats.org/wordprocessingml/2006/main" xmlns:wp="http://schemas.openxmlformats.org/drawingml/2006/wordprocessingDrawing" xmlns:a14="http://schemas.microsoft.com/office/drawing/2010/main" xmlns:mc="http://schemas.openxmlformats.org/markup-compatibility/2006" xmlns:p14="http://schemas.microsoft.com/office/powerpoint/2010/main" xmlns:p15="http://schemas.microsoft.com/office/powerpoint/2012/main" xmlns:p159="http://schemas.microsoft.com/office/powerpoint/2015/09/main" xmlns:p="http://schemas.openxmlformats.org/presentationml/2006/main" type="picTx" preserve="1">
+<p:sldLayout xmlns:a="http://schemas.openxmlformats.org/drawingml/2006/main" xmlns:r="http://schemas.openxmlformats.org/officeDocument/2006/relationships" xmlns:p="http://schemas.openxmlformats.org/presentationml/2006/main" type="picTx" preserve="1">
   <p:cSld name="Picture with Caption">
     <p:spTree>
       <p:nvGrpSpPr>
-        <p:cNvPr id="1" name="" title=""/>
+        <p:cNvPr id="1" name=""/>
         <p:cNvGrpSpPr/>
         <p:nvPr/>
       </p:nvGrpSpPr>
@@ -2191,11 +2340,13 @@
         <a:xfrm>
           <a:off x="0" y="0"/>
           <a:ext cx="0" cy="0"/>
+          <a:chOff x="0" y="0"/>
+          <a:chExt cx="0" cy="0"/>
         </a:xfrm>
       </p:grpSpPr>
       <p:sp>
         <p:nvSpPr>
-          <p:cNvPr id="2" name="Title 1" title=""/>
+          <p:cNvPr id="2" name="Title 1"/>
           <p:cNvSpPr>
             <a:spLocks noGrp="1"/>
           </p:cNvSpPr>
@@ -2203,7 +2354,12 @@
             <p:ph type="title"/>
           </p:nvPr>
         </p:nvSpPr>
-        <p:spPr/>
+        <p:spPr>
+          <a:xfrm>
+            <a:off x="1792288" y="4800600"/>
+            <a:ext cx="5486400" cy="566738"/>
+          </a:xfrm>
+        </p:spPr>
         <p:txBody>
           <a:bodyPr anchor="b"/>
           <a:lstStyle>
@@ -2222,7 +2378,7 @@
       </p:sp>
       <p:sp>
         <p:nvSpPr>
-          <p:cNvPr id="3" name="Picture Placeholder 2" title=""/>
+          <p:cNvPr id="3" name="Picture Placeholder 2"/>
           <p:cNvSpPr>
             <a:spLocks noGrp="1"/>
           </p:cNvSpPr>
@@ -2230,7 +2386,12 @@
             <p:ph type="pic" idx="1"/>
           </p:nvPr>
         </p:nvSpPr>
-        <p:spPr/>
+        <p:spPr>
+          <a:xfrm>
+            <a:off x="1792288" y="612775"/>
+            <a:ext cx="5486400" cy="4114800"/>
+          </a:xfrm>
+        </p:spPr>
         <p:txBody>
           <a:bodyPr/>
           <a:lstStyle>
@@ -2278,7 +2439,7 @@
       </p:sp>
       <p:sp>
         <p:nvSpPr>
-          <p:cNvPr id="4" name="Text Placeholder 3" title=""/>
+          <p:cNvPr id="4" name="Text Placeholder 3"/>
           <p:cNvSpPr>
             <a:spLocks noGrp="1"/>
           </p:cNvSpPr>
@@ -2286,7 +2447,12 @@
             <p:ph type="body" sz="half" idx="2"/>
           </p:nvPr>
         </p:nvSpPr>
-        <p:spPr/>
+        <p:spPr>
+          <a:xfrm>
+            <a:off x="1792288" y="5367338"/>
+            <a:ext cx="5486400" cy="804862"/>
+          </a:xfrm>
+        </p:spPr>
         <p:txBody>
           <a:bodyPr/>
           <a:lstStyle>
@@ -2328,6 +2494,7 @@
             </a:lvl9pPr>
           </a:lstStyle>
           <a:p>
+            <a:pPr lvl="0"/>
             <a:r>
               <a:rPr lang="en-US" smtClean="0"/>
               <a:t>Click to edit Master text styles</a:t>
@@ -2337,12 +2504,12 @@
       </p:sp>
       <p:sp>
         <p:nvSpPr>
-          <p:cNvPr id="5" name="Date Placeholder 4" title=""/>
-          <p:cNvSpPr>
-            <a:spLocks noGrp="1"/>
-          </p:cNvSpPr>
-          <p:nvPr>
-            <p:ph type="dt" sz="half" idx="3"/>
+          <p:cNvPr id="5" name="Date Placeholder 4"/>
+          <p:cNvSpPr>
+            <a:spLocks noGrp="1"/>
+          </p:cNvSpPr>
+          <p:nvPr>
+            <p:ph type="dt" sz="half" idx="10"/>
           </p:nvPr>
         </p:nvSpPr>
         <p:spPr/>
@@ -2350,9 +2517,10 @@
           <a:bodyPr/>
           <a:lstStyle/>
           <a:p>
-            <a:fld id="{A3176F13-43A8-4FDF-938A-44B24CBD7309}" type="datetimeFigureOut">
-              <a:rPr lang="en-US" smtClean="0"/>
-              <a:t>11/7/2009</a:t>
+            <a:fld id="{1D8BD707-D9CF-40AE-B4C6-C98DA3205C09}" type="datetimeFigureOut">
+              <a:rPr lang="en-US" smtClean="0"/>
+              <a:pPr/>
+              <a:t>8/1/2011</a:t>
             </a:fld>
             <a:endParaRPr lang="en-US"/>
           </a:p>
@@ -2360,12 +2528,12 @@
       </p:sp>
       <p:sp>
         <p:nvSpPr>
-          <p:cNvPr id="6" name="Footer Placeholder 5" title=""/>
-          <p:cNvSpPr>
-            <a:spLocks noGrp="1"/>
-          </p:cNvSpPr>
-          <p:nvPr>
-            <p:ph type="ftr" sz="quarter" idx="4"/>
+          <p:cNvPr id="6" name="Footer Placeholder 5"/>
+          <p:cNvSpPr>
+            <a:spLocks noGrp="1"/>
+          </p:cNvSpPr>
+          <p:nvPr>
+            <p:ph type="ftr" sz="quarter" idx="11"/>
           </p:nvPr>
         </p:nvSpPr>
         <p:spPr/>
@@ -2379,12 +2547,12 @@
       </p:sp>
       <p:sp>
         <p:nvSpPr>
-          <p:cNvPr id="7" name="Slide Number Placeholder 6" title=""/>
-          <p:cNvSpPr>
-            <a:spLocks noGrp="1"/>
-          </p:cNvSpPr>
-          <p:nvPr>
-            <p:ph type="sldNum" sz="quarter" idx="5"/>
+          <p:cNvPr id="7" name="Slide Number Placeholder 6"/>
+          <p:cNvSpPr>
+            <a:spLocks noGrp="1"/>
+          </p:cNvSpPr>
+          <p:nvPr>
+            <p:ph type="sldNum" sz="quarter" idx="12"/>
           </p:nvPr>
         </p:nvSpPr>
         <p:spPr/>
@@ -2392,8 +2560,9 @@
           <a:bodyPr/>
           <a:lstStyle/>
           <a:p>
-            <a:fld id="{93AE1883-0942-4AA3-9DB2-9C7C3A0314B1}" type="slidenum">
-              <a:rPr lang="en-US" smtClean="0"/>
+            <a:fld id="{B6F15528-21DE-4FAA-801E-634DDDAF4B2B}" type="slidenum">
+              <a:rPr lang="en-US" smtClean="0"/>
+              <a:pPr/>
               <a:t>‹#›</a:t>
             </a:fld>
             <a:endParaRPr lang="en-US"/>
@@ -2405,13 +2574,11 @@
   <p:clrMapOvr>
     <a:masterClrMapping/>
   </p:clrMapOvr>
-  <p:transition/>
-  <p:timing/>
 </p:sldLayout>
 </file>
 
 <file path=ppt/slideMasters/slideMaster1.xml><?xml version="1.0" encoding="utf-8"?>
-<p:sldMaster xmlns:a="http://schemas.openxmlformats.org/drawingml/2006/main" xmlns:r="http://schemas.openxmlformats.org/officeDocument/2006/relationships" xmlns:m="http://schemas.openxmlformats.org/officeDocument/2006/math" xmlns:w="http://schemas.openxmlformats.org/wordprocessingml/2006/main" xmlns:wp="http://schemas.openxmlformats.org/drawingml/2006/wordprocessingDrawing" xmlns:a14="http://schemas.microsoft.com/office/drawing/2010/main" xmlns:mc="http://schemas.openxmlformats.org/markup-compatibility/2006" xmlns:p14="http://schemas.microsoft.com/office/powerpoint/2010/main" xmlns:p15="http://schemas.microsoft.com/office/powerpoint/2012/main" xmlns:p159="http://schemas.microsoft.com/office/powerpoint/2015/09/main" xmlns:p="http://schemas.openxmlformats.org/presentationml/2006/main">
+<p:sldMaster xmlns:a="http://schemas.openxmlformats.org/drawingml/2006/main" xmlns:r="http://schemas.openxmlformats.org/officeDocument/2006/relationships" xmlns:p="http://schemas.openxmlformats.org/presentationml/2006/main">
   <p:cSld>
     <p:bg>
       <p:bgRef idx="1001">
@@ -2420,7 +2587,7 @@
     </p:bg>
     <p:spTree>
       <p:nvGrpSpPr>
-        <p:cNvPr id="1" name="" title=""/>
+        <p:cNvPr id="1" name=""/>
         <p:cNvGrpSpPr/>
         <p:nvPr/>
       </p:nvGrpSpPr>
@@ -2428,11 +2595,13 @@
         <a:xfrm>
           <a:off x="0" y="0"/>
           <a:ext cx="0" cy="0"/>
+          <a:chOff x="0" y="0"/>
+          <a:chExt cx="0" cy="0"/>
         </a:xfrm>
       </p:grpSpPr>
       <p:sp>
         <p:nvSpPr>
-          <p:cNvPr id="2" name="Title Placeholder 1" title=""/>
+          <p:cNvPr id="2" name="Title Placeholder 1"/>
           <p:cNvSpPr>
             <a:spLocks noGrp="1"/>
           </p:cNvSpPr>
@@ -2465,7 +2634,7 @@
       </p:sp>
       <p:sp>
         <p:nvSpPr>
-          <p:cNvPr id="3" name="Text Placeholder 2" title=""/>
+          <p:cNvPr id="3" name="Text Placeholder 2"/>
           <p:cNvSpPr>
             <a:spLocks noGrp="1"/>
           </p:cNvSpPr>
@@ -2488,6 +2657,7 @@
           </a:bodyPr>
           <a:lstStyle/>
           <a:p>
+            <a:pPr lvl="0"/>
             <a:r>
               <a:rPr lang="en-US" smtClean="0"/>
               <a:t>Click to edit Master text styles</a:t>
@@ -2526,7 +2696,7 @@
       </p:sp>
       <p:sp>
         <p:nvSpPr>
-          <p:cNvPr id="4" name="Date Placeholder 3" title=""/>
+          <p:cNvPr id="4" name="Date Placeholder 3"/>
           <p:cNvSpPr>
             <a:spLocks noGrp="1"/>
           </p:cNvSpPr>
@@ -2557,9 +2727,10 @@
             </a:lvl1pPr>
           </a:lstStyle>
           <a:p>
-            <a:fld id="{E8FD0B7A-F5DD-4F40-B4CB-3B2C354B893A}" type="datetimeFigureOut">
-              <a:rPr lang="en-US" smtClean="0"/>
-              <a:t>11/7/2009</a:t>
+            <a:fld id="{1D8BD707-D9CF-40AE-B4C6-C98DA3205C09}" type="datetimeFigureOut">
+              <a:rPr lang="en-US" smtClean="0"/>
+              <a:pPr/>
+              <a:t>8/1/2011</a:t>
             </a:fld>
             <a:endParaRPr lang="en-US"/>
           </a:p>
@@ -2567,7 +2738,7 @@
       </p:sp>
       <p:sp>
         <p:nvSpPr>
-          <p:cNvPr id="5" name="Footer Placeholder 4" title=""/>
+          <p:cNvPr id="5" name="Footer Placeholder 4"/>
           <p:cNvSpPr>
             <a:spLocks noGrp="1"/>
           </p:cNvSpPr>
@@ -2604,7 +2775,7 @@
       </p:sp>
       <p:sp>
         <p:nvSpPr>
-          <p:cNvPr id="6" name="Slide Number Placeholder 5" title=""/>
+          <p:cNvPr id="6" name="Slide Number Placeholder 5"/>
           <p:cNvSpPr>
             <a:spLocks noGrp="1"/>
           </p:cNvSpPr>
@@ -2635,8 +2806,9 @@
             </a:lvl1pPr>
           </a:lstStyle>
           <a:p>
-            <a:fld id="{93AE1883-0942-4AA3-9DB2-9C7C3A0314B1}" type="slidenum">
-              <a:rPr lang="en-US" smtClean="0"/>
+            <a:fld id="{B6F15528-21DE-4FAA-801E-634DDDAF4B2B}" type="slidenum">
+              <a:rPr lang="en-US" smtClean="0"/>
+              <a:pPr/>
               <a:t>‹#›</a:t>
             </a:fld>
             <a:endParaRPr lang="en-US"/>
@@ -2659,8 +2831,6 @@
     <p:sldLayoutId id="2147483658" r:id="rId10"/>
     <p:sldLayoutId id="2147483659" r:id="rId11"/>
   </p:sldLayoutIdLst>
-  <p:transition/>
-  <p:timing/>
   <p:txStyles>
     <p:titleStyle>
       <a:lvl1pPr algn="ctr" defTabSz="914400" rtl="0" eaLnBrk="1" latinLnBrk="0" hangingPunct="1">
@@ -2915,11 +3085,11 @@
 </file>
 
 <file path=ppt/slides/slide1.xml><?xml version="1.0" encoding="utf-8"?>
-<p:sld xmlns:a="http://schemas.openxmlformats.org/drawingml/2006/main" xmlns:r="http://schemas.openxmlformats.org/officeDocument/2006/relationships" xmlns:m="http://schemas.openxmlformats.org/officeDocument/2006/math" xmlns:w="http://schemas.openxmlformats.org/wordprocessingml/2006/main" xmlns:wp="http://schemas.openxmlformats.org/drawingml/2006/wordprocessingDrawing" xmlns:a14="http://schemas.microsoft.com/office/drawing/2010/main" xmlns:mc="http://schemas.openxmlformats.org/markup-compatibility/2006" xmlns:p14="http://schemas.microsoft.com/office/powerpoint/2010/main" xmlns:p15="http://schemas.microsoft.com/office/powerpoint/2012/main" xmlns:p159="http://schemas.microsoft.com/office/powerpoint/2015/09/main" xmlns:p="http://schemas.openxmlformats.org/presentationml/2006/main">
-  <p:cSld name="">
+<p:sld xmlns:p="http://schemas.openxmlformats.org/presentationml/2006/main" xmlns:a="http://schemas.openxmlformats.org/drawingml/2006/main" xmlns:r="http://schemas.openxmlformats.org/officeDocument/2006/relationships">
+  <p:cSld>
     <p:spTree>
       <p:nvGrpSpPr>
-        <p:cNvPr id="1" name="" title=""/>
+        <p:cNvPr id="1" name=""/>
         <p:cNvGrpSpPr/>
         <p:nvPr/>
       </p:nvGrpSpPr>
@@ -2927,50 +3097,2563 @@
         <a:xfrm>
           <a:off x="0" y="0"/>
           <a:ext cx="0" cy="0"/>
+          <a:chOff x="0" y="0"/>
+          <a:chExt cx="0" cy="0"/>
         </a:xfrm>
       </p:grpSpPr>
-      <p:sp>
-        <p:nvSpPr>
-          <p:cNvPr id="2" name="New shape" title=""/>
+      <p:grpSp>
+        <p:nvGrpSpPr>
+          <p:cNvPr name="Group 2" id="2"/>
+          <p:cNvGrpSpPr/>
+          <p:nvPr/>
+        </p:nvGrpSpPr>
+        <p:grpSpPr>
+          <a:xfrm rot="0">
+            <a:off x="22011467" y="13041308"/>
+            <a:ext cx="9167729" cy="9554286"/>
+            <a:chOff x="0" y="0"/>
+            <a:chExt cx="6350000" cy="6350000"/>
+          </a:xfrm>
+        </p:grpSpPr>
+        <p:sp>
+          <p:nvSpPr>
+            <p:cNvPr name="Freeform 3" id="3"/>
+            <p:cNvSpPr/>
+            <p:nvPr/>
+          </p:nvSpPr>
+          <p:spPr>
+            <a:xfrm>
+              <a:off x="14167" y="0"/>
+              <a:ext cx="6321665" cy="6350000"/>
+            </a:xfrm>
+            <a:custGeom>
+              <a:avLst/>
+              <a:gdLst/>
+              <a:ahLst/>
+              <a:cxnLst/>
+              <a:rect r="r" b="b" t="t" l="l"/>
+              <a:pathLst>
+                <a:path h="6350000" w="6321665">
+                  <a:moveTo>
+                    <a:pt x="3160833" y="0"/>
+                  </a:moveTo>
+                  <a:lnTo>
+                    <a:pt x="3160833" y="0"/>
+                  </a:lnTo>
+                  <a:cubicBezTo>
+                    <a:pt x="4908795" y="7817"/>
+                    <a:pt x="6321666" y="1427021"/>
+                    <a:pt x="6321666" y="3175000"/>
+                  </a:cubicBezTo>
+                  <a:cubicBezTo>
+                    <a:pt x="6321666" y="4922979"/>
+                    <a:pt x="4908795" y="6342183"/>
+                    <a:pt x="3160833" y="6350000"/>
+                  </a:cubicBezTo>
+                  <a:cubicBezTo>
+                    <a:pt x="1412871" y="6342183"/>
+                    <a:pt x="0" y="4922979"/>
+                    <a:pt x="0" y="3175000"/>
+                  </a:cubicBezTo>
+                  <a:cubicBezTo>
+                    <a:pt x="0" y="1427021"/>
+                    <a:pt x="1412871" y="7817"/>
+                    <a:pt x="3160833" y="0"/>
+                  </a:cubicBezTo>
+                  <a:close/>
+                </a:path>
+              </a:pathLst>
+            </a:custGeom>
+            <a:solidFill>
+              <a:srgbClr val="986633">
+                <a:alpha val="33725"/>
+              </a:srgbClr>
+            </a:solidFill>
+          </p:spPr>
+        </p:sp>
+      </p:grpSp>
+      <p:grpSp>
+        <p:nvGrpSpPr>
+          <p:cNvPr name="Group 4" id="4"/>
+          <p:cNvGrpSpPr/>
+          <p:nvPr/>
+        </p:nvGrpSpPr>
+        <p:grpSpPr>
+          <a:xfrm rot="0">
+            <a:off x="-1115483" y="10093310"/>
+            <a:ext cx="6070942" cy="6070942"/>
+            <a:chOff x="0" y="0"/>
+            <a:chExt cx="6350000" cy="6350000"/>
+          </a:xfrm>
+        </p:grpSpPr>
+        <p:sp>
+          <p:nvSpPr>
+            <p:cNvPr name="Freeform 5" id="5"/>
+            <p:cNvSpPr/>
+            <p:nvPr/>
+          </p:nvSpPr>
+          <p:spPr>
+            <a:xfrm>
+              <a:off x="14167" y="0"/>
+              <a:ext cx="6321665" cy="6350000"/>
+            </a:xfrm>
+            <a:custGeom>
+              <a:avLst/>
+              <a:gdLst/>
+              <a:ahLst/>
+              <a:cxnLst/>
+              <a:rect r="r" b="b" t="t" l="l"/>
+              <a:pathLst>
+                <a:path h="6350000" w="6321665">
+                  <a:moveTo>
+                    <a:pt x="3160833" y="0"/>
+                  </a:moveTo>
+                  <a:lnTo>
+                    <a:pt x="3160833" y="0"/>
+                  </a:lnTo>
+                  <a:cubicBezTo>
+                    <a:pt x="4908795" y="7817"/>
+                    <a:pt x="6321666" y="1427021"/>
+                    <a:pt x="6321666" y="3175000"/>
+                  </a:cubicBezTo>
+                  <a:cubicBezTo>
+                    <a:pt x="6321666" y="4922979"/>
+                    <a:pt x="4908795" y="6342183"/>
+                    <a:pt x="3160833" y="6350000"/>
+                  </a:cubicBezTo>
+                  <a:cubicBezTo>
+                    <a:pt x="1412871" y="6342183"/>
+                    <a:pt x="0" y="4922979"/>
+                    <a:pt x="0" y="3175000"/>
+                  </a:cubicBezTo>
+                  <a:cubicBezTo>
+                    <a:pt x="0" y="1427021"/>
+                    <a:pt x="1412871" y="7817"/>
+                    <a:pt x="3160833" y="0"/>
+                  </a:cubicBezTo>
+                  <a:close/>
+                </a:path>
+              </a:pathLst>
+            </a:custGeom>
+            <a:solidFill>
+              <a:srgbClr val="A36448">
+                <a:alpha val="49804"/>
+              </a:srgbClr>
+            </a:solidFill>
+          </p:spPr>
+        </p:sp>
+      </p:grpSp>
+      <p:grpSp>
+        <p:nvGrpSpPr>
+          <p:cNvPr name="Group 6" id="6"/>
+          <p:cNvGrpSpPr/>
+          <p:nvPr/>
+        </p:nvGrpSpPr>
+        <p:grpSpPr>
+          <a:xfrm rot="0">
+            <a:off x="-175919" y="33835015"/>
+            <a:ext cx="6621260" cy="6621260"/>
+            <a:chOff x="0" y="0"/>
+            <a:chExt cx="6350000" cy="6350000"/>
+          </a:xfrm>
+        </p:grpSpPr>
+        <p:sp>
+          <p:nvSpPr>
+            <p:cNvPr name="Freeform 7" id="7"/>
+            <p:cNvSpPr/>
+            <p:nvPr/>
+          </p:nvSpPr>
+          <p:spPr>
+            <a:xfrm>
+              <a:off x="14167" y="0"/>
+              <a:ext cx="6321665" cy="6350000"/>
+            </a:xfrm>
+            <a:custGeom>
+              <a:avLst/>
+              <a:gdLst/>
+              <a:ahLst/>
+              <a:cxnLst/>
+              <a:rect r="r" b="b" t="t" l="l"/>
+              <a:pathLst>
+                <a:path h="6350000" w="6321665">
+                  <a:moveTo>
+                    <a:pt x="3160833" y="0"/>
+                  </a:moveTo>
+                  <a:lnTo>
+                    <a:pt x="3160833" y="0"/>
+                  </a:lnTo>
+                  <a:cubicBezTo>
+                    <a:pt x="4908795" y="7817"/>
+                    <a:pt x="6321666" y="1427021"/>
+                    <a:pt x="6321666" y="3175000"/>
+                  </a:cubicBezTo>
+                  <a:cubicBezTo>
+                    <a:pt x="6321666" y="4922979"/>
+                    <a:pt x="4908795" y="6342183"/>
+                    <a:pt x="3160833" y="6350000"/>
+                  </a:cubicBezTo>
+                  <a:cubicBezTo>
+                    <a:pt x="1412871" y="6342183"/>
+                    <a:pt x="0" y="4922979"/>
+                    <a:pt x="0" y="3175000"/>
+                  </a:cubicBezTo>
+                  <a:cubicBezTo>
+                    <a:pt x="0" y="1427021"/>
+                    <a:pt x="1412871" y="7817"/>
+                    <a:pt x="3160833" y="0"/>
+                  </a:cubicBezTo>
+                  <a:close/>
+                </a:path>
+              </a:pathLst>
+            </a:custGeom>
+            <a:solidFill>
+              <a:srgbClr val="E6B258">
+                <a:alpha val="49804"/>
+              </a:srgbClr>
+            </a:solidFill>
+          </p:spPr>
+        </p:sp>
+      </p:grpSp>
+      <p:sp>
+        <p:nvSpPr>
+          <p:cNvPr name="AutoShape 8" id="8"/>
           <p:cNvSpPr/>
           <p:nvPr/>
         </p:nvSpPr>
         <p:spPr>
-          <a:xfrm>
+          <a:xfrm rot="0">
             <a:off x="0" y="0"/>
-            <a:ext cx="12700000" cy="25400000"/>
-          </a:xfrm>
-          <a:prstGeom prst="rect">
-            <a:avLst/>
-          </a:prstGeom>
-          <a:blipFill>
-            <a:blip r:embed="rId2"/>
-            <a:stretch>
-              <a:fillRect/>
-            </a:stretch>
-          </a:blipFill>
-        </p:spPr>
-        <p:style>
-          <a:lnRef idx="2">
-            <a:schemeClr val="accent1">
-              <a:shade val="50000"/>
-            </a:schemeClr>
-          </a:lnRef>
-          <a:fillRef idx="1">
-            <a:schemeClr val="accent1"/>
-          </a:fillRef>
-          <a:effectRef idx="0">
-            <a:schemeClr val="accent1"/>
-          </a:effectRef>
-          <a:fontRef idx="minor">
-            <a:schemeClr val="lt1"/>
-          </a:fontRef>
-        </p:style>
-        <p:txBody>
-          <a:bodyPr rtlCol="0" anchor="ctr"/>
-          <a:lstStyle/>
-          <a:p>
-            <a:pPr algn="ctr"/>
+            <a:ext cx="35360890" cy="6876057"/>
+          </a:xfrm>
+          <a:prstGeom prst="rect">
+            <a:avLst/>
+          </a:prstGeom>
+          <a:solidFill>
+            <a:srgbClr val="986633">
+              <a:alpha val="19608"/>
+            </a:srgbClr>
+          </a:solidFill>
+        </p:spPr>
+      </p:sp>
+      <p:pic>
+        <p:nvPicPr>
+          <p:cNvPr name="Picture 9" id="9"/>
+          <p:cNvPicPr>
+            <a:picLocks noChangeAspect="true"/>
+          </p:cNvPicPr>
+          <p:nvPr/>
+        </p:nvPicPr>
+        <p:blipFill>
+          <a:blip r:embed="rId2">
+            <a:alphaModFix amt="56000"/>
+            <a:extLst>
+              <a:ext uri="{28A0092B-C50C-407E-A947-70E740481C1C}">
+                <a14:useLocalDpi xmlns:a14="http://schemas.microsoft.com/office/drawing/2010/main" val="0"/>
+              </a:ext>
+              <a:ext uri="{96DAC541-7B7A-43D3-8B79-37D633B846F1}">
+                <asvg:svgBlip xmlns:asvg="http://schemas.microsoft.com/office/drawing/2016/SVG/main" r:embed="rId3"/>
+              </a:ext>
+            </a:extLst>
+          </a:blip>
+          <a:srcRect l="0" t="0" r="0" b="0"/>
+          <a:stretch>
+            <a:fillRect/>
+          </a:stretch>
+        </p:blipFill>
+        <p:spPr>
+          <a:xfrm flipH="false" flipV="false" rot="0">
+            <a:off x="4895828" y="41160656"/>
+            <a:ext cx="5062651" cy="1643344"/>
+          </a:xfrm>
+          <a:prstGeom prst="rect">
+            <a:avLst/>
+          </a:prstGeom>
+        </p:spPr>
+      </p:pic>
+      <p:pic>
+        <p:nvPicPr>
+          <p:cNvPr name="Picture 10" id="10"/>
+          <p:cNvPicPr>
+            <a:picLocks noChangeAspect="true"/>
+          </p:cNvPicPr>
+          <p:nvPr/>
+        </p:nvPicPr>
+        <p:blipFill>
+          <a:blip r:embed="rId2">
+            <a:alphaModFix amt="56000"/>
+            <a:extLst>
+              <a:ext uri="{28A0092B-C50C-407E-A947-70E740481C1C}">
+                <a14:useLocalDpi xmlns:a14="http://schemas.microsoft.com/office/drawing/2010/main" val="0"/>
+              </a:ext>
+              <a:ext uri="{96DAC541-7B7A-43D3-8B79-37D633B846F1}">
+                <asvg:svgBlip xmlns:asvg="http://schemas.microsoft.com/office/drawing/2016/SVG/main" r:embed="rId3"/>
+              </a:ext>
+            </a:extLst>
+          </a:blip>
+          <a:srcRect l="0" t="0" r="0" b="0"/>
+          <a:stretch>
+            <a:fillRect/>
+          </a:stretch>
+        </p:blipFill>
+        <p:spPr>
+          <a:xfrm flipH="false" flipV="false" rot="0">
+            <a:off x="14273304" y="41160656"/>
+            <a:ext cx="5062651" cy="1643344"/>
+          </a:xfrm>
+          <a:prstGeom prst="rect">
+            <a:avLst/>
+          </a:prstGeom>
+        </p:spPr>
+      </p:pic>
+      <p:pic>
+        <p:nvPicPr>
+          <p:cNvPr name="Picture 11" id="11"/>
+          <p:cNvPicPr>
+            <a:picLocks noChangeAspect="true"/>
+          </p:cNvPicPr>
+          <p:nvPr/>
+        </p:nvPicPr>
+        <p:blipFill>
+          <a:blip r:embed="rId2">
+            <a:alphaModFix amt="56000"/>
+            <a:extLst>
+              <a:ext uri="{28A0092B-C50C-407E-A947-70E740481C1C}">
+                <a14:useLocalDpi xmlns:a14="http://schemas.microsoft.com/office/drawing/2010/main" val="0"/>
+              </a:ext>
+              <a:ext uri="{96DAC541-7B7A-43D3-8B79-37D633B846F1}">
+                <asvg:svgBlip xmlns:asvg="http://schemas.microsoft.com/office/drawing/2016/SVG/main" r:embed="rId3"/>
+              </a:ext>
+            </a:extLst>
+          </a:blip>
+          <a:srcRect l="0" t="0" r="0" b="0"/>
+          <a:stretch>
+            <a:fillRect/>
+          </a:stretch>
+        </p:blipFill>
+        <p:spPr>
+          <a:xfrm flipH="false" flipV="false" rot="0">
+            <a:off x="9569292" y="41160656"/>
+            <a:ext cx="5062651" cy="1643344"/>
+          </a:xfrm>
+          <a:prstGeom prst="rect">
+            <a:avLst/>
+          </a:prstGeom>
+        </p:spPr>
+      </p:pic>
+      <p:pic>
+        <p:nvPicPr>
+          <p:cNvPr name="Picture 12" id="12"/>
+          <p:cNvPicPr>
+            <a:picLocks noChangeAspect="true"/>
+          </p:cNvPicPr>
+          <p:nvPr/>
+        </p:nvPicPr>
+        <p:blipFill>
+          <a:blip r:embed="rId2">
+            <a:alphaModFix amt="56000"/>
+            <a:extLst>
+              <a:ext uri="{28A0092B-C50C-407E-A947-70E740481C1C}">
+                <a14:useLocalDpi xmlns:a14="http://schemas.microsoft.com/office/drawing/2010/main" val="0"/>
+              </a:ext>
+              <a:ext uri="{96DAC541-7B7A-43D3-8B79-37D633B846F1}">
+                <asvg:svgBlip xmlns:asvg="http://schemas.microsoft.com/office/drawing/2016/SVG/main" r:embed="rId3"/>
+              </a:ext>
+            </a:extLst>
+          </a:blip>
+          <a:srcRect l="0" t="0" r="0" b="0"/>
+          <a:stretch>
+            <a:fillRect/>
+          </a:stretch>
+        </p:blipFill>
+        <p:spPr>
+          <a:xfrm flipH="false" flipV="false" rot="0">
+            <a:off x="18929537" y="41160656"/>
+            <a:ext cx="5062651" cy="1643344"/>
+          </a:xfrm>
+          <a:prstGeom prst="rect">
+            <a:avLst/>
+          </a:prstGeom>
+        </p:spPr>
+      </p:pic>
+      <p:pic>
+        <p:nvPicPr>
+          <p:cNvPr name="Picture 13" id="13"/>
+          <p:cNvPicPr>
+            <a:picLocks noChangeAspect="true"/>
+          </p:cNvPicPr>
+          <p:nvPr/>
+        </p:nvPicPr>
+        <p:blipFill>
+          <a:blip r:embed="rId4">
+            <a:extLst>
+              <a:ext uri="{28A0092B-C50C-407E-A947-70E740481C1C}">
+                <a14:useLocalDpi xmlns:a14="http://schemas.microsoft.com/office/drawing/2010/main" val="0"/>
+              </a:ext>
+              <a:ext uri="{96DAC541-7B7A-43D3-8B79-37D633B846F1}">
+                <asvg:svgBlip xmlns:asvg="http://schemas.microsoft.com/office/drawing/2016/SVG/main" r:embed="rId5"/>
+              </a:ext>
+            </a:extLst>
+          </a:blip>
+          <a:srcRect l="0" t="0" r="0" b="0"/>
+          <a:stretch>
+            <a:fillRect/>
+          </a:stretch>
+        </p:blipFill>
+        <p:spPr>
+          <a:xfrm flipH="false" flipV="false" rot="0">
+            <a:off x="998639" y="23297420"/>
+            <a:ext cx="10988996" cy="2060437"/>
+          </a:xfrm>
+          <a:prstGeom prst="rect">
+            <a:avLst/>
+          </a:prstGeom>
+        </p:spPr>
+      </p:pic>
+      <p:pic>
+        <p:nvPicPr>
+          <p:cNvPr name="Picture 14" id="14"/>
+          <p:cNvPicPr>
+            <a:picLocks noChangeAspect="true"/>
+          </p:cNvPicPr>
+          <p:nvPr/>
+        </p:nvPicPr>
+        <p:blipFill>
+          <a:blip r:embed="rId6">
+            <a:extLst>
+              <a:ext uri="{28A0092B-C50C-407E-A947-70E740481C1C}">
+                <a14:useLocalDpi xmlns:a14="http://schemas.microsoft.com/office/drawing/2010/main" val="0"/>
+              </a:ext>
+              <a:ext uri="{96DAC541-7B7A-43D3-8B79-37D633B846F1}">
+                <asvg:svgBlip xmlns:asvg="http://schemas.microsoft.com/office/drawing/2016/SVG/main" r:embed="rId7"/>
+              </a:ext>
+            </a:extLst>
+          </a:blip>
+          <a:srcRect l="0" t="0" r="0" b="0"/>
+          <a:stretch>
+            <a:fillRect/>
+          </a:stretch>
+        </p:blipFill>
+        <p:spPr>
+          <a:xfrm flipH="false" flipV="false" rot="0">
+            <a:off x="16618323" y="24003483"/>
+            <a:ext cx="7684103" cy="1440769"/>
+          </a:xfrm>
+          <a:prstGeom prst="rect">
+            <a:avLst/>
+          </a:prstGeom>
+        </p:spPr>
+      </p:pic>
+      <p:pic>
+        <p:nvPicPr>
+          <p:cNvPr name="Picture 15" id="15"/>
+          <p:cNvPicPr>
+            <a:picLocks noChangeAspect="true"/>
+          </p:cNvPicPr>
+          <p:nvPr/>
+        </p:nvPicPr>
+        <p:blipFill>
+          <a:blip r:embed="rId6">
+            <a:extLst>
+              <a:ext uri="{28A0092B-C50C-407E-A947-70E740481C1C}">
+                <a14:useLocalDpi xmlns:a14="http://schemas.microsoft.com/office/drawing/2010/main" val="0"/>
+              </a:ext>
+              <a:ext uri="{96DAC541-7B7A-43D3-8B79-37D633B846F1}">
+                <asvg:svgBlip xmlns:asvg="http://schemas.microsoft.com/office/drawing/2016/SVG/main" r:embed="rId7"/>
+              </a:ext>
+            </a:extLst>
+          </a:blip>
+          <a:srcRect l="0" t="0" r="0" b="0"/>
+          <a:stretch>
+            <a:fillRect/>
+          </a:stretch>
+        </p:blipFill>
+        <p:spPr>
+          <a:xfrm flipH="false" flipV="false" rot="0">
+            <a:off x="16618323" y="22928353"/>
+            <a:ext cx="7684103" cy="1440769"/>
+          </a:xfrm>
+          <a:prstGeom prst="rect">
+            <a:avLst/>
+          </a:prstGeom>
+        </p:spPr>
+      </p:pic>
+      <p:pic>
+        <p:nvPicPr>
+          <p:cNvPr name="Picture 16" id="16"/>
+          <p:cNvPicPr>
+            <a:picLocks noChangeAspect="true"/>
+          </p:cNvPicPr>
+          <p:nvPr/>
+        </p:nvPicPr>
+        <p:blipFill>
+          <a:blip r:embed="rId8">
+            <a:extLst>
+              <a:ext uri="{28A0092B-C50C-407E-A947-70E740481C1C}">
+                <a14:useLocalDpi xmlns:a14="http://schemas.microsoft.com/office/drawing/2010/main" val="0"/>
+              </a:ext>
+              <a:ext uri="{96DAC541-7B7A-43D3-8B79-37D633B846F1}">
+                <asvg:svgBlip xmlns:asvg="http://schemas.microsoft.com/office/drawing/2016/SVG/main" r:embed="rId9"/>
+              </a:ext>
+            </a:extLst>
+          </a:blip>
+          <a:srcRect l="0" t="0" r="0" b="0"/>
+          <a:stretch>
+            <a:fillRect/>
+          </a:stretch>
+        </p:blipFill>
+        <p:spPr>
+          <a:xfrm flipH="false" flipV="false" rot="0">
+            <a:off x="7901055" y="33771316"/>
+            <a:ext cx="9910430" cy="1858206"/>
+          </a:xfrm>
+          <a:prstGeom prst="rect">
+            <a:avLst/>
+          </a:prstGeom>
+        </p:spPr>
+      </p:pic>
+      <p:pic>
+        <p:nvPicPr>
+          <p:cNvPr name="Picture 17" id="17"/>
+          <p:cNvPicPr>
+            <a:picLocks noChangeAspect="true"/>
+          </p:cNvPicPr>
+          <p:nvPr/>
+        </p:nvPicPr>
+        <p:blipFill>
+          <a:blip r:embed="rId8">
+            <a:extLst>
+              <a:ext uri="{28A0092B-C50C-407E-A947-70E740481C1C}">
+                <a14:useLocalDpi xmlns:a14="http://schemas.microsoft.com/office/drawing/2010/main" val="0"/>
+              </a:ext>
+              <a:ext uri="{96DAC541-7B7A-43D3-8B79-37D633B846F1}">
+                <asvg:svgBlip xmlns:asvg="http://schemas.microsoft.com/office/drawing/2016/SVG/main" r:embed="rId9"/>
+              </a:ext>
+            </a:extLst>
+          </a:blip>
+          <a:srcRect l="0" t="0" r="0" b="0"/>
+          <a:stretch>
+            <a:fillRect/>
+          </a:stretch>
+        </p:blipFill>
+        <p:spPr>
+          <a:xfrm flipH="false" flipV="false" rot="0">
+            <a:off x="9278483" y="33771316"/>
+            <a:ext cx="9910430" cy="1858206"/>
+          </a:xfrm>
+          <a:prstGeom prst="rect">
+            <a:avLst/>
+          </a:prstGeom>
+        </p:spPr>
+      </p:pic>
+      <p:pic>
+        <p:nvPicPr>
+          <p:cNvPr name="Picture 18" id="18"/>
+          <p:cNvPicPr>
+            <a:picLocks noChangeAspect="true"/>
+          </p:cNvPicPr>
+          <p:nvPr/>
+        </p:nvPicPr>
+        <p:blipFill>
+          <a:blip r:embed="rId10">
+            <a:extLst>
+              <a:ext uri="{28A0092B-C50C-407E-A947-70E740481C1C}">
+                <a14:useLocalDpi xmlns:a14="http://schemas.microsoft.com/office/drawing/2010/main" val="0"/>
+              </a:ext>
+              <a:ext uri="{96DAC541-7B7A-43D3-8B79-37D633B846F1}">
+                <asvg:svgBlip xmlns:asvg="http://schemas.microsoft.com/office/drawing/2016/SVG/main" r:embed="rId11"/>
+              </a:ext>
+            </a:extLst>
+          </a:blip>
+          <a:srcRect l="0" t="0" r="0" b="0"/>
+          <a:stretch>
+            <a:fillRect/>
+          </a:stretch>
+        </p:blipFill>
+        <p:spPr>
+          <a:xfrm flipH="false" flipV="false" rot="0">
+            <a:off x="9569292" y="12370612"/>
+            <a:ext cx="10909529" cy="2045537"/>
+          </a:xfrm>
+          <a:prstGeom prst="rect">
+            <a:avLst/>
+          </a:prstGeom>
+        </p:spPr>
+      </p:pic>
+      <p:pic>
+        <p:nvPicPr>
+          <p:cNvPr name="Picture 19" id="19"/>
+          <p:cNvPicPr>
+            <a:picLocks noChangeAspect="true"/>
+          </p:cNvPicPr>
+          <p:nvPr/>
+        </p:nvPicPr>
+        <p:blipFill>
+          <a:blip r:embed="rId10">
+            <a:extLst>
+              <a:ext uri="{28A0092B-C50C-407E-A947-70E740481C1C}">
+                <a14:useLocalDpi xmlns:a14="http://schemas.microsoft.com/office/drawing/2010/main" val="0"/>
+              </a:ext>
+              <a:ext uri="{96DAC541-7B7A-43D3-8B79-37D633B846F1}">
+                <asvg:svgBlip xmlns:asvg="http://schemas.microsoft.com/office/drawing/2016/SVG/main" r:embed="rId11"/>
+              </a:ext>
+            </a:extLst>
+          </a:blip>
+          <a:srcRect l="0" t="0" r="0" b="0"/>
+          <a:stretch>
+            <a:fillRect/>
+          </a:stretch>
+        </p:blipFill>
+        <p:spPr>
+          <a:xfrm flipH="false" flipV="false" rot="0">
+            <a:off x="9797179" y="13610886"/>
+            <a:ext cx="10909529" cy="2045537"/>
+          </a:xfrm>
+          <a:prstGeom prst="rect">
+            <a:avLst/>
+          </a:prstGeom>
+        </p:spPr>
+      </p:pic>
+      <p:pic>
+        <p:nvPicPr>
+          <p:cNvPr name="Picture 20" id="20"/>
+          <p:cNvPicPr>
+            <a:picLocks noChangeAspect="true"/>
+          </p:cNvPicPr>
+          <p:nvPr/>
+        </p:nvPicPr>
+        <p:blipFill>
+          <a:blip r:embed="rId12">
+            <a:extLst>
+              <a:ext uri="{28A0092B-C50C-407E-A947-70E740481C1C}">
+                <a14:useLocalDpi xmlns:a14="http://schemas.microsoft.com/office/drawing/2010/main" val="0"/>
+              </a:ext>
+              <a:ext uri="{96DAC541-7B7A-43D3-8B79-37D633B846F1}">
+                <asvg:svgBlip xmlns:asvg="http://schemas.microsoft.com/office/drawing/2016/SVG/main" r:embed="rId13"/>
+              </a:ext>
+            </a:extLst>
+          </a:blip>
+          <a:srcRect l="0" t="0" r="0" b="0"/>
+          <a:stretch>
+            <a:fillRect/>
+          </a:stretch>
+        </p:blipFill>
+        <p:spPr>
+          <a:xfrm flipH="false" flipV="false" rot="-6928165">
+            <a:off x="26938980" y="21877639"/>
+            <a:ext cx="1211061" cy="600989"/>
+          </a:xfrm>
+          <a:prstGeom prst="rect">
+            <a:avLst/>
+          </a:prstGeom>
+        </p:spPr>
+      </p:pic>
+      <p:pic>
+        <p:nvPicPr>
+          <p:cNvPr name="Picture 21" id="21"/>
+          <p:cNvPicPr>
+            <a:picLocks noChangeAspect="true"/>
+          </p:cNvPicPr>
+          <p:nvPr/>
+        </p:nvPicPr>
+        <p:blipFill>
+          <a:blip r:embed="rId12">
+            <a:extLst>
+              <a:ext uri="{28A0092B-C50C-407E-A947-70E740481C1C}">
+                <a14:useLocalDpi xmlns:a14="http://schemas.microsoft.com/office/drawing/2010/main" val="0"/>
+              </a:ext>
+              <a:ext uri="{96DAC541-7B7A-43D3-8B79-37D633B846F1}">
+                <asvg:svgBlip xmlns:asvg="http://schemas.microsoft.com/office/drawing/2016/SVG/main" r:embed="rId13"/>
+              </a:ext>
+            </a:extLst>
+          </a:blip>
+          <a:srcRect l="0" t="0" r="0" b="0"/>
+          <a:stretch>
+            <a:fillRect/>
+          </a:stretch>
+        </p:blipFill>
+        <p:spPr>
+          <a:xfrm flipH="false" flipV="false" rot="-7999408">
+            <a:off x="5847181" y="38840484"/>
+            <a:ext cx="903657" cy="448440"/>
+          </a:xfrm>
+          <a:prstGeom prst="rect">
+            <a:avLst/>
+          </a:prstGeom>
+        </p:spPr>
+      </p:pic>
+      <p:pic>
+        <p:nvPicPr>
+          <p:cNvPr name="Picture 22" id="22"/>
+          <p:cNvPicPr>
+            <a:picLocks noChangeAspect="true"/>
+          </p:cNvPicPr>
+          <p:nvPr/>
+        </p:nvPicPr>
+        <p:blipFill>
+          <a:blip r:embed="rId12">
+            <a:extLst>
+              <a:ext uri="{28A0092B-C50C-407E-A947-70E740481C1C}">
+                <a14:useLocalDpi xmlns:a14="http://schemas.microsoft.com/office/drawing/2010/main" val="0"/>
+              </a:ext>
+              <a:ext uri="{96DAC541-7B7A-43D3-8B79-37D633B846F1}">
+                <asvg:svgBlip xmlns:asvg="http://schemas.microsoft.com/office/drawing/2016/SVG/main" r:embed="rId13"/>
+              </a:ext>
+            </a:extLst>
+          </a:blip>
+          <a:srcRect l="0" t="0" r="0" b="0"/>
+          <a:stretch>
+            <a:fillRect/>
+          </a:stretch>
+        </p:blipFill>
+        <p:spPr>
+          <a:xfrm flipH="true" flipV="false" rot="-5285540">
+            <a:off x="2858600" y="10418321"/>
+            <a:ext cx="1250728" cy="620674"/>
+          </a:xfrm>
+          <a:prstGeom prst="rect">
+            <a:avLst/>
+          </a:prstGeom>
+        </p:spPr>
+      </p:pic>
+      <p:pic>
+        <p:nvPicPr>
+          <p:cNvPr name="Picture 23" id="23"/>
+          <p:cNvPicPr>
+            <a:picLocks noChangeAspect="true"/>
+          </p:cNvPicPr>
+          <p:nvPr/>
+        </p:nvPicPr>
+        <p:blipFill>
+          <a:blip r:embed="rId14">
+            <a:extLst>
+              <a:ext uri="{28A0092B-C50C-407E-A947-70E740481C1C}">
+                <a14:useLocalDpi xmlns:a14="http://schemas.microsoft.com/office/drawing/2010/main" val="0"/>
+              </a:ext>
+              <a:ext uri="{96DAC541-7B7A-43D3-8B79-37D633B846F1}">
+                <asvg:svgBlip xmlns:asvg="http://schemas.microsoft.com/office/drawing/2016/SVG/main" r:embed="rId15"/>
+              </a:ext>
+            </a:extLst>
+          </a:blip>
+          <a:srcRect l="0" t="0" r="0" b="0"/>
+          <a:stretch>
+            <a:fillRect/>
+          </a:stretch>
+        </p:blipFill>
+        <p:spPr>
+          <a:xfrm flipH="false" flipV="false" rot="6909004">
+            <a:off x="26036945" y="11101147"/>
+            <a:ext cx="733081" cy="1265977"/>
+          </a:xfrm>
+          <a:prstGeom prst="rect">
+            <a:avLst/>
+          </a:prstGeom>
+        </p:spPr>
+      </p:pic>
+      <p:pic>
+        <p:nvPicPr>
+          <p:cNvPr name="Picture 24" id="24"/>
+          <p:cNvPicPr>
+            <a:picLocks noChangeAspect="true"/>
+          </p:cNvPicPr>
+          <p:nvPr/>
+        </p:nvPicPr>
+        <p:blipFill>
+          <a:blip r:embed="rId14">
+            <a:extLst>
+              <a:ext uri="{28A0092B-C50C-407E-A947-70E740481C1C}">
+                <a14:useLocalDpi xmlns:a14="http://schemas.microsoft.com/office/drawing/2010/main" val="0"/>
+              </a:ext>
+              <a:ext uri="{96DAC541-7B7A-43D3-8B79-37D633B846F1}">
+                <asvg:svgBlip xmlns:asvg="http://schemas.microsoft.com/office/drawing/2016/SVG/main" r:embed="rId15"/>
+              </a:ext>
+            </a:extLst>
+          </a:blip>
+          <a:srcRect l="0" t="0" r="0" b="0"/>
+          <a:stretch>
+            <a:fillRect/>
+          </a:stretch>
+        </p:blipFill>
+        <p:spPr>
+          <a:xfrm flipH="false" flipV="false" rot="-9844970">
+            <a:off x="15183599" y="25117397"/>
+            <a:ext cx="733081" cy="1265977"/>
+          </a:xfrm>
+          <a:prstGeom prst="rect">
+            <a:avLst/>
+          </a:prstGeom>
+        </p:spPr>
+      </p:pic>
+      <p:pic>
+        <p:nvPicPr>
+          <p:cNvPr name="Picture 25" id="25"/>
+          <p:cNvPicPr>
+            <a:picLocks noChangeAspect="true"/>
+          </p:cNvPicPr>
+          <p:nvPr/>
+        </p:nvPicPr>
+        <p:blipFill>
+          <a:blip r:embed="rId14">
+            <a:extLst>
+              <a:ext uri="{28A0092B-C50C-407E-A947-70E740481C1C}">
+                <a14:useLocalDpi xmlns:a14="http://schemas.microsoft.com/office/drawing/2010/main" val="0"/>
+              </a:ext>
+              <a:ext uri="{96DAC541-7B7A-43D3-8B79-37D633B846F1}">
+                <asvg:svgBlip xmlns:asvg="http://schemas.microsoft.com/office/drawing/2016/SVG/main" r:embed="rId15"/>
+              </a:ext>
+            </a:extLst>
+          </a:blip>
+          <a:srcRect l="0" t="0" r="0" b="0"/>
+          <a:stretch>
+            <a:fillRect/>
+          </a:stretch>
+        </p:blipFill>
+        <p:spPr>
+          <a:xfrm flipH="false" flipV="false" rot="-6426645">
+            <a:off x="8315665" y="11564944"/>
+            <a:ext cx="477275" cy="824219"/>
+          </a:xfrm>
+          <a:prstGeom prst="rect">
+            <a:avLst/>
+          </a:prstGeom>
+        </p:spPr>
+      </p:pic>
+      <p:pic>
+        <p:nvPicPr>
+          <p:cNvPr name="Picture 26" id="26"/>
+          <p:cNvPicPr>
+            <a:picLocks noChangeAspect="true"/>
+          </p:cNvPicPr>
+          <p:nvPr/>
+        </p:nvPicPr>
+        <p:blipFill>
+          <a:blip r:embed="rId14">
+            <a:extLst>
+              <a:ext uri="{28A0092B-C50C-407E-A947-70E740481C1C}">
+                <a14:useLocalDpi xmlns:a14="http://schemas.microsoft.com/office/drawing/2010/main" val="0"/>
+              </a:ext>
+              <a:ext uri="{96DAC541-7B7A-43D3-8B79-37D633B846F1}">
+                <asvg:svgBlip xmlns:asvg="http://schemas.microsoft.com/office/drawing/2016/SVG/main" r:embed="rId15"/>
+              </a:ext>
+            </a:extLst>
+          </a:blip>
+          <a:srcRect l="0" t="0" r="0" b="0"/>
+          <a:stretch>
+            <a:fillRect/>
+          </a:stretch>
+        </p:blipFill>
+        <p:spPr>
+          <a:xfrm flipH="false" flipV="false" rot="-8621655">
+            <a:off x="5766042" y="32902432"/>
+            <a:ext cx="733081" cy="1265977"/>
+          </a:xfrm>
+          <a:prstGeom prst="rect">
+            <a:avLst/>
+          </a:prstGeom>
+        </p:spPr>
+      </p:pic>
+      <p:pic>
+        <p:nvPicPr>
+          <p:cNvPr name="Picture 27" id="27"/>
+          <p:cNvPicPr>
+            <a:picLocks noChangeAspect="true"/>
+          </p:cNvPicPr>
+          <p:nvPr/>
+        </p:nvPicPr>
+        <p:blipFill>
+          <a:blip r:embed="rId14">
+            <a:extLst>
+              <a:ext uri="{28A0092B-C50C-407E-A947-70E740481C1C}">
+                <a14:useLocalDpi xmlns:a14="http://schemas.microsoft.com/office/drawing/2010/main" val="0"/>
+              </a:ext>
+              <a:ext uri="{96DAC541-7B7A-43D3-8B79-37D633B846F1}">
+                <asvg:svgBlip xmlns:asvg="http://schemas.microsoft.com/office/drawing/2016/SVG/main" r:embed="rId15"/>
+              </a:ext>
+            </a:extLst>
+          </a:blip>
+          <a:srcRect l="0" t="0" r="0" b="0"/>
+          <a:stretch>
+            <a:fillRect/>
+          </a:stretch>
+        </p:blipFill>
+        <p:spPr>
+          <a:xfrm flipH="true" flipV="false" rot="6707545">
+            <a:off x="28020700" y="8505642"/>
+            <a:ext cx="733081" cy="1265977"/>
+          </a:xfrm>
+          <a:prstGeom prst="rect">
+            <a:avLst/>
+          </a:prstGeom>
+        </p:spPr>
+      </p:pic>
+      <p:pic>
+        <p:nvPicPr>
+          <p:cNvPr name="Picture 28" id="28"/>
+          <p:cNvPicPr>
+            <a:picLocks noChangeAspect="true"/>
+          </p:cNvPicPr>
+          <p:nvPr/>
+        </p:nvPicPr>
+        <p:blipFill>
+          <a:blip r:embed="rId14">
+            <a:extLst>
+              <a:ext uri="{28A0092B-C50C-407E-A947-70E740481C1C}">
+                <a14:useLocalDpi xmlns:a14="http://schemas.microsoft.com/office/drawing/2010/main" val="0"/>
+              </a:ext>
+              <a:ext uri="{96DAC541-7B7A-43D3-8B79-37D633B846F1}">
+                <asvg:svgBlip xmlns:asvg="http://schemas.microsoft.com/office/drawing/2016/SVG/main" r:embed="rId15"/>
+              </a:ext>
+            </a:extLst>
+          </a:blip>
+          <a:srcRect l="0" t="0" r="0" b="0"/>
+          <a:stretch>
+            <a:fillRect/>
+          </a:stretch>
+        </p:blipFill>
+        <p:spPr>
+          <a:xfrm flipH="true" flipV="false" rot="6707545">
+            <a:off x="1395285" y="6951948"/>
+            <a:ext cx="599968" cy="1036101"/>
+          </a:xfrm>
+          <a:prstGeom prst="rect">
+            <a:avLst/>
+          </a:prstGeom>
+        </p:spPr>
+      </p:pic>
+      <p:pic>
+        <p:nvPicPr>
+          <p:cNvPr name="Picture 29" id="29"/>
+          <p:cNvPicPr>
+            <a:picLocks noChangeAspect="true"/>
+          </p:cNvPicPr>
+          <p:nvPr/>
+        </p:nvPicPr>
+        <p:blipFill>
+          <a:blip r:embed="rId14">
+            <a:extLst>
+              <a:ext uri="{28A0092B-C50C-407E-A947-70E740481C1C}">
+                <a14:useLocalDpi xmlns:a14="http://schemas.microsoft.com/office/drawing/2010/main" val="0"/>
+              </a:ext>
+              <a:ext uri="{96DAC541-7B7A-43D3-8B79-37D633B846F1}">
+                <asvg:svgBlip xmlns:asvg="http://schemas.microsoft.com/office/drawing/2016/SVG/main" r:embed="rId15"/>
+              </a:ext>
+            </a:extLst>
+          </a:blip>
+          <a:srcRect l="0" t="0" r="0" b="0"/>
+          <a:stretch>
+            <a:fillRect/>
+          </a:stretch>
+        </p:blipFill>
+        <p:spPr>
+          <a:xfrm flipH="true" flipV="false" rot="-6113229">
+            <a:off x="13619203" y="23608196"/>
+            <a:ext cx="347929" cy="600849"/>
+          </a:xfrm>
+          <a:prstGeom prst="rect">
+            <a:avLst/>
+          </a:prstGeom>
+        </p:spPr>
+      </p:pic>
+      <p:pic>
+        <p:nvPicPr>
+          <p:cNvPr name="Picture 30" id="30"/>
+          <p:cNvPicPr>
+            <a:picLocks noChangeAspect="true"/>
+          </p:cNvPicPr>
+          <p:nvPr/>
+        </p:nvPicPr>
+        <p:blipFill>
+          <a:blip r:embed="rId14">
+            <a:extLst>
+              <a:ext uri="{28A0092B-C50C-407E-A947-70E740481C1C}">
+                <a14:useLocalDpi xmlns:a14="http://schemas.microsoft.com/office/drawing/2010/main" val="0"/>
+              </a:ext>
+              <a:ext uri="{96DAC541-7B7A-43D3-8B79-37D633B846F1}">
+                <asvg:svgBlip xmlns:asvg="http://schemas.microsoft.com/office/drawing/2016/SVG/main" r:embed="rId15"/>
+              </a:ext>
+            </a:extLst>
+          </a:blip>
+          <a:srcRect l="0" t="0" r="0" b="0"/>
+          <a:stretch>
+            <a:fillRect/>
+          </a:stretch>
+        </p:blipFill>
+        <p:spPr>
+          <a:xfrm flipH="true" flipV="false" rot="-6113229">
+            <a:off x="20862559" y="33962128"/>
+            <a:ext cx="347929" cy="600849"/>
+          </a:xfrm>
+          <a:prstGeom prst="rect">
+            <a:avLst/>
+          </a:prstGeom>
+        </p:spPr>
+      </p:pic>
+      <p:pic>
+        <p:nvPicPr>
+          <p:cNvPr name="Picture 31" id="31"/>
+          <p:cNvPicPr>
+            <a:picLocks noChangeAspect="true"/>
+          </p:cNvPicPr>
+          <p:nvPr/>
+        </p:nvPicPr>
+        <p:blipFill>
+          <a:blip r:embed="rId14">
+            <a:extLst>
+              <a:ext uri="{28A0092B-C50C-407E-A947-70E740481C1C}">
+                <a14:useLocalDpi xmlns:a14="http://schemas.microsoft.com/office/drawing/2010/main" val="0"/>
+              </a:ext>
+              <a:ext uri="{96DAC541-7B7A-43D3-8B79-37D633B846F1}">
+                <asvg:svgBlip xmlns:asvg="http://schemas.microsoft.com/office/drawing/2016/SVG/main" r:embed="rId15"/>
+              </a:ext>
+            </a:extLst>
+          </a:blip>
+          <a:srcRect l="0" t="0" r="0" b="0"/>
+          <a:stretch>
+            <a:fillRect/>
+          </a:stretch>
+        </p:blipFill>
+        <p:spPr>
+          <a:xfrm flipH="true" flipV="false" rot="-9304164">
+            <a:off x="20479970" y="20091369"/>
+            <a:ext cx="705692" cy="1218678"/>
+          </a:xfrm>
+          <a:prstGeom prst="rect">
+            <a:avLst/>
+          </a:prstGeom>
+        </p:spPr>
+      </p:pic>
+      <p:pic>
+        <p:nvPicPr>
+          <p:cNvPr name="Picture 32" id="32"/>
+          <p:cNvPicPr>
+            <a:picLocks noChangeAspect="true"/>
+          </p:cNvPicPr>
+          <p:nvPr/>
+        </p:nvPicPr>
+        <p:blipFill>
+          <a:blip r:embed="rId2">
+            <a:alphaModFix amt="56000"/>
+            <a:extLst>
+              <a:ext uri="{28A0092B-C50C-407E-A947-70E740481C1C}">
+                <a14:useLocalDpi xmlns:a14="http://schemas.microsoft.com/office/drawing/2010/main" val="0"/>
+              </a:ext>
+              <a:ext uri="{96DAC541-7B7A-43D3-8B79-37D633B846F1}">
+                <asvg:svgBlip xmlns:asvg="http://schemas.microsoft.com/office/drawing/2016/SVG/main" r:embed="rId3"/>
+              </a:ext>
+            </a:extLst>
+          </a:blip>
+          <a:srcRect l="0" t="0" r="0" b="0"/>
+          <a:stretch>
+            <a:fillRect/>
+          </a:stretch>
+        </p:blipFill>
+        <p:spPr>
+          <a:xfrm flipH="false" flipV="false" rot="0">
+            <a:off x="166220" y="41160656"/>
+            <a:ext cx="5062651" cy="1643344"/>
+          </a:xfrm>
+          <a:prstGeom prst="rect">
+            <a:avLst/>
+          </a:prstGeom>
+        </p:spPr>
+      </p:pic>
+      <p:pic>
+        <p:nvPicPr>
+          <p:cNvPr name="Picture 33" id="33"/>
+          <p:cNvPicPr>
+            <a:picLocks noChangeAspect="true"/>
+          </p:cNvPicPr>
+          <p:nvPr/>
+        </p:nvPicPr>
+        <p:blipFill>
+          <a:blip r:embed="rId2">
+            <a:alphaModFix amt="56000"/>
+            <a:extLst>
+              <a:ext uri="{28A0092B-C50C-407E-A947-70E740481C1C}">
+                <a14:useLocalDpi xmlns:a14="http://schemas.microsoft.com/office/drawing/2010/main" val="0"/>
+              </a:ext>
+              <a:ext uri="{96DAC541-7B7A-43D3-8B79-37D633B846F1}">
+                <asvg:svgBlip xmlns:asvg="http://schemas.microsoft.com/office/drawing/2016/SVG/main" r:embed="rId3"/>
+              </a:ext>
+            </a:extLst>
+          </a:blip>
+          <a:srcRect l="0" t="0" r="0" b="0"/>
+          <a:stretch>
+            <a:fillRect/>
+          </a:stretch>
+        </p:blipFill>
+        <p:spPr>
+          <a:xfrm flipH="false" flipV="false" rot="0">
+            <a:off x="23650780" y="41160656"/>
+            <a:ext cx="5062651" cy="1643344"/>
+          </a:xfrm>
+          <a:prstGeom prst="rect">
+            <a:avLst/>
+          </a:prstGeom>
+        </p:spPr>
+      </p:pic>
+      <p:pic>
+        <p:nvPicPr>
+          <p:cNvPr name="Picture 34" id="34"/>
+          <p:cNvPicPr>
+            <a:picLocks noChangeAspect="true"/>
+          </p:cNvPicPr>
+          <p:nvPr/>
+        </p:nvPicPr>
+        <p:blipFill>
+          <a:blip r:embed="rId16"/>
+          <a:srcRect l="0" t="0" r="0" b="0"/>
+          <a:stretch>
+            <a:fillRect/>
+          </a:stretch>
+        </p:blipFill>
+        <p:spPr>
+          <a:xfrm flipH="false" flipV="false" rot="0">
+            <a:off x="448913" y="43150"/>
+            <a:ext cx="7380164" cy="2832138"/>
+          </a:xfrm>
+          <a:prstGeom prst="rect">
+            <a:avLst/>
+          </a:prstGeom>
+        </p:spPr>
+      </p:pic>
+      <p:pic>
+        <p:nvPicPr>
+          <p:cNvPr name="Picture 35" id="35"/>
+          <p:cNvPicPr>
+            <a:picLocks noChangeAspect="true"/>
+          </p:cNvPicPr>
+          <p:nvPr/>
+        </p:nvPicPr>
+        <p:blipFill>
+          <a:blip r:embed="rId17"/>
+          <a:srcRect l="0" t="0" r="0" b="0"/>
+          <a:stretch>
+            <a:fillRect/>
+          </a:stretch>
+        </p:blipFill>
+        <p:spPr>
+          <a:xfrm flipH="false" flipV="false" rot="0">
+            <a:off x="648413" y="2875288"/>
+            <a:ext cx="7481509" cy="2980134"/>
+          </a:xfrm>
+          <a:prstGeom prst="rect">
+            <a:avLst/>
+          </a:prstGeom>
+        </p:spPr>
+      </p:pic>
+      <p:pic>
+        <p:nvPicPr>
+          <p:cNvPr name="Picture 36" id="36"/>
+          <p:cNvPicPr>
+            <a:picLocks noChangeAspect="true"/>
+          </p:cNvPicPr>
+          <p:nvPr/>
+        </p:nvPicPr>
+        <p:blipFill>
+          <a:blip r:embed="rId18"/>
+          <a:srcRect l="23942" t="0" r="0" b="0"/>
+          <a:stretch>
+            <a:fillRect/>
+          </a:stretch>
+        </p:blipFill>
+        <p:spPr>
+          <a:xfrm flipH="false" flipV="false" rot="0">
+            <a:off x="1473724" y="11887931"/>
+            <a:ext cx="5878739" cy="5143537"/>
+          </a:xfrm>
+          <a:prstGeom prst="rect">
+            <a:avLst/>
+          </a:prstGeom>
+        </p:spPr>
+      </p:pic>
+      <p:pic>
+        <p:nvPicPr>
+          <p:cNvPr name="Picture 37" id="37"/>
+          <p:cNvPicPr>
+            <a:picLocks noChangeAspect="true"/>
+          </p:cNvPicPr>
+          <p:nvPr/>
+        </p:nvPicPr>
+        <p:blipFill>
+          <a:blip r:embed="rId19"/>
+          <a:srcRect l="0" t="0" r="0" b="0"/>
+          <a:stretch>
+            <a:fillRect/>
+          </a:stretch>
+        </p:blipFill>
+        <p:spPr>
+          <a:xfrm flipH="false" flipV="false" rot="0">
+            <a:off x="310128" y="35110011"/>
+            <a:ext cx="5515756" cy="3954693"/>
+          </a:xfrm>
+          <a:prstGeom prst="rect">
+            <a:avLst/>
+          </a:prstGeom>
+        </p:spPr>
+      </p:pic>
+      <p:pic>
+        <p:nvPicPr>
+          <p:cNvPr name="Picture 38" id="38"/>
+          <p:cNvPicPr>
+            <a:picLocks noChangeAspect="true"/>
+          </p:cNvPicPr>
+          <p:nvPr/>
+        </p:nvPicPr>
+        <p:blipFill>
+          <a:blip r:embed="rId20"/>
+          <a:srcRect l="0" t="0" r="0" b="0"/>
+          <a:stretch>
+            <a:fillRect/>
+          </a:stretch>
+        </p:blipFill>
+        <p:spPr>
+          <a:xfrm flipH="false" flipV="false" rot="0">
+            <a:off x="21514090" y="14453121"/>
+            <a:ext cx="6730659" cy="6730659"/>
+          </a:xfrm>
+          <a:prstGeom prst="rect">
+            <a:avLst/>
+          </a:prstGeom>
+        </p:spPr>
+      </p:pic>
+      <p:pic>
+        <p:nvPicPr>
+          <p:cNvPr name="Picture 39" id="39"/>
+          <p:cNvPicPr>
+            <a:picLocks noChangeAspect="true"/>
+          </p:cNvPicPr>
+          <p:nvPr/>
+        </p:nvPicPr>
+        <p:blipFill>
+          <a:blip r:embed="rId21"/>
+          <a:srcRect l="1541" t="0" r="1541" b="0"/>
+          <a:stretch>
+            <a:fillRect/>
+          </a:stretch>
+        </p:blipFill>
+        <p:spPr>
+          <a:xfrm flipH="false" flipV="false" rot="0">
+            <a:off x="25987462" y="33620113"/>
+            <a:ext cx="3495505" cy="4673938"/>
+          </a:xfrm>
+          <a:prstGeom prst="rect">
+            <a:avLst/>
+          </a:prstGeom>
+        </p:spPr>
+      </p:pic>
+      <p:pic>
+        <p:nvPicPr>
+          <p:cNvPr name="Picture 40" id="40"/>
+          <p:cNvPicPr>
+            <a:picLocks noChangeAspect="true"/>
+          </p:cNvPicPr>
+          <p:nvPr/>
+        </p:nvPicPr>
+        <p:blipFill>
+          <a:blip r:embed="rId22"/>
+          <a:srcRect l="0" t="0" r="0" b="0"/>
+          <a:stretch>
+            <a:fillRect/>
+          </a:stretch>
+        </p:blipFill>
+        <p:spPr>
+          <a:xfrm flipH="false" flipV="false" rot="0">
+            <a:off x="22011467" y="33620113"/>
+            <a:ext cx="3606722" cy="4673938"/>
+          </a:xfrm>
+          <a:prstGeom prst="rect">
+            <a:avLst/>
+          </a:prstGeom>
+        </p:spPr>
+      </p:pic>
+      <p:sp>
+        <p:nvSpPr>
+          <p:cNvPr name="TextBox 41" id="41"/>
+          <p:cNvSpPr txBox="true"/>
+          <p:nvPr/>
+        </p:nvSpPr>
+        <p:spPr>
+          <a:xfrm rot="0">
+            <a:off x="7006027" y="329001"/>
+            <a:ext cx="16840295" cy="4347240"/>
+          </a:xfrm>
+          <a:prstGeom prst="rect">
+            <a:avLst/>
+          </a:prstGeom>
+        </p:spPr>
+        <p:txBody>
+          <a:bodyPr anchor="t" rtlCol="false" tIns="0" lIns="0" bIns="0" rIns="0">
+            <a:spAutoFit/>
+          </a:bodyPr>
+          <a:lstStyle/>
+          <a:p>
+            <a:pPr algn="ctr">
+              <a:lnSpc>
+                <a:spcPts val="11388"/>
+              </a:lnSpc>
+            </a:pPr>
+            <a:r>
+              <a:rPr lang="en-US" sz="10353" spc="-258">
+                <a:solidFill>
+                  <a:srgbClr val="100F0D">
+                    <a:alpha val="83922"/>
+                  </a:srgbClr>
+                </a:solidFill>
+                <a:latin typeface="Bobby Jones"/>
+              </a:rPr>
+              <a:t>Automated</a:t>
+            </a:r>
+          </a:p>
+          <a:p>
+            <a:pPr algn="ctr">
+              <a:lnSpc>
+                <a:spcPts val="11388"/>
+              </a:lnSpc>
+            </a:pPr>
+            <a:r>
+              <a:rPr lang="en-US" sz="10353" spc="-258">
+                <a:solidFill>
+                  <a:srgbClr val="100F0D">
+                    <a:alpha val="83922"/>
+                  </a:srgbClr>
+                </a:solidFill>
+                <a:latin typeface="Bobby Jones"/>
+              </a:rPr>
+              <a:t>Wild Fire </a:t>
+            </a:r>
+          </a:p>
+          <a:p>
+            <a:pPr algn="ctr">
+              <a:lnSpc>
+                <a:spcPts val="11388"/>
+              </a:lnSpc>
+            </a:pPr>
+            <a:r>
+              <a:rPr lang="en-US" sz="10353" spc="-258">
+                <a:solidFill>
+                  <a:srgbClr val="100F0D">
+                    <a:alpha val="83922"/>
+                  </a:srgbClr>
+                </a:solidFill>
+                <a:latin typeface="Bobby Jones"/>
+              </a:rPr>
+              <a:t>Prediction</a:t>
+            </a:r>
+          </a:p>
+        </p:txBody>
+      </p:sp>
+      <p:sp>
+        <p:nvSpPr>
+          <p:cNvPr name="TextBox 42" id="42"/>
+          <p:cNvSpPr txBox="true"/>
+          <p:nvPr/>
+        </p:nvSpPr>
+        <p:spPr>
+          <a:xfrm rot="0">
+            <a:off x="2222792" y="23605969"/>
+            <a:ext cx="7001753" cy="1598763"/>
+          </a:xfrm>
+          <a:prstGeom prst="rect">
+            <a:avLst/>
+          </a:prstGeom>
+        </p:spPr>
+        <p:txBody>
+          <a:bodyPr anchor="t" rtlCol="false" tIns="0" lIns="0" bIns="0" rIns="0">
+            <a:spAutoFit/>
+          </a:bodyPr>
+          <a:lstStyle/>
+          <a:p>
+            <a:pPr>
+              <a:lnSpc>
+                <a:spcPts val="5389"/>
+              </a:lnSpc>
+            </a:pPr>
+            <a:r>
+              <a:rPr lang="en-US" sz="6572">
+                <a:solidFill>
+                  <a:srgbClr val="FFFFFF"/>
+                </a:solidFill>
+                <a:latin typeface="Gaegu Bold"/>
+              </a:rPr>
+              <a:t>EXISTING SOLUTIONS</a:t>
+            </a:r>
+          </a:p>
+        </p:txBody>
+      </p:sp>
+      <p:sp>
+        <p:nvSpPr>
+          <p:cNvPr name="TextBox 43" id="43"/>
+          <p:cNvSpPr txBox="true"/>
+          <p:nvPr/>
+        </p:nvSpPr>
+        <p:spPr>
+          <a:xfrm rot="0">
+            <a:off x="25711250" y="23348069"/>
+            <a:ext cx="4058612" cy="1724092"/>
+          </a:xfrm>
+          <a:prstGeom prst="rect">
+            <a:avLst/>
+          </a:prstGeom>
+        </p:spPr>
+        <p:txBody>
+          <a:bodyPr anchor="t" rtlCol="false" tIns="0" lIns="0" bIns="0" rIns="0">
+            <a:spAutoFit/>
+          </a:bodyPr>
+          <a:lstStyle/>
+          <a:p>
+            <a:pPr algn="ctr">
+              <a:lnSpc>
+                <a:spcPts val="2832"/>
+              </a:lnSpc>
+            </a:pPr>
+            <a:r>
+              <a:rPr lang="en-US" sz="2776">
+                <a:solidFill>
+                  <a:srgbClr val="423A30"/>
+                </a:solidFill>
+                <a:latin typeface="Cerebri"/>
+              </a:rPr>
+              <a:t>HILL FIRE IN FANLING WHERE IT BURNED  THROUGH 250,000 SQUARE METRES OF HILLSIDE</a:t>
+            </a:r>
+          </a:p>
+        </p:txBody>
+      </p:sp>
+      <p:sp>
+        <p:nvSpPr>
+          <p:cNvPr name="TextBox 44" id="44"/>
+          <p:cNvSpPr txBox="true"/>
+          <p:nvPr/>
+        </p:nvSpPr>
+        <p:spPr>
+          <a:xfrm rot="0">
+            <a:off x="634168" y="8369699"/>
+            <a:ext cx="3033199" cy="1610369"/>
+          </a:xfrm>
+          <a:prstGeom prst="rect">
+            <a:avLst/>
+          </a:prstGeom>
+        </p:spPr>
+        <p:txBody>
+          <a:bodyPr anchor="t" rtlCol="false" tIns="0" lIns="0" bIns="0" rIns="0">
+            <a:spAutoFit/>
+          </a:bodyPr>
+          <a:lstStyle/>
+          <a:p>
+            <a:pPr algn="ctr">
+              <a:lnSpc>
+                <a:spcPts val="2655"/>
+              </a:lnSpc>
+            </a:pPr>
+            <a:r>
+              <a:rPr lang="en-US" sz="2458">
+                <a:solidFill>
+                  <a:srgbClr val="423A30"/>
+                </a:solidFill>
+                <a:latin typeface="Cerebri"/>
+              </a:rPr>
+              <a:t>85  HILL FIRES WERE REPORTED DURING CHING MING FESTIVAL IN HONG KONG</a:t>
+            </a:r>
+          </a:p>
+        </p:txBody>
+      </p:sp>
+      <p:sp>
+        <p:nvSpPr>
+          <p:cNvPr name="TextBox 45" id="45"/>
+          <p:cNvSpPr txBox="true"/>
+          <p:nvPr/>
+        </p:nvSpPr>
+        <p:spPr>
+          <a:xfrm rot="0">
+            <a:off x="17698692" y="23445148"/>
+            <a:ext cx="5114616" cy="1623057"/>
+          </a:xfrm>
+          <a:prstGeom prst="rect">
+            <a:avLst/>
+          </a:prstGeom>
+        </p:spPr>
+        <p:txBody>
+          <a:bodyPr anchor="t" rtlCol="false" tIns="0" lIns="0" bIns="0" rIns="0">
+            <a:spAutoFit/>
+          </a:bodyPr>
+          <a:lstStyle/>
+          <a:p>
+            <a:pPr>
+              <a:lnSpc>
+                <a:spcPts val="5516"/>
+              </a:lnSpc>
+            </a:pPr>
+            <a:r>
+              <a:rPr lang="en-US" sz="6727">
+                <a:solidFill>
+                  <a:srgbClr val="FFFFFF"/>
+                </a:solidFill>
+                <a:latin typeface="Gaegu Bold"/>
+              </a:rPr>
+              <a:t>OUR SOLUTION</a:t>
+            </a:r>
+          </a:p>
+        </p:txBody>
+      </p:sp>
+      <p:sp>
+        <p:nvSpPr>
+          <p:cNvPr name="TextBox 46" id="46"/>
+          <p:cNvSpPr txBox="true"/>
+          <p:nvPr/>
+        </p:nvSpPr>
+        <p:spPr>
+          <a:xfrm rot="0">
+            <a:off x="8649352" y="34155706"/>
+            <a:ext cx="7626554" cy="770802"/>
+          </a:xfrm>
+          <a:prstGeom prst="rect">
+            <a:avLst/>
+          </a:prstGeom>
+        </p:spPr>
+        <p:txBody>
+          <a:bodyPr anchor="t" rtlCol="false" tIns="0" lIns="0" bIns="0" rIns="0">
+            <a:spAutoFit/>
+          </a:bodyPr>
+          <a:lstStyle/>
+          <a:p>
+            <a:pPr>
+              <a:lnSpc>
+                <a:spcPts val="4595"/>
+              </a:lnSpc>
+            </a:pPr>
+            <a:r>
+              <a:rPr lang="en-US" sz="5604">
+                <a:solidFill>
+                  <a:srgbClr val="FFFFFF"/>
+                </a:solidFill>
+                <a:latin typeface="Gaegu Bold"/>
+              </a:rPr>
+              <a:t>METHODOLOGY </a:t>
+            </a:r>
+          </a:p>
+        </p:txBody>
+      </p:sp>
+      <p:sp>
+        <p:nvSpPr>
+          <p:cNvPr name="TextBox 47" id="47"/>
+          <p:cNvSpPr txBox="true"/>
+          <p:nvPr/>
+        </p:nvSpPr>
+        <p:spPr>
+          <a:xfrm rot="0">
+            <a:off x="10580716" y="12858925"/>
+            <a:ext cx="6784019" cy="2478795"/>
+          </a:xfrm>
+          <a:prstGeom prst="rect">
+            <a:avLst/>
+          </a:prstGeom>
+        </p:spPr>
+        <p:txBody>
+          <a:bodyPr anchor="t" rtlCol="false" tIns="0" lIns="0" bIns="0" rIns="0">
+            <a:spAutoFit/>
+          </a:bodyPr>
+          <a:lstStyle/>
+          <a:p>
+            <a:pPr algn="l" marL="0" indent="0" lvl="0">
+              <a:lnSpc>
+                <a:spcPts val="5865"/>
+              </a:lnSpc>
+              <a:spcBef>
+                <a:spcPct val="0"/>
+              </a:spcBef>
+            </a:pPr>
+            <a:r>
+              <a:rPr lang="en-US" sz="7152">
+                <a:solidFill>
+                  <a:srgbClr val="FFFFFF"/>
+                </a:solidFill>
+                <a:latin typeface="Gaegu Bold"/>
+              </a:rPr>
+              <a:t>BACKGROUND AND MOTIVIVATION</a:t>
+            </a:r>
+          </a:p>
+        </p:txBody>
+      </p:sp>
+      <p:sp>
+        <p:nvSpPr>
+          <p:cNvPr name="TextBox 48" id="48"/>
+          <p:cNvSpPr txBox="true"/>
+          <p:nvPr/>
+        </p:nvSpPr>
+        <p:spPr>
+          <a:xfrm rot="0">
+            <a:off x="379350" y="25624557"/>
+            <a:ext cx="15421744" cy="7334045"/>
+          </a:xfrm>
+          <a:prstGeom prst="rect">
+            <a:avLst/>
+          </a:prstGeom>
+        </p:spPr>
+        <p:txBody>
+          <a:bodyPr anchor="t" rtlCol="false" tIns="0" lIns="0" bIns="0" rIns="0">
+            <a:spAutoFit/>
+          </a:bodyPr>
+          <a:lstStyle/>
+          <a:p>
+            <a:pPr marL="920309" indent="-460154" lvl="1">
+              <a:lnSpc>
+                <a:spcPts val="4816"/>
+              </a:lnSpc>
+              <a:buFont typeface="Arial"/>
+              <a:buChar char="•"/>
+            </a:pPr>
+            <a:r>
+              <a:rPr lang="en-US" sz="4262">
+                <a:solidFill>
+                  <a:srgbClr val="100F0D"/>
+                </a:solidFill>
+                <a:latin typeface="Cerebri"/>
+              </a:rPr>
+              <a:t>In areas where fires commonly start, safeguards will be stationed. ​</a:t>
+            </a:r>
+          </a:p>
+          <a:p>
+            <a:pPr marL="920309" indent="-460154" lvl="1">
+              <a:lnSpc>
+                <a:spcPts val="4816"/>
+              </a:lnSpc>
+              <a:buFont typeface="Arial"/>
+              <a:buChar char="•"/>
+            </a:pPr>
+            <a:r>
+              <a:rPr lang="en-US" sz="4262">
+                <a:solidFill>
+                  <a:srgbClr val="100F0D"/>
+                </a:solidFill>
+                <a:latin typeface="Cerebri"/>
+              </a:rPr>
+              <a:t>Cameras with image recognition are also set up around areas with a high chance of fires.​</a:t>
+            </a:r>
+          </a:p>
+          <a:p>
+            <a:pPr marL="920309" indent="-460154" lvl="1">
+              <a:lnSpc>
+                <a:spcPts val="4816"/>
+              </a:lnSpc>
+              <a:buFont typeface="Arial"/>
+              <a:buChar char="•"/>
+            </a:pPr>
+            <a:r>
+              <a:rPr lang="en-US" sz="4262">
+                <a:solidFill>
+                  <a:srgbClr val="100F0D"/>
+                </a:solidFill>
+                <a:latin typeface="Cerebri"/>
+              </a:rPr>
+              <a:t>Data analysts go over climate data and manually find correlations to warn the public about fires; the Hong Kong Observatories' yellow and red fire warning system adapts this.</a:t>
+            </a:r>
+          </a:p>
+          <a:p>
+            <a:pPr marL="920309" indent="-460154" lvl="1">
+              <a:lnSpc>
+                <a:spcPts val="4816"/>
+              </a:lnSpc>
+              <a:buFont typeface="Arial"/>
+              <a:buChar char="•"/>
+            </a:pPr>
+            <a:r>
+              <a:rPr lang="en-US" sz="4262">
+                <a:solidFill>
+                  <a:srgbClr val="100F0D"/>
+                </a:solidFill>
+                <a:latin typeface="Cerebri"/>
+              </a:rPr>
+              <a:t>These solutions are only proactive, not preventative; they only send for help once the fires have started and already have affected the environment and people surrounding it.​</a:t>
+            </a:r>
+          </a:p>
+          <a:p>
+            <a:pPr algn="l">
+              <a:lnSpc>
+                <a:spcPts val="4816"/>
+              </a:lnSpc>
+            </a:pPr>
+          </a:p>
+        </p:txBody>
+      </p:sp>
+      <p:sp>
+        <p:nvSpPr>
+          <p:cNvPr name="TextBox 49" id="49"/>
+          <p:cNvSpPr txBox="true"/>
+          <p:nvPr/>
+        </p:nvSpPr>
+        <p:spPr>
+          <a:xfrm rot="0">
+            <a:off x="16054272" y="25625227"/>
+            <a:ext cx="13882791" cy="7809738"/>
+          </a:xfrm>
+          <a:prstGeom prst="rect">
+            <a:avLst/>
+          </a:prstGeom>
+        </p:spPr>
+        <p:txBody>
+          <a:bodyPr anchor="t" rtlCol="false" tIns="0" lIns="0" bIns="0" rIns="0">
+            <a:spAutoFit/>
+          </a:bodyPr>
+          <a:lstStyle/>
+          <a:p>
+            <a:pPr marL="906780" indent="-453390" lvl="1">
+              <a:lnSpc>
+                <a:spcPts val="4745"/>
+              </a:lnSpc>
+              <a:buFont typeface="Arial"/>
+              <a:buChar char="•"/>
+            </a:pPr>
+            <a:r>
+              <a:rPr lang="en-US" sz="4200">
+                <a:solidFill>
+                  <a:srgbClr val="100F0D"/>
+                </a:solidFill>
+                <a:latin typeface="Cerebri"/>
+              </a:rPr>
+              <a:t>Users will input climate information, and the model will use the data to predict the probability of a wildfire happening of natural causes.​</a:t>
+            </a:r>
+          </a:p>
+          <a:p>
+            <a:pPr marL="906780" indent="-453390" lvl="1">
+              <a:lnSpc>
+                <a:spcPts val="4745"/>
+              </a:lnSpc>
+              <a:buFont typeface="Arial"/>
+              <a:buChar char="•"/>
+            </a:pPr>
+            <a:r>
+              <a:rPr lang="en-US" sz="4200">
+                <a:solidFill>
+                  <a:srgbClr val="100F0D"/>
+                </a:solidFill>
+                <a:latin typeface="Cerebri"/>
+              </a:rPr>
+              <a:t>Why is this an improvement to the previous solution? ​</a:t>
+            </a:r>
+          </a:p>
+          <a:p>
+            <a:pPr marL="906780" indent="-453390" lvl="1">
+              <a:lnSpc>
+                <a:spcPts val="4745"/>
+              </a:lnSpc>
+              <a:buFont typeface="Arial"/>
+              <a:buChar char="•"/>
+            </a:pPr>
+            <a:r>
+              <a:rPr lang="en-US" sz="4200">
+                <a:solidFill>
+                  <a:srgbClr val="100F0D"/>
+                </a:solidFill>
+                <a:latin typeface="Cerebri"/>
+              </a:rPr>
+              <a:t>It's automated. Unlike the solutions mentioned before, which rely heavily on manual labor, our solution is automated, making it more cost-effective and efficient.</a:t>
+            </a:r>
+          </a:p>
+          <a:p>
+            <a:pPr algn="l" marL="906780" indent="-453390" lvl="1">
+              <a:lnSpc>
+                <a:spcPts val="4745"/>
+              </a:lnSpc>
+              <a:buFont typeface="Arial"/>
+              <a:buChar char="•"/>
+            </a:pPr>
+            <a:r>
+              <a:rPr lang="en-US" sz="4200">
+                <a:solidFill>
+                  <a:srgbClr val="100F0D"/>
+                </a:solidFill>
+                <a:latin typeface="Cerebri"/>
+              </a:rPr>
+              <a:t>It's preventative. Again, unlike the previous solutions, our software will warn people about fires before they have started instead of after. This prevents the environment from being harmed and fumes from being released into the air.</a:t>
+            </a:r>
+          </a:p>
+        </p:txBody>
+      </p:sp>
+      <p:sp>
+        <p:nvSpPr>
+          <p:cNvPr name="TextBox 50" id="50"/>
+          <p:cNvSpPr txBox="true"/>
+          <p:nvPr/>
+        </p:nvSpPr>
+        <p:spPr>
+          <a:xfrm rot="0">
+            <a:off x="7460045" y="35564683"/>
+            <a:ext cx="13246663" cy="3709783"/>
+          </a:xfrm>
+          <a:prstGeom prst="rect">
+            <a:avLst/>
+          </a:prstGeom>
+        </p:spPr>
+        <p:txBody>
+          <a:bodyPr anchor="t" rtlCol="false" tIns="0" lIns="0" bIns="0" rIns="0">
+            <a:spAutoFit/>
+          </a:bodyPr>
+          <a:lstStyle/>
+          <a:p>
+            <a:pPr marL="920309" indent="-460154" lvl="1">
+              <a:lnSpc>
+                <a:spcPts val="4816"/>
+              </a:lnSpc>
+              <a:buFont typeface="Arial"/>
+              <a:buChar char="•"/>
+            </a:pPr>
+            <a:r>
+              <a:rPr lang="en-US" sz="4262">
+                <a:solidFill>
+                  <a:srgbClr val="100F0D"/>
+                </a:solidFill>
+                <a:latin typeface="Cerebri"/>
+              </a:rPr>
+              <a:t>We first collect climate information(temperature, humidity, rain levels, etc) with users' input or the Hong Kong Observatory Open Data API</a:t>
+            </a:r>
+          </a:p>
+          <a:p>
+            <a:pPr marL="920309" indent="-460154" lvl="1">
+              <a:lnSpc>
+                <a:spcPts val="4816"/>
+              </a:lnSpc>
+              <a:buFont typeface="Arial"/>
+              <a:buChar char="•"/>
+            </a:pPr>
+            <a:r>
+              <a:rPr lang="en-US" sz="4262">
+                <a:solidFill>
+                  <a:srgbClr val="100F0D"/>
+                </a:solidFill>
+                <a:latin typeface="Cerebri"/>
+              </a:rPr>
+              <a:t>The data then gets passed into our model and outputs the percentage chance that there will be a fire.</a:t>
+            </a:r>
+          </a:p>
+        </p:txBody>
+      </p:sp>
+      <p:sp>
+        <p:nvSpPr>
+          <p:cNvPr name="TextBox 51" id="51"/>
+          <p:cNvSpPr txBox="true"/>
+          <p:nvPr/>
+        </p:nvSpPr>
+        <p:spPr>
+          <a:xfrm rot="0">
+            <a:off x="8952663" y="15923122"/>
+            <a:ext cx="11913506" cy="2457460"/>
+          </a:xfrm>
+          <a:prstGeom prst="rect">
+            <a:avLst/>
+          </a:prstGeom>
+        </p:spPr>
+        <p:txBody>
+          <a:bodyPr anchor="t" rtlCol="false" tIns="0" lIns="0" bIns="0" rIns="0">
+            <a:spAutoFit/>
+          </a:bodyPr>
+          <a:lstStyle/>
+          <a:p>
+            <a:pPr algn="l" marL="925529" indent="-462765" lvl="1">
+              <a:lnSpc>
+                <a:spcPts val="4844"/>
+              </a:lnSpc>
+              <a:buFont typeface="Arial"/>
+              <a:buChar char="•"/>
+            </a:pPr>
+            <a:r>
+              <a:rPr lang="en-US" sz="4286">
+                <a:solidFill>
+                  <a:srgbClr val="100F0D"/>
+                </a:solidFill>
+                <a:latin typeface="Cerebri"/>
+              </a:rPr>
+              <a:t>Over 10,000 fire incidents ​</a:t>
+            </a:r>
+            <a:r>
+              <a:rPr lang="en-US" sz="4286">
+                <a:solidFill>
+                  <a:srgbClr val="100F0D"/>
+                </a:solidFill>
+                <a:latin typeface="Cerebri"/>
+              </a:rPr>
+              <a:t>happen in Hong Kong every year due to negligence and environmental conditions. 600+ people have died from these incidents.</a:t>
+            </a:r>
+          </a:p>
+        </p:txBody>
+      </p:sp>
+      <p:sp>
+        <p:nvSpPr>
+          <p:cNvPr name="TextBox 52" id="52"/>
+          <p:cNvSpPr txBox="true"/>
+          <p:nvPr/>
+        </p:nvSpPr>
+        <p:spPr>
+          <a:xfrm rot="0">
+            <a:off x="4116636" y="4608424"/>
+            <a:ext cx="22619078" cy="2286000"/>
+          </a:xfrm>
+          <a:prstGeom prst="rect">
+            <a:avLst/>
+          </a:prstGeom>
+        </p:spPr>
+        <p:txBody>
+          <a:bodyPr anchor="t" rtlCol="false" tIns="0" lIns="0" bIns="0" rIns="0">
+            <a:spAutoFit/>
+          </a:bodyPr>
+          <a:lstStyle/>
+          <a:p>
+            <a:pPr algn="ctr">
+              <a:lnSpc>
+                <a:spcPts val="6036"/>
+              </a:lnSpc>
+            </a:pPr>
+            <a:r>
+              <a:rPr lang="en-US" sz="5030">
+                <a:solidFill>
+                  <a:srgbClr val="100F0D"/>
+                </a:solidFill>
+                <a:latin typeface="Cerebri"/>
+              </a:rPr>
+              <a:t>Gifted Education Fund</a:t>
+            </a:r>
+          </a:p>
+          <a:p>
+            <a:pPr algn="ctr" marL="0" indent="0" lvl="0">
+              <a:lnSpc>
+                <a:spcPts val="6036"/>
+              </a:lnSpc>
+            </a:pPr>
+            <a:r>
+              <a:rPr lang="en-US" sz="5030">
+                <a:solidFill>
+                  <a:srgbClr val="100F0D"/>
+                </a:solidFill>
+                <a:latin typeface="Cerebri"/>
+              </a:rPr>
+              <a:t>AIoT Coding, Engineering and Entrepreneurial Skills Education for Gifted Students</a:t>
+            </a:r>
+          </a:p>
+        </p:txBody>
+      </p:sp>
+      <p:sp>
+        <p:nvSpPr>
+          <p:cNvPr name="TextBox 53" id="53"/>
+          <p:cNvSpPr txBox="true"/>
+          <p:nvPr/>
+        </p:nvSpPr>
+        <p:spPr>
+          <a:xfrm rot="0">
+            <a:off x="5446525" y="7808824"/>
+            <a:ext cx="19959300" cy="4803859"/>
+          </a:xfrm>
+          <a:prstGeom prst="rect">
+            <a:avLst/>
+          </a:prstGeom>
+        </p:spPr>
+        <p:txBody>
+          <a:bodyPr anchor="t" rtlCol="false" tIns="0" lIns="0" bIns="0" rIns="0">
+            <a:spAutoFit/>
+          </a:bodyPr>
+          <a:lstStyle/>
+          <a:p>
+            <a:pPr algn="ctr">
+              <a:lnSpc>
+                <a:spcPts val="5456"/>
+              </a:lnSpc>
+            </a:pPr>
+            <a:r>
+              <a:rPr lang="en-US" sz="5006">
+                <a:solidFill>
+                  <a:srgbClr val="100F0D"/>
+                </a:solidFill>
+                <a:latin typeface="Cerebri"/>
+              </a:rPr>
+              <a:t>Our project aims to improve the efficiency and effectiveness of forest fire prevention and response efforts by using data analysis and machine learning to predict and prevent wildfires. ​Our model looks at the factors of temperature, wind speed, rain size, and relative humidity to indicate the percentage chance of wildfires, as those are the four most determining factors.</a:t>
+            </a:r>
+          </a:p>
+          <a:p>
+            <a:pPr algn="ctr" marL="0" indent="0" lvl="0">
+              <a:lnSpc>
+                <a:spcPts val="5456"/>
+              </a:lnSpc>
+            </a:pPr>
+          </a:p>
+        </p:txBody>
+      </p:sp>
+      <p:sp>
+        <p:nvSpPr>
+          <p:cNvPr name="TextBox 54" id="54"/>
+          <p:cNvSpPr txBox="true"/>
+          <p:nvPr/>
+        </p:nvSpPr>
+        <p:spPr>
+          <a:xfrm rot="0">
+            <a:off x="-286453" y="17353810"/>
+            <a:ext cx="10083632" cy="5505460"/>
+          </a:xfrm>
+          <a:prstGeom prst="rect">
+            <a:avLst/>
+          </a:prstGeom>
+        </p:spPr>
+        <p:txBody>
+          <a:bodyPr anchor="t" rtlCol="false" tIns="0" lIns="0" bIns="0" rIns="0">
+            <a:spAutoFit/>
+          </a:bodyPr>
+          <a:lstStyle/>
+          <a:p>
+            <a:pPr algn="l" marL="925529" indent="-462765" lvl="1">
+              <a:lnSpc>
+                <a:spcPts val="4844"/>
+              </a:lnSpc>
+              <a:buFont typeface="Arial"/>
+              <a:buChar char="•"/>
+            </a:pPr>
+            <a:r>
+              <a:rPr lang="en-US" sz="4286">
+                <a:solidFill>
+                  <a:srgbClr val="100F0D"/>
+                </a:solidFill>
+                <a:latin typeface="Cerebri"/>
+              </a:rPr>
+              <a:t>Wildfires release excessive amounts of carbon dioxide and other air pollutants into the atmosphere, contributing to Hong Kong's air pollution problem; it also damages the ecosystem, harms animals' habitats, contributes to deforestation, and exacerbate climate change.</a:t>
+            </a:r>
+          </a:p>
+        </p:txBody>
+      </p:sp>
+      <p:sp>
+        <p:nvSpPr>
+          <p:cNvPr name="TextBox 55" id="55"/>
+          <p:cNvSpPr txBox="true"/>
+          <p:nvPr/>
+        </p:nvSpPr>
+        <p:spPr>
+          <a:xfrm rot="0">
+            <a:off x="10160991" y="18432635"/>
+            <a:ext cx="9726132" cy="4286168"/>
+          </a:xfrm>
+          <a:prstGeom prst="rect">
+            <a:avLst/>
+          </a:prstGeom>
+        </p:spPr>
+        <p:txBody>
+          <a:bodyPr anchor="t" rtlCol="false" tIns="0" lIns="0" bIns="0" rIns="0">
+            <a:spAutoFit/>
+          </a:bodyPr>
+          <a:lstStyle/>
+          <a:p>
+            <a:pPr algn="l" marL="923295" indent="-461647" lvl="1">
+              <a:lnSpc>
+                <a:spcPts val="4832"/>
+              </a:lnSpc>
+              <a:buFont typeface="Arial"/>
+              <a:buChar char="•"/>
+            </a:pPr>
+            <a:r>
+              <a:rPr lang="en-US" sz="4276">
+                <a:solidFill>
+                  <a:srgbClr val="100F0D"/>
+                </a:solidFill>
+                <a:latin typeface="Cerebri"/>
+              </a:rPr>
+              <a:t>The smoke caused by wildfires can travel miles, creating a risk to public health as inhaling large amounts of the pollutants such as carbon monoxide is not healthy. It can give people a greater risk of contracting lung-related diseases. </a:t>
+            </a:r>
+          </a:p>
+        </p:txBody>
+      </p:sp>
+      <p:sp>
+        <p:nvSpPr>
+          <p:cNvPr name="TextBox 56" id="56"/>
+          <p:cNvSpPr txBox="true"/>
+          <p:nvPr/>
+        </p:nvSpPr>
+        <p:spPr>
+          <a:xfrm rot="0">
+            <a:off x="22011467" y="1395547"/>
+            <a:ext cx="8087172" cy="3733800"/>
+          </a:xfrm>
+          <a:prstGeom prst="rect">
+            <a:avLst/>
+          </a:prstGeom>
+        </p:spPr>
+        <p:txBody>
+          <a:bodyPr anchor="t" rtlCol="false" tIns="0" lIns="0" bIns="0" rIns="0">
+            <a:spAutoFit/>
+          </a:bodyPr>
+          <a:lstStyle/>
+          <a:p>
+            <a:pPr algn="ctr">
+              <a:lnSpc>
+                <a:spcPts val="7356"/>
+              </a:lnSpc>
+            </a:pPr>
+            <a:r>
+              <a:rPr lang="en-US" sz="6130">
+                <a:solidFill>
+                  <a:srgbClr val="100F0D"/>
+                </a:solidFill>
+                <a:latin typeface="Cerebri Bold"/>
+              </a:rPr>
+              <a:t>Students: </a:t>
+            </a:r>
+          </a:p>
+          <a:p>
+            <a:pPr algn="ctr">
+              <a:lnSpc>
+                <a:spcPts val="7356"/>
+              </a:lnSpc>
+            </a:pPr>
+            <a:r>
+              <a:rPr lang="en-US" sz="6130">
+                <a:solidFill>
+                  <a:srgbClr val="100F0D"/>
+                </a:solidFill>
+                <a:latin typeface="Cerebri"/>
+              </a:rPr>
+              <a:t>01 Alicia Yuen </a:t>
+            </a:r>
+          </a:p>
+          <a:p>
+            <a:pPr algn="ctr">
+              <a:lnSpc>
+                <a:spcPts val="7356"/>
+              </a:lnSpc>
+            </a:pPr>
+            <a:r>
+              <a:rPr lang="en-US" sz="6130">
+                <a:solidFill>
+                  <a:srgbClr val="100F0D"/>
+                </a:solidFill>
+                <a:latin typeface="Cerebri"/>
+              </a:rPr>
+              <a:t>30 Maya Yan </a:t>
+            </a:r>
+          </a:p>
+          <a:p>
+            <a:pPr algn="ctr" marL="0" indent="0" lvl="0">
+              <a:lnSpc>
+                <a:spcPts val="7356"/>
+              </a:lnSpc>
+            </a:pPr>
+            <a:r>
+              <a:rPr lang="en-US" sz="6130">
+                <a:solidFill>
+                  <a:srgbClr val="100F0D"/>
+                </a:solidFill>
+                <a:latin typeface="Cerebri"/>
+              </a:rPr>
+              <a:t>35 Valentina Banner </a:t>
+            </a:r>
+          </a:p>
+        </p:txBody>
+      </p:sp>
+      <p:sp>
+        <p:nvSpPr>
+          <p:cNvPr name="TextBox 57" id="57"/>
+          <p:cNvSpPr txBox="true"/>
+          <p:nvPr/>
+        </p:nvSpPr>
+        <p:spPr>
+          <a:xfrm rot="0">
+            <a:off x="4615983" y="39731665"/>
+            <a:ext cx="3033199" cy="1372521"/>
+          </a:xfrm>
+          <a:prstGeom prst="rect">
+            <a:avLst/>
+          </a:prstGeom>
+        </p:spPr>
+        <p:txBody>
+          <a:bodyPr anchor="t" rtlCol="false" tIns="0" lIns="0" bIns="0" rIns="0">
+            <a:spAutoFit/>
+          </a:bodyPr>
+          <a:lstStyle/>
+          <a:p>
+            <a:pPr algn="ctr">
+              <a:lnSpc>
+                <a:spcPts val="2753"/>
+              </a:lnSpc>
+            </a:pPr>
+            <a:r>
+              <a:rPr lang="en-US" sz="2458">
+                <a:solidFill>
+                  <a:srgbClr val="423A30"/>
+                </a:solidFill>
+                <a:latin typeface="Cerebri"/>
+              </a:rPr>
+              <a:t>EMMISIONS CAUSED BY HILLFIRES IN HONG KONG</a:t>
+            </a:r>
+          </a:p>
+        </p:txBody>
+      </p:sp>
+      <p:sp>
+        <p:nvSpPr>
+          <p:cNvPr name="TextBox 58" id="58"/>
+          <p:cNvSpPr txBox="true"/>
+          <p:nvPr/>
+        </p:nvSpPr>
+        <p:spPr>
+          <a:xfrm rot="0">
+            <a:off x="20722595" y="38627426"/>
+            <a:ext cx="9366461" cy="3119699"/>
+          </a:xfrm>
+          <a:prstGeom prst="rect">
+            <a:avLst/>
+          </a:prstGeom>
+        </p:spPr>
+        <p:txBody>
+          <a:bodyPr anchor="t" rtlCol="false" tIns="0" lIns="0" bIns="0" rIns="0">
+            <a:spAutoFit/>
+          </a:bodyPr>
+          <a:lstStyle/>
+          <a:p>
+            <a:pPr marL="774401" indent="-387201" lvl="1">
+              <a:lnSpc>
+                <a:spcPts val="4053"/>
+              </a:lnSpc>
+              <a:buFont typeface="Arial"/>
+              <a:buChar char="•"/>
+            </a:pPr>
+            <a:r>
+              <a:rPr lang="en-US" sz="3586">
+                <a:solidFill>
+                  <a:srgbClr val="100F0D"/>
+                </a:solidFill>
+                <a:latin typeface="Cerebri Bold"/>
+              </a:rPr>
+              <a:t>YouTube link:</a:t>
+            </a:r>
+          </a:p>
+          <a:p>
+            <a:pPr>
+              <a:lnSpc>
+                <a:spcPts val="4053"/>
+              </a:lnSpc>
+            </a:pPr>
+            <a:r>
+              <a:rPr lang="en-US" sz="3586">
+                <a:solidFill>
+                  <a:srgbClr val="100F0D"/>
+                </a:solidFill>
+                <a:latin typeface="Cerebri"/>
+              </a:rPr>
+              <a:t>       </a:t>
+            </a:r>
+            <a:r>
+              <a:rPr lang="en-US" sz="3586" u="sng">
+                <a:solidFill>
+                  <a:srgbClr val="100F0D"/>
+                </a:solidFill>
+                <a:latin typeface="Cerebri"/>
+                <a:hlinkClick r:id="rId23" tooltip="https://youtu.be/9h0zErdJY9c"/>
+              </a:rPr>
+              <a:t>https://youtu.be/9h0zErdJY9c</a:t>
+            </a:r>
+          </a:p>
+          <a:p>
+            <a:pPr>
+              <a:lnSpc>
+                <a:spcPts val="4053"/>
+              </a:lnSpc>
+            </a:pPr>
+          </a:p>
+          <a:p>
+            <a:pPr marL="774401" indent="-387201" lvl="1">
+              <a:lnSpc>
+                <a:spcPts val="4053"/>
+              </a:lnSpc>
+              <a:buFont typeface="Arial"/>
+              <a:buChar char="•"/>
+            </a:pPr>
+            <a:r>
+              <a:rPr lang="en-US" sz="3586">
+                <a:solidFill>
+                  <a:srgbClr val="100F0D"/>
+                </a:solidFill>
+                <a:latin typeface="Cerebri Bold"/>
+              </a:rPr>
+              <a:t>GitHub link:</a:t>
+            </a:r>
+          </a:p>
+          <a:p>
+            <a:pPr>
+              <a:lnSpc>
+                <a:spcPts val="4053"/>
+              </a:lnSpc>
+            </a:pPr>
+            <a:r>
+              <a:rPr lang="en-US" sz="3586">
+                <a:solidFill>
+                  <a:srgbClr val="100F0D"/>
+                </a:solidFill>
+                <a:latin typeface="Cerebri Bold"/>
+              </a:rPr>
+              <a:t>       </a:t>
+            </a:r>
+            <a:r>
+              <a:rPr lang="en-US" sz="3586" u="sng">
+                <a:solidFill>
+                  <a:srgbClr val="100F0D"/>
+                </a:solidFill>
+                <a:latin typeface="Cerebri"/>
+              </a:rPr>
+              <a:t>https://github.com/realhuman101/AWP  </a:t>
+            </a:r>
+          </a:p>
+          <a:p>
+            <a:pPr>
+              <a:lnSpc>
+                <a:spcPts val="4053"/>
+              </a:lnSpc>
+            </a:pPr>
+          </a:p>
+        </p:txBody>
+      </p:sp>
+      <p:pic>
+        <p:nvPicPr>
+          <p:cNvPr name="Picture 59" id="59"/>
+          <p:cNvPicPr>
+            <a:picLocks noChangeAspect="true"/>
+          </p:cNvPicPr>
+          <p:nvPr/>
+        </p:nvPicPr>
+        <p:blipFill>
+          <a:blip r:embed="rId2">
+            <a:alphaModFix amt="56000"/>
+            <a:extLst>
+              <a:ext uri="{28A0092B-C50C-407E-A947-70E740481C1C}">
+                <a14:useLocalDpi xmlns:a14="http://schemas.microsoft.com/office/drawing/2010/main" val="0"/>
+              </a:ext>
+              <a:ext uri="{96DAC541-7B7A-43D3-8B79-37D633B846F1}">
+                <asvg:svgBlip xmlns:asvg="http://schemas.microsoft.com/office/drawing/2016/SVG/main" r:embed="rId3"/>
+              </a:ext>
+            </a:extLst>
+          </a:blip>
+          <a:srcRect l="0" t="0" r="0" b="0"/>
+          <a:stretch>
+            <a:fillRect/>
+          </a:stretch>
+        </p:blipFill>
+        <p:spPr>
+          <a:xfrm flipH="false" flipV="false" rot="0">
+            <a:off x="-4479577" y="41160656"/>
+            <a:ext cx="5062651" cy="1643344"/>
+          </a:xfrm>
+          <a:prstGeom prst="rect">
+            <a:avLst/>
+          </a:prstGeom>
+        </p:spPr>
+      </p:pic>
+      <p:pic>
+        <p:nvPicPr>
+          <p:cNvPr name="Picture 60" id="60"/>
+          <p:cNvPicPr>
+            <a:picLocks noChangeAspect="true"/>
+          </p:cNvPicPr>
+          <p:nvPr/>
+        </p:nvPicPr>
+        <p:blipFill>
+          <a:blip r:embed="rId2">
+            <a:alphaModFix amt="56000"/>
+            <a:extLst>
+              <a:ext uri="{28A0092B-C50C-407E-A947-70E740481C1C}">
+                <a14:useLocalDpi xmlns:a14="http://schemas.microsoft.com/office/drawing/2010/main" val="0"/>
+              </a:ext>
+              <a:ext uri="{96DAC541-7B7A-43D3-8B79-37D633B846F1}">
+                <asvg:svgBlip xmlns:asvg="http://schemas.microsoft.com/office/drawing/2016/SVG/main" r:embed="rId3"/>
+              </a:ext>
+            </a:extLst>
+          </a:blip>
+          <a:srcRect l="0" t="0" r="0" b="0"/>
+          <a:stretch>
+            <a:fillRect/>
+          </a:stretch>
+        </p:blipFill>
+        <p:spPr>
+          <a:xfrm flipH="false" flipV="false" rot="0">
+            <a:off x="28387241" y="41160656"/>
+            <a:ext cx="5062651" cy="1643344"/>
+          </a:xfrm>
+          <a:prstGeom prst="rect">
+            <a:avLst/>
+          </a:prstGeom>
+        </p:spPr>
+      </p:pic>
+      <p:pic>
+        <p:nvPicPr>
+          <p:cNvPr name="Picture 61" id="61"/>
+          <p:cNvPicPr>
+            <a:picLocks noChangeAspect="true"/>
+          </p:cNvPicPr>
+          <p:nvPr/>
+        </p:nvPicPr>
+        <p:blipFill>
+          <a:blip r:embed="rId14">
+            <a:extLst>
+              <a:ext uri="{28A0092B-C50C-407E-A947-70E740481C1C}">
+                <a14:useLocalDpi xmlns:a14="http://schemas.microsoft.com/office/drawing/2010/main" val="0"/>
+              </a:ext>
+              <a:ext uri="{96DAC541-7B7A-43D3-8B79-37D633B846F1}">
+                <asvg:svgBlip xmlns:asvg="http://schemas.microsoft.com/office/drawing/2016/SVG/main" r:embed="rId15"/>
+              </a:ext>
+            </a:extLst>
+          </a:blip>
+          <a:srcRect l="0" t="0" r="0" b="0"/>
+          <a:stretch>
+            <a:fillRect/>
+          </a:stretch>
+        </p:blipFill>
+        <p:spPr>
+          <a:xfrm flipH="false" flipV="false" rot="-9844970">
+            <a:off x="3963805" y="7472550"/>
+            <a:ext cx="733081" cy="1265977"/>
+          </a:xfrm>
+          <a:prstGeom prst="rect">
+            <a:avLst/>
+          </a:prstGeom>
+        </p:spPr>
+      </p:pic>
+      <p:pic>
+        <p:nvPicPr>
+          <p:cNvPr name="Picture 62" id="62"/>
+          <p:cNvPicPr>
+            <a:picLocks noChangeAspect="true"/>
+          </p:cNvPicPr>
+          <p:nvPr/>
+        </p:nvPicPr>
+        <p:blipFill>
+          <a:blip r:embed="rId14">
+            <a:extLst>
+              <a:ext uri="{28A0092B-C50C-407E-A947-70E740481C1C}">
+                <a14:useLocalDpi xmlns:a14="http://schemas.microsoft.com/office/drawing/2010/main" val="0"/>
+              </a:ext>
+              <a:ext uri="{96DAC541-7B7A-43D3-8B79-37D633B846F1}">
+                <asvg:svgBlip xmlns:asvg="http://schemas.microsoft.com/office/drawing/2016/SVG/main" r:embed="rId15"/>
+              </a:ext>
+            </a:extLst>
+          </a:blip>
+          <a:srcRect l="0" t="0" r="0" b="0"/>
+          <a:stretch>
+            <a:fillRect/>
+          </a:stretch>
+        </p:blipFill>
+        <p:spPr>
+          <a:xfrm flipH="false" flipV="false" rot="-9844970">
+            <a:off x="22629127" y="12053307"/>
+            <a:ext cx="733081" cy="1265977"/>
+          </a:xfrm>
+          <a:prstGeom prst="rect">
+            <a:avLst/>
+          </a:prstGeom>
+        </p:spPr>
+      </p:pic>
+      <p:pic>
+        <p:nvPicPr>
+          <p:cNvPr name="Picture 63" id="63"/>
+          <p:cNvPicPr>
+            <a:picLocks noChangeAspect="true"/>
+          </p:cNvPicPr>
+          <p:nvPr/>
+        </p:nvPicPr>
+        <p:blipFill>
+          <a:blip r:embed="rId14">
+            <a:extLst>
+              <a:ext uri="{28A0092B-C50C-407E-A947-70E740481C1C}">
+                <a14:useLocalDpi xmlns:a14="http://schemas.microsoft.com/office/drawing/2010/main" val="0"/>
+              </a:ext>
+              <a:ext uri="{96DAC541-7B7A-43D3-8B79-37D633B846F1}">
+                <asvg:svgBlip xmlns:asvg="http://schemas.microsoft.com/office/drawing/2016/SVG/main" r:embed="rId15"/>
+              </a:ext>
+            </a:extLst>
+          </a:blip>
+          <a:srcRect l="0" t="0" r="0" b="0"/>
+          <a:stretch>
+            <a:fillRect/>
+          </a:stretch>
+        </p:blipFill>
+        <p:spPr>
+          <a:xfrm flipH="true" flipV="false" rot="-6113229">
+            <a:off x="494779" y="25449961"/>
+            <a:ext cx="347929" cy="600849"/>
+          </a:xfrm>
+          <a:prstGeom prst="rect">
+            <a:avLst/>
+          </a:prstGeom>
+        </p:spPr>
+      </p:pic>
+      <p:pic>
+        <p:nvPicPr>
+          <p:cNvPr name="Picture 64" id="64"/>
+          <p:cNvPicPr>
+            <a:picLocks noChangeAspect="true"/>
+          </p:cNvPicPr>
+          <p:nvPr/>
+        </p:nvPicPr>
+        <p:blipFill>
+          <a:blip r:embed="rId14">
+            <a:extLst>
+              <a:ext uri="{28A0092B-C50C-407E-A947-70E740481C1C}">
+                <a14:useLocalDpi xmlns:a14="http://schemas.microsoft.com/office/drawing/2010/main" val="0"/>
+              </a:ext>
+              <a:ext uri="{96DAC541-7B7A-43D3-8B79-37D633B846F1}">
+                <asvg:svgBlip xmlns:asvg="http://schemas.microsoft.com/office/drawing/2016/SVG/main" r:embed="rId15"/>
+              </a:ext>
+            </a:extLst>
+          </a:blip>
+          <a:srcRect l="0" t="0" r="0" b="0"/>
+          <a:stretch>
+            <a:fillRect/>
+          </a:stretch>
+        </p:blipFill>
+        <p:spPr>
+          <a:xfrm flipH="true" flipV="false" rot="-6113229">
+            <a:off x="26628461" y="7327989"/>
+            <a:ext cx="347929" cy="600849"/>
+          </a:xfrm>
+          <a:prstGeom prst="rect">
+            <a:avLst/>
+          </a:prstGeom>
+        </p:spPr>
+      </p:pic>
+      <p:sp>
+        <p:nvSpPr>
+          <p:cNvPr name="TextBox 65" id="65"/>
+          <p:cNvSpPr txBox="true"/>
+          <p:nvPr/>
+        </p:nvSpPr>
+        <p:spPr>
+          <a:xfrm rot="0">
+            <a:off x="23537834" y="138501"/>
+            <a:ext cx="5034439" cy="1044448"/>
+          </a:xfrm>
+          <a:prstGeom prst="rect">
+            <a:avLst/>
+          </a:prstGeom>
+        </p:spPr>
+        <p:txBody>
+          <a:bodyPr anchor="t" rtlCol="false" tIns="0" lIns="0" bIns="0" rIns="0">
+            <a:spAutoFit/>
+          </a:bodyPr>
+          <a:lstStyle/>
+          <a:p>
+            <a:pPr algn="ctr">
+              <a:lnSpc>
+                <a:spcPts val="8581"/>
+              </a:lnSpc>
+              <a:spcBef>
+                <a:spcPct val="0"/>
+              </a:spcBef>
+            </a:pPr>
+            <a:r>
+              <a:rPr lang="en-US" sz="6129">
+                <a:solidFill>
+                  <a:srgbClr val="000000"/>
+                </a:solidFill>
+                <a:latin typeface="Cerebri Bold"/>
+              </a:rPr>
+              <a:t>Project ID:</a:t>
+            </a:r>
+            <a:r>
+              <a:rPr lang="en-US" sz="6129">
+                <a:solidFill>
+                  <a:srgbClr val="000000"/>
+                </a:solidFill>
+                <a:latin typeface="Cerebri"/>
+              </a:rPr>
+              <a:t> 01</a:t>
+            </a:r>
           </a:p>
         </p:txBody>
       </p:sp>
@@ -2979,23 +5662,11 @@
   <p:clrMapOvr>
     <a:masterClrMapping/>
   </p:clrMapOvr>
-  <p:transition/>
-  <p:timing/>
 </p:sld>
 </file>
 
-<file path=ppt/tags/tag1.xml><?xml version="1.0" encoding="utf-8"?>
-<p:tagLst xmlns:p="http://schemas.openxmlformats.org/presentationml/2006/main">
-  <p:tag name="AS_NET" val="6.0.13"/>
-  <p:tag name="AS_OS" val="Unix 5.15.0.1028"/>
-  <p:tag name="AS_RELEASE_DATE" val="2022.12.14"/>
-  <p:tag name="AS_TITLE" val="Aspose.Slides for .NET Standard 2.0"/>
-  <p:tag name="AS_VERSION" val="22.12"/>
-</p:tagLst>
-</file>
-
 <file path=ppt/theme/theme1.xml><?xml version="1.0" encoding="utf-8"?>
-<a:theme xmlns:r="http://schemas.openxmlformats.org/officeDocument/2006/relationships" xmlns:a="http://schemas.openxmlformats.org/drawingml/2006/main" name="Office Theme">
+<a:theme xmlns:a="http://schemas.openxmlformats.org/drawingml/2006/main" name="Office Theme">
   <a:themeElements>
     <a:clrScheme name="Office">
       <a:dk1>
@@ -3038,10 +5709,10 @@
     <a:fontScheme name="Office">
       <a:majorFont>
         <a:latin typeface="Calibri"/>
-        <a:ea typeface="Arial"/>
-        <a:cs typeface="Arial"/>
-        <a:font script="Jpan" typeface="ＭＳ%20Ｐゴシック"/>
-        <a:font script="Hang" typeface="맑은%20고딕"/>
+        <a:ea typeface=""/>
+        <a:cs typeface=""/>
+        <a:font script="Jpan" typeface="ＭＳ Ｐゴシック"/>
+        <a:font script="Hang" typeface="맑은 고딕"/>
         <a:font script="Hans" typeface="宋体"/>
         <a:font script="Hant" typeface="新細明體"/>
         <a:font script="Arab" typeface="Times New Roman"/>
@@ -3069,14 +5740,13 @@
         <a:font script="Mong" typeface="Mongolian Baiti"/>
         <a:font script="Viet" typeface="Times New Roman"/>
         <a:font script="Uigh" typeface="Microsoft Uighur"/>
-        <a:font script="Geor" typeface="Sylfaen"/>
       </a:majorFont>
       <a:minorFont>
         <a:latin typeface="Calibri"/>
-        <a:ea typeface="Arial"/>
-        <a:cs typeface="Arial"/>
-        <a:font script="Jpan" typeface="ＭＳ%20Ｐゴシック"/>
-        <a:font script="Hang" typeface="맑은%20고딕"/>
+        <a:ea typeface=""/>
+        <a:cs typeface=""/>
+        <a:font script="Jpan" typeface="ＭＳ Ｐゴシック"/>
+        <a:font script="Hang" typeface="맑은 고딕"/>
         <a:font script="Hans" typeface="宋体"/>
         <a:font script="Hant" typeface="新細明體"/>
         <a:font script="Arab" typeface="Arial"/>
@@ -3104,7 +5774,6 @@
         <a:font script="Mong" typeface="Mongolian Baiti"/>
         <a:font script="Viet" typeface="Arial"/>
         <a:font script="Uigh" typeface="Microsoft Uighur"/>
-        <a:font script="Geor" typeface="Sylfaen"/>
       </a:minorFont>
     </a:fontScheme>
     <a:fmtScheme name="Office">
@@ -3274,5 +5943,7 @@
       </a:bgFillStyleLst>
     </a:fmtScheme>
   </a:themeElements>
+  <a:objectDefaults/>
+  <a:extraClrSchemeLst/>
 </a:theme>
 </file>
</xml_diff>